<commit_message>
Added the transition roles. This preso is getting long. But I think it still fits...as long as I don't get into the weeds.
</commit_message>
<xml_diff>
--- a/first 2 years/Your first 5 days and 2 years of Agile.pptx
+++ b/first 2 years/Your first 5 days and 2 years of Agile.pptx
@@ -5,7 +5,7 @@
     <p:sldMasterId id="2147483648" r:id="rId1"/>
   </p:sldMasterIdLst>
   <p:notesMasterIdLst>
-    <p:notesMasterId r:id="rId27"/>
+    <p:notesMasterId r:id="rId28"/>
   </p:notesMasterIdLst>
   <p:sldIdLst>
     <p:sldId id="256" r:id="rId2"/>
@@ -24,15 +24,16 @@
     <p:sldId id="273" r:id="rId15"/>
     <p:sldId id="265" r:id="rId16"/>
     <p:sldId id="279" r:id="rId17"/>
-    <p:sldId id="263" r:id="rId18"/>
-    <p:sldId id="272" r:id="rId19"/>
-    <p:sldId id="278" r:id="rId20"/>
-    <p:sldId id="277" r:id="rId21"/>
-    <p:sldId id="275" r:id="rId22"/>
-    <p:sldId id="268" r:id="rId23"/>
-    <p:sldId id="269" r:id="rId24"/>
-    <p:sldId id="274" r:id="rId25"/>
-    <p:sldId id="281" r:id="rId26"/>
+    <p:sldId id="283" r:id="rId18"/>
+    <p:sldId id="263" r:id="rId19"/>
+    <p:sldId id="272" r:id="rId20"/>
+    <p:sldId id="278" r:id="rId21"/>
+    <p:sldId id="277" r:id="rId22"/>
+    <p:sldId id="275" r:id="rId23"/>
+    <p:sldId id="268" r:id="rId24"/>
+    <p:sldId id="269" r:id="rId25"/>
+    <p:sldId id="274" r:id="rId26"/>
+    <p:sldId id="281" r:id="rId27"/>
   </p:sldIdLst>
   <p:sldSz cx="12192000" cy="6858000"/>
   <p:notesSz cx="6858000" cy="9144000"/>
@@ -11034,12 +11035,7 @@
             <p:ph type="sldImg"/>
           </p:nvPr>
         </p:nvSpPr>
-        <p:spPr>
-          <a:xfrm>
-            <a:off x="685800" y="1143000"/>
-            <a:ext cx="5486400" cy="3086100"/>
-          </a:xfrm>
-        </p:spPr>
+        <p:spPr/>
       </p:sp>
       <p:sp>
         <p:nvSpPr>
@@ -11058,17 +11054,29 @@
           <a:p>
             <a:r>
               <a:rPr lang="en-US" dirty="0" smtClean="0"/>
-              <a:t>Vision is bottom-up. At least, it is if you want the vision to be informed</a:t>
+              <a:t>Non-roles: </a:t>
             </a:r>
             <a:r>
-              <a:rPr lang="en-US" baseline="0" dirty="0" smtClean="0"/>
-              <a:t> by reality.</a:t>
+              <a:rPr lang="en-US" dirty="0" err="1" smtClean="0"/>
+              <a:t>scrummaster</a:t>
             </a:r>
-          </a:p>
-          <a:p>
             <a:r>
-              <a:rPr lang="en-US" baseline="0" dirty="0" smtClean="0"/>
-              <a:t>Envisioning is easier the further you are from reality. Just not as useful.</a:t>
+              <a:rPr lang="en-US" dirty="0" smtClean="0"/>
+              <a:t>, product owner, manager.</a:t>
+            </a:r>
+          </a:p>
+          <a:p>
+            <a:r>
+              <a:rPr lang="en-US" dirty="0" smtClean="0"/>
+              <a:t>Collaboration -&gt; if something is important, assign it to team. Use individual accountability for unimportant </a:t>
+            </a:r>
+            <a:r>
+              <a:rPr lang="en-US" dirty="0" err="1" smtClean="0"/>
+              <a:t>scut</a:t>
+            </a:r>
+            <a:r>
+              <a:rPr lang="en-US" dirty="0" smtClean="0"/>
+              <a:t> work.</a:t>
             </a:r>
             <a:endParaRPr lang="en-US" dirty="0"/>
           </a:p>
@@ -11091,7 +11099,7 @@
           <a:p>
             <a:fld id="{65BF156B-27E6-4EA6-BAD5-67954ACEB120}" type="slidenum">
               <a:rPr lang="en-US" smtClean="0"/>
-              <a:t>19</a:t>
+              <a:t>17</a:t>
             </a:fld>
             <a:endParaRPr lang="en-US"/>
           </a:p>
@@ -11100,7 +11108,7 @@
     </p:spTree>
     <p:extLst>
       <p:ext uri="{BB962C8B-B14F-4D97-AF65-F5344CB8AC3E}">
-        <p14:creationId xmlns:p14="http://schemas.microsoft.com/office/powerpoint/2010/main" val="1283846491"/>
+        <p14:creationId xmlns:p14="http://schemas.microsoft.com/office/powerpoint/2010/main" val="1070351152"/>
       </p:ext>
     </p:extLst>
   </p:cSld>
@@ -11161,11 +11169,17 @@
           <a:p>
             <a:r>
               <a:rPr lang="en-US" dirty="0" smtClean="0"/>
-              <a:t>Even</a:t>
+              <a:t>Vision is bottom-up. At least, it is if you want the vision to be informed</a:t>
             </a:r>
             <a:r>
               <a:rPr lang="en-US" baseline="0" dirty="0" smtClean="0"/>
-              <a:t> early levels of proficiency deliver real value. Get that value!</a:t>
+              <a:t> by reality.</a:t>
+            </a:r>
+          </a:p>
+          <a:p>
+            <a:r>
+              <a:rPr lang="en-US" baseline="0" dirty="0" smtClean="0"/>
+              <a:t>Envisioning is easier the further you are from reality. Just not as useful.</a:t>
             </a:r>
             <a:endParaRPr lang="en-US" dirty="0"/>
           </a:p>
@@ -11188,7 +11202,7 @@
           <a:p>
             <a:fld id="{65BF156B-27E6-4EA6-BAD5-67954ACEB120}" type="slidenum">
               <a:rPr lang="en-US" smtClean="0"/>
-              <a:t>21</a:t>
+              <a:t>20</a:t>
             </a:fld>
             <a:endParaRPr lang="en-US"/>
           </a:p>
@@ -11197,7 +11211,7 @@
     </p:spTree>
     <p:extLst>
       <p:ext uri="{BB962C8B-B14F-4D97-AF65-F5344CB8AC3E}">
-        <p14:creationId xmlns:p14="http://schemas.microsoft.com/office/powerpoint/2010/main" val="2530828782"/>
+        <p14:creationId xmlns:p14="http://schemas.microsoft.com/office/powerpoint/2010/main" val="1283846491"/>
       </p:ext>
     </p:extLst>
   </p:cSld>
@@ -11256,6 +11270,103 @@
           <a:bodyPr/>
           <a:lstStyle/>
           <a:p>
+            <a:r>
+              <a:rPr lang="en-US" dirty="0" smtClean="0"/>
+              <a:t>Even</a:t>
+            </a:r>
+            <a:r>
+              <a:rPr lang="en-US" baseline="0" dirty="0" smtClean="0"/>
+              <a:t> early levels of proficiency deliver real value. Get that value!</a:t>
+            </a:r>
+            <a:endParaRPr lang="en-US" dirty="0"/>
+          </a:p>
+        </p:txBody>
+      </p:sp>
+      <p:sp>
+        <p:nvSpPr>
+          <p:cNvPr id="4" name="Slide Number Placeholder 3"/>
+          <p:cNvSpPr>
+            <a:spLocks noGrp="1"/>
+          </p:cNvSpPr>
+          <p:nvPr>
+            <p:ph type="sldNum" sz="quarter" idx="10"/>
+          </p:nvPr>
+        </p:nvSpPr>
+        <p:spPr/>
+        <p:txBody>
+          <a:bodyPr/>
+          <a:lstStyle/>
+          <a:p>
+            <a:fld id="{65BF156B-27E6-4EA6-BAD5-67954ACEB120}" type="slidenum">
+              <a:rPr lang="en-US" smtClean="0"/>
+              <a:t>22</a:t>
+            </a:fld>
+            <a:endParaRPr lang="en-US"/>
+          </a:p>
+        </p:txBody>
+      </p:sp>
+    </p:spTree>
+    <p:extLst>
+      <p:ext uri="{BB962C8B-B14F-4D97-AF65-F5344CB8AC3E}">
+        <p14:creationId xmlns:p14="http://schemas.microsoft.com/office/powerpoint/2010/main" val="2530828782"/>
+      </p:ext>
+    </p:extLst>
+  </p:cSld>
+  <p:clrMapOvr>
+    <a:masterClrMapping/>
+  </p:clrMapOvr>
+</p:notes>
+</file>
+
+<file path=ppt/notesSlides/notesSlide5.xml><?xml version="1.0" encoding="utf-8"?>
+<p:notes xmlns:a="http://schemas.openxmlformats.org/drawingml/2006/main" xmlns:r="http://schemas.openxmlformats.org/officeDocument/2006/relationships" xmlns:p="http://schemas.openxmlformats.org/presentationml/2006/main">
+  <p:cSld>
+    <p:spTree>
+      <p:nvGrpSpPr>
+        <p:cNvPr id="1" name=""/>
+        <p:cNvGrpSpPr/>
+        <p:nvPr/>
+      </p:nvGrpSpPr>
+      <p:grpSpPr>
+        <a:xfrm>
+          <a:off x="0" y="0"/>
+          <a:ext cx="0" cy="0"/>
+          <a:chOff x="0" y="0"/>
+          <a:chExt cx="0" cy="0"/>
+        </a:xfrm>
+      </p:grpSpPr>
+      <p:sp>
+        <p:nvSpPr>
+          <p:cNvPr id="2" name="Slide Image Placeholder 1"/>
+          <p:cNvSpPr>
+            <a:spLocks noGrp="1" noRot="1" noChangeAspect="1"/>
+          </p:cNvSpPr>
+          <p:nvPr>
+            <p:ph type="sldImg"/>
+          </p:nvPr>
+        </p:nvSpPr>
+        <p:spPr>
+          <a:xfrm>
+            <a:off x="685800" y="1143000"/>
+            <a:ext cx="5486400" cy="3086100"/>
+          </a:xfrm>
+        </p:spPr>
+      </p:sp>
+      <p:sp>
+        <p:nvSpPr>
+          <p:cNvPr id="3" name="Notes Placeholder 2"/>
+          <p:cNvSpPr>
+            <a:spLocks noGrp="1"/>
+          </p:cNvSpPr>
+          <p:nvPr>
+            <p:ph type="body" idx="1"/>
+          </p:nvPr>
+        </p:nvSpPr>
+        <p:spPr/>
+        <p:txBody>
+          <a:bodyPr/>
+          <a:lstStyle/>
+          <a:p>
             <a:endParaRPr lang="en-US" dirty="0"/>
           </a:p>
         </p:txBody>
@@ -11396,7 +11507,7 @@
             <a:fld id="{B4008EB6-D09E-4580-8CD6-DDB14511944F}" type="slidenum">
               <a:rPr lang="en-US" smtClean="0"/>
               <a:pPr/>
-              <a:t>24</a:t>
+              <a:t>25</a:t>
             </a:fld>
             <a:endParaRPr lang="en-US" dirty="0"/>
           </a:p>
@@ -14406,6 +14517,112 @@
           <a:chExt cx="0" cy="0"/>
         </a:xfrm>
       </p:grpSpPr>
+      <p:pic>
+        <p:nvPicPr>
+          <p:cNvPr id="4" name="Content Placeholder 1"/>
+          <p:cNvPicPr>
+            <a:picLocks noChangeAspect="1"/>
+          </p:cNvPicPr>
+          <p:nvPr/>
+        </p:nvPicPr>
+        <p:blipFill>
+          <a:blip r:embed="rId2">
+            <a:extLst>
+              <a:ext uri="{28A0092B-C50C-407E-A947-70E740481C1C}">
+                <a14:useLocalDpi xmlns:a14="http://schemas.microsoft.com/office/drawing/2010/main" val="0"/>
+              </a:ext>
+            </a:extLst>
+          </a:blip>
+          <a:stretch>
+            <a:fillRect/>
+          </a:stretch>
+        </p:blipFill>
+        <p:spPr>
+          <a:xfrm>
+            <a:off x="0" y="0"/>
+            <a:ext cx="12192000" cy="6858000"/>
+          </a:xfrm>
+          <a:prstGeom prst="rect">
+            <a:avLst/>
+          </a:prstGeom>
+        </p:spPr>
+      </p:pic>
+      <p:sp>
+        <p:nvSpPr>
+          <p:cNvPr id="5" name="TextBox 4"/>
+          <p:cNvSpPr txBox="1"/>
+          <p:nvPr/>
+        </p:nvSpPr>
+        <p:spPr>
+          <a:xfrm>
+            <a:off x="983226" y="6385635"/>
+            <a:ext cx="8302273" cy="369332"/>
+          </a:xfrm>
+          <a:prstGeom prst="rect">
+            <a:avLst/>
+          </a:prstGeom>
+          <a:noFill/>
+        </p:spPr>
+        <p:txBody>
+          <a:bodyPr wrap="none" rtlCol="0">
+            <a:spAutoFit/>
+          </a:bodyPr>
+          <a:lstStyle/>
+          <a:p>
+            <a:r>
+              <a:rPr lang="en-US" dirty="0">
+                <a:latin typeface="Candara" panose="020E0502030303020204" pitchFamily="34" charset="0"/>
+              </a:rPr>
+              <a:t>http://arlobelshee.github.io/AgileEngineeringFluency/Stages_of_practice_map.html</a:t>
+            </a:r>
+          </a:p>
+        </p:txBody>
+      </p:sp>
+      <p:sp>
+        <p:nvSpPr>
+          <p:cNvPr id="6" name="Rectangle 5"/>
+          <p:cNvSpPr/>
+          <p:nvPr/>
+        </p:nvSpPr>
+        <p:spPr>
+          <a:xfrm>
+            <a:off x="0" y="0"/>
+            <a:ext cx="12192000" cy="6858000"/>
+          </a:xfrm>
+          <a:prstGeom prst="rect">
+            <a:avLst/>
+          </a:prstGeom>
+          <a:solidFill>
+            <a:srgbClr val="FFFFFF">
+              <a:alpha val="81961"/>
+            </a:srgbClr>
+          </a:solidFill>
+        </p:spPr>
+        <p:style>
+          <a:lnRef idx="2">
+            <a:schemeClr val="accent1">
+              <a:shade val="50000"/>
+            </a:schemeClr>
+          </a:lnRef>
+          <a:fillRef idx="1">
+            <a:schemeClr val="accent1"/>
+          </a:fillRef>
+          <a:effectRef idx="0">
+            <a:schemeClr val="accent1"/>
+          </a:effectRef>
+          <a:fontRef idx="minor">
+            <a:schemeClr val="lt1"/>
+          </a:fontRef>
+        </p:style>
+        <p:txBody>
+          <a:bodyPr rtlCol="0" anchor="ctr"/>
+          <a:lstStyle/>
+          <a:p>
+            <a:pPr algn="ctr"/>
+            <a:endParaRPr lang="en-US"/>
+          </a:p>
+        </p:txBody>
+      </p:sp>
       <p:sp>
         <p:nvSpPr>
           <p:cNvPr id="2" name="Title 1"/>
@@ -16497,6 +16714,1011 @@
           <a:chExt cx="0" cy="0"/>
         </a:xfrm>
       </p:grpSpPr>
+      <p:sp>
+        <p:nvSpPr>
+          <p:cNvPr id="5" name="Isosceles Triangle 4"/>
+          <p:cNvSpPr/>
+          <p:nvPr/>
+        </p:nvSpPr>
+        <p:spPr>
+          <a:xfrm>
+            <a:off x="1810871" y="1308847"/>
+            <a:ext cx="5710517" cy="1694329"/>
+          </a:xfrm>
+          <a:prstGeom prst="triangle">
+            <a:avLst/>
+          </a:prstGeom>
+        </p:spPr>
+        <p:style>
+          <a:lnRef idx="2">
+            <a:schemeClr val="accent1">
+              <a:shade val="50000"/>
+            </a:schemeClr>
+          </a:lnRef>
+          <a:fillRef idx="1">
+            <a:schemeClr val="accent1"/>
+          </a:fillRef>
+          <a:effectRef idx="0">
+            <a:schemeClr val="accent1"/>
+          </a:effectRef>
+          <a:fontRef idx="minor">
+            <a:schemeClr val="lt1"/>
+          </a:fontRef>
+        </p:style>
+        <p:txBody>
+          <a:bodyPr rtlCol="0" anchor="ctr"/>
+          <a:lstStyle/>
+          <a:p>
+            <a:pPr algn="ctr"/>
+            <a:r>
+              <a:rPr lang="en-US" sz="2800" dirty="0" smtClean="0">
+                <a:latin typeface="Candara" panose="020E0502030303020204" pitchFamily="34" charset="0"/>
+              </a:rPr>
+              <a:t>Doer (everyone)</a:t>
+            </a:r>
+            <a:endParaRPr lang="en-US" sz="2800" dirty="0">
+              <a:latin typeface="Candara" panose="020E0502030303020204" pitchFamily="34" charset="0"/>
+            </a:endParaRPr>
+          </a:p>
+        </p:txBody>
+      </p:sp>
+      <p:sp>
+        <p:nvSpPr>
+          <p:cNvPr id="6" name="Rectangle 5"/>
+          <p:cNvSpPr/>
+          <p:nvPr/>
+        </p:nvSpPr>
+        <p:spPr>
+          <a:xfrm>
+            <a:off x="2151528" y="3003176"/>
+            <a:ext cx="690282" cy="3065930"/>
+          </a:xfrm>
+          <a:prstGeom prst="rect">
+            <a:avLst/>
+          </a:prstGeom>
+        </p:spPr>
+        <p:style>
+          <a:lnRef idx="2">
+            <a:schemeClr val="accent1">
+              <a:shade val="50000"/>
+            </a:schemeClr>
+          </a:lnRef>
+          <a:fillRef idx="1">
+            <a:schemeClr val="accent1"/>
+          </a:fillRef>
+          <a:effectRef idx="0">
+            <a:schemeClr val="accent1"/>
+          </a:effectRef>
+          <a:fontRef idx="minor">
+            <a:schemeClr val="lt1"/>
+          </a:fontRef>
+        </p:style>
+        <p:txBody>
+          <a:bodyPr vert="vert270" rtlCol="0" anchor="ctr"/>
+          <a:lstStyle/>
+          <a:p>
+            <a:pPr algn="ctr"/>
+            <a:r>
+              <a:rPr lang="en-US" sz="2800" dirty="0" smtClean="0">
+                <a:latin typeface="Candara" panose="020E0502030303020204" pitchFamily="34" charset="0"/>
+              </a:rPr>
+              <a:t>Champion</a:t>
+            </a:r>
+            <a:endParaRPr lang="en-US" sz="2800" dirty="0">
+              <a:latin typeface="Candara" panose="020E0502030303020204" pitchFamily="34" charset="0"/>
+            </a:endParaRPr>
+          </a:p>
+        </p:txBody>
+      </p:sp>
+      <p:sp>
+        <p:nvSpPr>
+          <p:cNvPr id="7" name="Rectangle 6"/>
+          <p:cNvSpPr/>
+          <p:nvPr/>
+        </p:nvSpPr>
+        <p:spPr>
+          <a:xfrm>
+            <a:off x="4320988" y="3003176"/>
+            <a:ext cx="690282" cy="3065930"/>
+          </a:xfrm>
+          <a:prstGeom prst="rect">
+            <a:avLst/>
+          </a:prstGeom>
+        </p:spPr>
+        <p:style>
+          <a:lnRef idx="2">
+            <a:schemeClr val="accent1">
+              <a:shade val="50000"/>
+            </a:schemeClr>
+          </a:lnRef>
+          <a:fillRef idx="1">
+            <a:schemeClr val="accent1"/>
+          </a:fillRef>
+          <a:effectRef idx="0">
+            <a:schemeClr val="accent1"/>
+          </a:effectRef>
+          <a:fontRef idx="minor">
+            <a:schemeClr val="lt1"/>
+          </a:fontRef>
+        </p:style>
+        <p:txBody>
+          <a:bodyPr vert="vert270" rtlCol="0" anchor="ctr"/>
+          <a:lstStyle/>
+          <a:p>
+            <a:pPr algn="ctr"/>
+            <a:r>
+              <a:rPr lang="en-US" sz="2800" dirty="0" smtClean="0">
+                <a:latin typeface="Candara" panose="020E0502030303020204" pitchFamily="34" charset="0"/>
+              </a:rPr>
+              <a:t>Coach</a:t>
+            </a:r>
+            <a:endParaRPr lang="en-US" sz="2800" dirty="0">
+              <a:latin typeface="Candara" panose="020E0502030303020204" pitchFamily="34" charset="0"/>
+            </a:endParaRPr>
+          </a:p>
+        </p:txBody>
+      </p:sp>
+      <p:sp>
+        <p:nvSpPr>
+          <p:cNvPr id="8" name="Rectangle 7"/>
+          <p:cNvSpPr/>
+          <p:nvPr/>
+        </p:nvSpPr>
+        <p:spPr>
+          <a:xfrm>
+            <a:off x="6490448" y="3003176"/>
+            <a:ext cx="690282" cy="3065930"/>
+          </a:xfrm>
+          <a:prstGeom prst="rect">
+            <a:avLst/>
+          </a:prstGeom>
+        </p:spPr>
+        <p:style>
+          <a:lnRef idx="2">
+            <a:schemeClr val="accent1">
+              <a:shade val="50000"/>
+            </a:schemeClr>
+          </a:lnRef>
+          <a:fillRef idx="1">
+            <a:schemeClr val="accent1"/>
+          </a:fillRef>
+          <a:effectRef idx="0">
+            <a:schemeClr val="accent1"/>
+          </a:effectRef>
+          <a:fontRef idx="minor">
+            <a:schemeClr val="lt1"/>
+          </a:fontRef>
+        </p:style>
+        <p:txBody>
+          <a:bodyPr vert="vert270" rtlCol="0" anchor="ctr"/>
+          <a:lstStyle/>
+          <a:p>
+            <a:pPr algn="ctr"/>
+            <a:r>
+              <a:rPr lang="en-US" sz="2800" dirty="0" smtClean="0">
+                <a:latin typeface="Candara" panose="020E0502030303020204" pitchFamily="34" charset="0"/>
+              </a:rPr>
+              <a:t>Servant leader</a:t>
+            </a:r>
+            <a:endParaRPr lang="en-US" sz="2800" dirty="0">
+              <a:latin typeface="Candara" panose="020E0502030303020204" pitchFamily="34" charset="0"/>
+            </a:endParaRPr>
+          </a:p>
+        </p:txBody>
+      </p:sp>
+      <p:sp>
+        <p:nvSpPr>
+          <p:cNvPr id="9" name="Rectangle 8"/>
+          <p:cNvSpPr/>
+          <p:nvPr/>
+        </p:nvSpPr>
+        <p:spPr>
+          <a:xfrm>
+            <a:off x="1810871" y="6069106"/>
+            <a:ext cx="5710517" cy="493059"/>
+          </a:xfrm>
+          <a:prstGeom prst="rect">
+            <a:avLst/>
+          </a:prstGeom>
+        </p:spPr>
+        <p:style>
+          <a:lnRef idx="2">
+            <a:schemeClr val="accent1">
+              <a:shade val="50000"/>
+            </a:schemeClr>
+          </a:lnRef>
+          <a:fillRef idx="1">
+            <a:schemeClr val="accent1"/>
+          </a:fillRef>
+          <a:effectRef idx="0">
+            <a:schemeClr val="accent1"/>
+          </a:effectRef>
+          <a:fontRef idx="minor">
+            <a:schemeClr val="lt1"/>
+          </a:fontRef>
+        </p:style>
+        <p:txBody>
+          <a:bodyPr rtlCol="0" anchor="ctr"/>
+          <a:lstStyle/>
+          <a:p>
+            <a:pPr algn="ctr"/>
+            <a:r>
+              <a:rPr lang="en-US" sz="2800" dirty="0" smtClean="0">
+                <a:latin typeface="Candara" panose="020E0502030303020204" pitchFamily="34" charset="0"/>
+              </a:rPr>
+              <a:t>Gurus / Community</a:t>
+            </a:r>
+            <a:endParaRPr lang="en-US" sz="2800" dirty="0">
+              <a:latin typeface="Candara" panose="020E0502030303020204" pitchFamily="34" charset="0"/>
+            </a:endParaRPr>
+          </a:p>
+        </p:txBody>
+      </p:sp>
+      <p:sp>
+        <p:nvSpPr>
+          <p:cNvPr id="10" name="TextBox 9"/>
+          <p:cNvSpPr txBox="1"/>
+          <p:nvPr/>
+        </p:nvSpPr>
+        <p:spPr>
+          <a:xfrm>
+            <a:off x="7631953" y="1394419"/>
+            <a:ext cx="3573414" cy="1200329"/>
+          </a:xfrm>
+          <a:prstGeom prst="rect">
+            <a:avLst/>
+          </a:prstGeom>
+          <a:noFill/>
+        </p:spPr>
+        <p:txBody>
+          <a:bodyPr wrap="none" rtlCol="0">
+            <a:spAutoFit/>
+          </a:bodyPr>
+          <a:lstStyle/>
+          <a:p>
+            <a:r>
+              <a:rPr lang="en-US" dirty="0" smtClean="0">
+                <a:latin typeface="Candara" panose="020E0502030303020204" pitchFamily="34" charset="0"/>
+              </a:rPr>
+              <a:t>Does all the things.</a:t>
+            </a:r>
+          </a:p>
+          <a:p>
+            <a:r>
+              <a:rPr lang="en-US" dirty="0" smtClean="0">
+                <a:latin typeface="Candara" panose="020E0502030303020204" pitchFamily="34" charset="0"/>
+              </a:rPr>
+              <a:t>Doing, assessing, and deciding.</a:t>
+            </a:r>
+          </a:p>
+          <a:p>
+            <a:endParaRPr lang="en-US" dirty="0">
+              <a:latin typeface="Candara" panose="020E0502030303020204" pitchFamily="34" charset="0"/>
+            </a:endParaRPr>
+          </a:p>
+          <a:p>
+            <a:r>
+              <a:rPr lang="en-US" dirty="0" smtClean="0">
+                <a:latin typeface="Candara" panose="020E0502030303020204" pitchFamily="34" charset="0"/>
+              </a:rPr>
+              <a:t>Owns the transition &amp; its outcome.</a:t>
+            </a:r>
+            <a:endParaRPr lang="en-US" dirty="0">
+              <a:latin typeface="Candara" panose="020E0502030303020204" pitchFamily="34" charset="0"/>
+            </a:endParaRPr>
+          </a:p>
+        </p:txBody>
+      </p:sp>
+      <p:sp>
+        <p:nvSpPr>
+          <p:cNvPr id="11" name="TextBox 10"/>
+          <p:cNvSpPr txBox="1"/>
+          <p:nvPr/>
+        </p:nvSpPr>
+        <p:spPr>
+          <a:xfrm>
+            <a:off x="2819023" y="3003176"/>
+            <a:ext cx="1292662" cy="2862322"/>
+          </a:xfrm>
+          <a:prstGeom prst="rect">
+            <a:avLst/>
+          </a:prstGeom>
+          <a:noFill/>
+        </p:spPr>
+        <p:txBody>
+          <a:bodyPr vert="horz" wrap="square" rtlCol="0">
+            <a:spAutoFit/>
+          </a:bodyPr>
+          <a:lstStyle/>
+          <a:p>
+            <a:r>
+              <a:rPr lang="en-US" dirty="0" smtClean="0">
+                <a:latin typeface="Candara" panose="020E0502030303020204" pitchFamily="34" charset="0"/>
+              </a:rPr>
+              <a:t>Brings important idea(s) to team.</a:t>
+            </a:r>
+          </a:p>
+          <a:p>
+            <a:endParaRPr lang="en-US" dirty="0" smtClean="0">
+              <a:latin typeface="Candara" panose="020E0502030303020204" pitchFamily="34" charset="0"/>
+            </a:endParaRPr>
+          </a:p>
+          <a:p>
+            <a:r>
+              <a:rPr lang="en-US" dirty="0" smtClean="0">
+                <a:latin typeface="Candara" panose="020E0502030303020204" pitchFamily="34" charset="0"/>
+              </a:rPr>
+              <a:t>Assesses skills.</a:t>
+            </a:r>
+          </a:p>
+          <a:p>
+            <a:endParaRPr lang="en-US" dirty="0">
+              <a:latin typeface="Candara" panose="020E0502030303020204" pitchFamily="34" charset="0"/>
+            </a:endParaRPr>
+          </a:p>
+          <a:p>
+            <a:r>
+              <a:rPr lang="en-US" dirty="0" smtClean="0">
+                <a:latin typeface="Candara" panose="020E0502030303020204" pitchFamily="34" charset="0"/>
+              </a:rPr>
+              <a:t>Instructs or coaches.</a:t>
+            </a:r>
+            <a:endParaRPr lang="en-US" dirty="0">
+              <a:latin typeface="Candara" panose="020E0502030303020204" pitchFamily="34" charset="0"/>
+            </a:endParaRPr>
+          </a:p>
+        </p:txBody>
+      </p:sp>
+      <p:sp>
+        <p:nvSpPr>
+          <p:cNvPr id="13" name="TextBox 12"/>
+          <p:cNvSpPr txBox="1"/>
+          <p:nvPr/>
+        </p:nvSpPr>
+        <p:spPr>
+          <a:xfrm>
+            <a:off x="5011270" y="2966123"/>
+            <a:ext cx="1292662" cy="2031325"/>
+          </a:xfrm>
+          <a:prstGeom prst="rect">
+            <a:avLst/>
+          </a:prstGeom>
+          <a:noFill/>
+        </p:spPr>
+        <p:txBody>
+          <a:bodyPr vert="horz" wrap="square" rtlCol="0">
+            <a:spAutoFit/>
+          </a:bodyPr>
+          <a:lstStyle/>
+          <a:p>
+            <a:r>
+              <a:rPr lang="en-US" dirty="0" smtClean="0">
+                <a:latin typeface="Candara" panose="020E0502030303020204" pitchFamily="34" charset="0"/>
+              </a:rPr>
+              <a:t>Facilitates teaming.</a:t>
+            </a:r>
+          </a:p>
+          <a:p>
+            <a:endParaRPr lang="en-US" dirty="0">
+              <a:latin typeface="Candara" panose="020E0502030303020204" pitchFamily="34" charset="0"/>
+            </a:endParaRPr>
+          </a:p>
+          <a:p>
+            <a:r>
+              <a:rPr lang="en-US" dirty="0" smtClean="0">
+                <a:latin typeface="Candara" panose="020E0502030303020204" pitchFamily="34" charset="0"/>
+              </a:rPr>
+              <a:t>Helps people adapt to change.</a:t>
+            </a:r>
+            <a:endParaRPr lang="en-US" dirty="0">
+              <a:latin typeface="Candara" panose="020E0502030303020204" pitchFamily="34" charset="0"/>
+            </a:endParaRPr>
+          </a:p>
+        </p:txBody>
+      </p:sp>
+      <p:sp>
+        <p:nvSpPr>
+          <p:cNvPr id="14" name="TextBox 13"/>
+          <p:cNvSpPr txBox="1"/>
+          <p:nvPr/>
+        </p:nvSpPr>
+        <p:spPr>
+          <a:xfrm>
+            <a:off x="7180730" y="3003176"/>
+            <a:ext cx="1479178" cy="2308324"/>
+          </a:xfrm>
+          <a:prstGeom prst="rect">
+            <a:avLst/>
+          </a:prstGeom>
+          <a:noFill/>
+        </p:spPr>
+        <p:txBody>
+          <a:bodyPr vert="horz" wrap="square" rtlCol="0">
+            <a:spAutoFit/>
+          </a:bodyPr>
+          <a:lstStyle/>
+          <a:p>
+            <a:r>
+              <a:rPr lang="en-US" dirty="0" smtClean="0">
+                <a:latin typeface="Candara" panose="020E0502030303020204" pitchFamily="34" charset="0"/>
+              </a:rPr>
+              <a:t>Provides safety to experiment.</a:t>
+            </a:r>
+          </a:p>
+          <a:p>
+            <a:endParaRPr lang="en-US" dirty="0">
+              <a:latin typeface="Candara" panose="020E0502030303020204" pitchFamily="34" charset="0"/>
+            </a:endParaRPr>
+          </a:p>
+          <a:p>
+            <a:r>
+              <a:rPr lang="en-US" dirty="0" smtClean="0">
+                <a:latin typeface="Candara" panose="020E0502030303020204" pitchFamily="34" charset="0"/>
+              </a:rPr>
+              <a:t>Supports culture of continuous change.</a:t>
+            </a:r>
+            <a:endParaRPr lang="en-US" dirty="0">
+              <a:latin typeface="Candara" panose="020E0502030303020204" pitchFamily="34" charset="0"/>
+            </a:endParaRPr>
+          </a:p>
+        </p:txBody>
+      </p:sp>
+      <p:sp>
+        <p:nvSpPr>
+          <p:cNvPr id="16" name="TextBox 15"/>
+          <p:cNvSpPr txBox="1"/>
+          <p:nvPr/>
+        </p:nvSpPr>
+        <p:spPr>
+          <a:xfrm>
+            <a:off x="7631953" y="5992469"/>
+            <a:ext cx="4017818" cy="646331"/>
+          </a:xfrm>
+          <a:prstGeom prst="rect">
+            <a:avLst/>
+          </a:prstGeom>
+          <a:noFill/>
+        </p:spPr>
+        <p:txBody>
+          <a:bodyPr wrap="square" rtlCol="0">
+            <a:spAutoFit/>
+          </a:bodyPr>
+          <a:lstStyle/>
+          <a:p>
+            <a:r>
+              <a:rPr lang="en-US" dirty="0" smtClean="0">
+                <a:latin typeface="Candara" panose="020E0502030303020204" pitchFamily="34" charset="0"/>
+              </a:rPr>
+              <a:t>Provide experience and alternatives.</a:t>
+            </a:r>
+          </a:p>
+          <a:p>
+            <a:r>
+              <a:rPr lang="en-US" dirty="0" smtClean="0">
+                <a:latin typeface="Candara" panose="020E0502030303020204" pitchFamily="34" charset="0"/>
+              </a:rPr>
+              <a:t>Prevent best practice thinking.</a:t>
+            </a:r>
+            <a:endParaRPr lang="en-US" dirty="0">
+              <a:latin typeface="Candara" panose="020E0502030303020204" pitchFamily="34" charset="0"/>
+            </a:endParaRPr>
+          </a:p>
+        </p:txBody>
+      </p:sp>
+      <p:sp>
+        <p:nvSpPr>
+          <p:cNvPr id="17" name="Left Brace 16"/>
+          <p:cNvSpPr/>
+          <p:nvPr/>
+        </p:nvSpPr>
+        <p:spPr>
+          <a:xfrm>
+            <a:off x="1450109" y="3003176"/>
+            <a:ext cx="175491" cy="3558989"/>
+          </a:xfrm>
+          <a:prstGeom prst="leftBrace">
+            <a:avLst/>
+          </a:prstGeom>
+        </p:spPr>
+        <p:style>
+          <a:lnRef idx="1">
+            <a:schemeClr val="accent1"/>
+          </a:lnRef>
+          <a:fillRef idx="0">
+            <a:schemeClr val="accent1"/>
+          </a:fillRef>
+          <a:effectRef idx="0">
+            <a:schemeClr val="accent1"/>
+          </a:effectRef>
+          <a:fontRef idx="minor">
+            <a:schemeClr val="tx1"/>
+          </a:fontRef>
+        </p:style>
+        <p:txBody>
+          <a:bodyPr rtlCol="0" anchor="ctr"/>
+          <a:lstStyle/>
+          <a:p>
+            <a:pPr algn="ctr"/>
+            <a:endParaRPr lang="en-US">
+              <a:latin typeface="Candara" panose="020E0502030303020204" pitchFamily="34" charset="0"/>
+            </a:endParaRPr>
+          </a:p>
+        </p:txBody>
+      </p:sp>
+      <p:sp>
+        <p:nvSpPr>
+          <p:cNvPr id="18" name="TextBox 17"/>
+          <p:cNvSpPr txBox="1"/>
+          <p:nvPr/>
+        </p:nvSpPr>
+        <p:spPr>
+          <a:xfrm>
+            <a:off x="243874" y="4459504"/>
+            <a:ext cx="1132041" cy="646331"/>
+          </a:xfrm>
+          <a:prstGeom prst="rect">
+            <a:avLst/>
+          </a:prstGeom>
+          <a:noFill/>
+        </p:spPr>
+        <p:txBody>
+          <a:bodyPr wrap="none" rtlCol="0">
+            <a:spAutoFit/>
+          </a:bodyPr>
+          <a:lstStyle/>
+          <a:p>
+            <a:r>
+              <a:rPr lang="en-US" dirty="0" smtClean="0">
+                <a:latin typeface="Candara" panose="020E0502030303020204" pitchFamily="34" charset="0"/>
+              </a:rPr>
+              <a:t>Work self</a:t>
+            </a:r>
+          </a:p>
+          <a:p>
+            <a:r>
+              <a:rPr lang="en-US" dirty="0" smtClean="0">
+                <a:latin typeface="Candara" panose="020E0502030303020204" pitchFamily="34" charset="0"/>
+              </a:rPr>
+              <a:t>out of job</a:t>
+            </a:r>
+            <a:endParaRPr lang="en-US" dirty="0">
+              <a:latin typeface="Candara" panose="020E0502030303020204" pitchFamily="34" charset="0"/>
+            </a:endParaRPr>
+          </a:p>
+        </p:txBody>
+      </p:sp>
+    </p:spTree>
+    <p:extLst>
+      <p:ext uri="{BB962C8B-B14F-4D97-AF65-F5344CB8AC3E}">
+        <p14:creationId xmlns:p14="http://schemas.microsoft.com/office/powerpoint/2010/main" val="3867206489"/>
+      </p:ext>
+    </p:extLst>
+  </p:cSld>
+  <p:clrMapOvr>
+    <a:masterClrMapping/>
+  </p:clrMapOvr>
+  <p:timing>
+    <p:tnLst>
+      <p:par>
+        <p:cTn id="1" dur="indefinite" restart="never" nodeType="tmRoot">
+          <p:childTnLst>
+            <p:seq concurrent="1" nextAc="seek">
+              <p:cTn id="2" dur="indefinite" nodeType="mainSeq">
+                <p:childTnLst>
+                  <p:par>
+                    <p:cTn id="3" fill="hold">
+                      <p:stCondLst>
+                        <p:cond delay="indefinite"/>
+                      </p:stCondLst>
+                      <p:childTnLst>
+                        <p:par>
+                          <p:cTn id="4" fill="hold">
+                            <p:stCondLst>
+                              <p:cond delay="0"/>
+                            </p:stCondLst>
+                            <p:childTnLst>
+                              <p:par>
+                                <p:cTn id="5" presetID="1" presetClass="entr" presetSubtype="0" fill="hold" grpId="0" nodeType="clickEffect">
+                                  <p:stCondLst>
+                                    <p:cond delay="0"/>
+                                  </p:stCondLst>
+                                  <p:childTnLst>
+                                    <p:set>
+                                      <p:cBhvr>
+                                        <p:cTn id="6" dur="1" fill="hold">
+                                          <p:stCondLst>
+                                            <p:cond delay="0"/>
+                                          </p:stCondLst>
+                                        </p:cTn>
+                                        <p:tgtEl>
+                                          <p:spTgt spid="6"/>
+                                        </p:tgtEl>
+                                        <p:attrNameLst>
+                                          <p:attrName>style.visibility</p:attrName>
+                                        </p:attrNameLst>
+                                      </p:cBhvr>
+                                      <p:to>
+                                        <p:strVal val="visible"/>
+                                      </p:to>
+                                    </p:set>
+                                  </p:childTnLst>
+                                </p:cTn>
+                              </p:par>
+                              <p:par>
+                                <p:cTn id="7" presetID="1" presetClass="entr" presetSubtype="0" fill="hold" grpId="0" nodeType="withEffect">
+                                  <p:stCondLst>
+                                    <p:cond delay="0"/>
+                                  </p:stCondLst>
+                                  <p:childTnLst>
+                                    <p:set>
+                                      <p:cBhvr>
+                                        <p:cTn id="8" dur="1" fill="hold">
+                                          <p:stCondLst>
+                                            <p:cond delay="0"/>
+                                          </p:stCondLst>
+                                        </p:cTn>
+                                        <p:tgtEl>
+                                          <p:spTgt spid="11"/>
+                                        </p:tgtEl>
+                                        <p:attrNameLst>
+                                          <p:attrName>style.visibility</p:attrName>
+                                        </p:attrNameLst>
+                                      </p:cBhvr>
+                                      <p:to>
+                                        <p:strVal val="visible"/>
+                                      </p:to>
+                                    </p:set>
+                                  </p:childTnLst>
+                                </p:cTn>
+                              </p:par>
+                            </p:childTnLst>
+                          </p:cTn>
+                        </p:par>
+                      </p:childTnLst>
+                    </p:cTn>
+                  </p:par>
+                  <p:par>
+                    <p:cTn id="9" fill="hold">
+                      <p:stCondLst>
+                        <p:cond delay="indefinite"/>
+                      </p:stCondLst>
+                      <p:childTnLst>
+                        <p:par>
+                          <p:cTn id="10" fill="hold">
+                            <p:stCondLst>
+                              <p:cond delay="0"/>
+                            </p:stCondLst>
+                            <p:childTnLst>
+                              <p:par>
+                                <p:cTn id="11" presetID="1" presetClass="entr" presetSubtype="0" fill="hold" grpId="0" nodeType="clickEffect">
+                                  <p:stCondLst>
+                                    <p:cond delay="0"/>
+                                  </p:stCondLst>
+                                  <p:childTnLst>
+                                    <p:set>
+                                      <p:cBhvr>
+                                        <p:cTn id="12" dur="1" fill="hold">
+                                          <p:stCondLst>
+                                            <p:cond delay="0"/>
+                                          </p:stCondLst>
+                                        </p:cTn>
+                                        <p:tgtEl>
+                                          <p:spTgt spid="7"/>
+                                        </p:tgtEl>
+                                        <p:attrNameLst>
+                                          <p:attrName>style.visibility</p:attrName>
+                                        </p:attrNameLst>
+                                      </p:cBhvr>
+                                      <p:to>
+                                        <p:strVal val="visible"/>
+                                      </p:to>
+                                    </p:set>
+                                  </p:childTnLst>
+                                </p:cTn>
+                              </p:par>
+                              <p:par>
+                                <p:cTn id="13" presetID="1" presetClass="entr" presetSubtype="0" fill="hold" grpId="0" nodeType="withEffect">
+                                  <p:stCondLst>
+                                    <p:cond delay="0"/>
+                                  </p:stCondLst>
+                                  <p:childTnLst>
+                                    <p:set>
+                                      <p:cBhvr>
+                                        <p:cTn id="14" dur="1" fill="hold">
+                                          <p:stCondLst>
+                                            <p:cond delay="0"/>
+                                          </p:stCondLst>
+                                        </p:cTn>
+                                        <p:tgtEl>
+                                          <p:spTgt spid="13"/>
+                                        </p:tgtEl>
+                                        <p:attrNameLst>
+                                          <p:attrName>style.visibility</p:attrName>
+                                        </p:attrNameLst>
+                                      </p:cBhvr>
+                                      <p:to>
+                                        <p:strVal val="visible"/>
+                                      </p:to>
+                                    </p:set>
+                                  </p:childTnLst>
+                                </p:cTn>
+                              </p:par>
+                            </p:childTnLst>
+                          </p:cTn>
+                        </p:par>
+                      </p:childTnLst>
+                    </p:cTn>
+                  </p:par>
+                  <p:par>
+                    <p:cTn id="15" fill="hold">
+                      <p:stCondLst>
+                        <p:cond delay="indefinite"/>
+                      </p:stCondLst>
+                      <p:childTnLst>
+                        <p:par>
+                          <p:cTn id="16" fill="hold">
+                            <p:stCondLst>
+                              <p:cond delay="0"/>
+                            </p:stCondLst>
+                            <p:childTnLst>
+                              <p:par>
+                                <p:cTn id="17" presetID="1" presetClass="entr" presetSubtype="0" fill="hold" grpId="0" nodeType="clickEffect">
+                                  <p:stCondLst>
+                                    <p:cond delay="0"/>
+                                  </p:stCondLst>
+                                  <p:childTnLst>
+                                    <p:set>
+                                      <p:cBhvr>
+                                        <p:cTn id="18" dur="1" fill="hold">
+                                          <p:stCondLst>
+                                            <p:cond delay="0"/>
+                                          </p:stCondLst>
+                                        </p:cTn>
+                                        <p:tgtEl>
+                                          <p:spTgt spid="8"/>
+                                        </p:tgtEl>
+                                        <p:attrNameLst>
+                                          <p:attrName>style.visibility</p:attrName>
+                                        </p:attrNameLst>
+                                      </p:cBhvr>
+                                      <p:to>
+                                        <p:strVal val="visible"/>
+                                      </p:to>
+                                    </p:set>
+                                  </p:childTnLst>
+                                </p:cTn>
+                              </p:par>
+                              <p:par>
+                                <p:cTn id="19" presetID="1" presetClass="entr" presetSubtype="0" fill="hold" grpId="0" nodeType="withEffect">
+                                  <p:stCondLst>
+                                    <p:cond delay="0"/>
+                                  </p:stCondLst>
+                                  <p:childTnLst>
+                                    <p:set>
+                                      <p:cBhvr>
+                                        <p:cTn id="20" dur="1" fill="hold">
+                                          <p:stCondLst>
+                                            <p:cond delay="0"/>
+                                          </p:stCondLst>
+                                        </p:cTn>
+                                        <p:tgtEl>
+                                          <p:spTgt spid="14"/>
+                                        </p:tgtEl>
+                                        <p:attrNameLst>
+                                          <p:attrName>style.visibility</p:attrName>
+                                        </p:attrNameLst>
+                                      </p:cBhvr>
+                                      <p:to>
+                                        <p:strVal val="visible"/>
+                                      </p:to>
+                                    </p:set>
+                                  </p:childTnLst>
+                                </p:cTn>
+                              </p:par>
+                            </p:childTnLst>
+                          </p:cTn>
+                        </p:par>
+                      </p:childTnLst>
+                    </p:cTn>
+                  </p:par>
+                  <p:par>
+                    <p:cTn id="21" fill="hold">
+                      <p:stCondLst>
+                        <p:cond delay="indefinite"/>
+                      </p:stCondLst>
+                      <p:childTnLst>
+                        <p:par>
+                          <p:cTn id="22" fill="hold">
+                            <p:stCondLst>
+                              <p:cond delay="0"/>
+                            </p:stCondLst>
+                            <p:childTnLst>
+                              <p:par>
+                                <p:cTn id="23" presetID="1" presetClass="entr" presetSubtype="0" fill="hold" grpId="0" nodeType="clickEffect">
+                                  <p:stCondLst>
+                                    <p:cond delay="0"/>
+                                  </p:stCondLst>
+                                  <p:childTnLst>
+                                    <p:set>
+                                      <p:cBhvr>
+                                        <p:cTn id="24" dur="1" fill="hold">
+                                          <p:stCondLst>
+                                            <p:cond delay="0"/>
+                                          </p:stCondLst>
+                                        </p:cTn>
+                                        <p:tgtEl>
+                                          <p:spTgt spid="9"/>
+                                        </p:tgtEl>
+                                        <p:attrNameLst>
+                                          <p:attrName>style.visibility</p:attrName>
+                                        </p:attrNameLst>
+                                      </p:cBhvr>
+                                      <p:to>
+                                        <p:strVal val="visible"/>
+                                      </p:to>
+                                    </p:set>
+                                  </p:childTnLst>
+                                </p:cTn>
+                              </p:par>
+                              <p:par>
+                                <p:cTn id="25" presetID="1" presetClass="entr" presetSubtype="0" fill="hold" grpId="0" nodeType="withEffect">
+                                  <p:stCondLst>
+                                    <p:cond delay="0"/>
+                                  </p:stCondLst>
+                                  <p:childTnLst>
+                                    <p:set>
+                                      <p:cBhvr>
+                                        <p:cTn id="26" dur="1" fill="hold">
+                                          <p:stCondLst>
+                                            <p:cond delay="0"/>
+                                          </p:stCondLst>
+                                        </p:cTn>
+                                        <p:tgtEl>
+                                          <p:spTgt spid="16"/>
+                                        </p:tgtEl>
+                                        <p:attrNameLst>
+                                          <p:attrName>style.visibility</p:attrName>
+                                        </p:attrNameLst>
+                                      </p:cBhvr>
+                                      <p:to>
+                                        <p:strVal val="visible"/>
+                                      </p:to>
+                                    </p:set>
+                                  </p:childTnLst>
+                                </p:cTn>
+                              </p:par>
+                            </p:childTnLst>
+                          </p:cTn>
+                        </p:par>
+                      </p:childTnLst>
+                    </p:cTn>
+                  </p:par>
+                  <p:par>
+                    <p:cTn id="27" fill="hold">
+                      <p:stCondLst>
+                        <p:cond delay="indefinite"/>
+                      </p:stCondLst>
+                      <p:childTnLst>
+                        <p:par>
+                          <p:cTn id="28" fill="hold">
+                            <p:stCondLst>
+                              <p:cond delay="0"/>
+                            </p:stCondLst>
+                            <p:childTnLst>
+                              <p:par>
+                                <p:cTn id="29" presetID="1" presetClass="entr" presetSubtype="0" fill="hold" grpId="0" nodeType="clickEffect">
+                                  <p:stCondLst>
+                                    <p:cond delay="0"/>
+                                  </p:stCondLst>
+                                  <p:childTnLst>
+                                    <p:set>
+                                      <p:cBhvr>
+                                        <p:cTn id="30" dur="1" fill="hold">
+                                          <p:stCondLst>
+                                            <p:cond delay="0"/>
+                                          </p:stCondLst>
+                                        </p:cTn>
+                                        <p:tgtEl>
+                                          <p:spTgt spid="17"/>
+                                        </p:tgtEl>
+                                        <p:attrNameLst>
+                                          <p:attrName>style.visibility</p:attrName>
+                                        </p:attrNameLst>
+                                      </p:cBhvr>
+                                      <p:to>
+                                        <p:strVal val="visible"/>
+                                      </p:to>
+                                    </p:set>
+                                  </p:childTnLst>
+                                </p:cTn>
+                              </p:par>
+                              <p:par>
+                                <p:cTn id="31" presetID="1" presetClass="entr" presetSubtype="0" fill="hold" grpId="0" nodeType="withEffect">
+                                  <p:stCondLst>
+                                    <p:cond delay="0"/>
+                                  </p:stCondLst>
+                                  <p:childTnLst>
+                                    <p:set>
+                                      <p:cBhvr>
+                                        <p:cTn id="32" dur="1" fill="hold">
+                                          <p:stCondLst>
+                                            <p:cond delay="0"/>
+                                          </p:stCondLst>
+                                        </p:cTn>
+                                        <p:tgtEl>
+                                          <p:spTgt spid="18"/>
+                                        </p:tgtEl>
+                                        <p:attrNameLst>
+                                          <p:attrName>style.visibility</p:attrName>
+                                        </p:attrNameLst>
+                                      </p:cBhvr>
+                                      <p:to>
+                                        <p:strVal val="visible"/>
+                                      </p:to>
+                                    </p:set>
+                                  </p:childTnLst>
+                                </p:cTn>
+                              </p:par>
+                            </p:childTnLst>
+                          </p:cTn>
+                        </p:par>
+                      </p:childTnLst>
+                    </p:cTn>
+                  </p:par>
+                </p:childTnLst>
+              </p:cTn>
+              <p:prevCondLst>
+                <p:cond evt="onPrev" delay="0">
+                  <p:tgtEl>
+                    <p:sldTgt/>
+                  </p:tgtEl>
+                </p:cond>
+              </p:prevCondLst>
+              <p:nextCondLst>
+                <p:cond evt="onNext" delay="0">
+                  <p:tgtEl>
+                    <p:sldTgt/>
+                  </p:tgtEl>
+                </p:cond>
+              </p:nextCondLst>
+            </p:seq>
+          </p:childTnLst>
+        </p:cTn>
+      </p:par>
+    </p:tnLst>
+    <p:bldLst>
+      <p:bldP spid="6" grpId="0" animBg="1"/>
+      <p:bldP spid="7" grpId="0" animBg="1"/>
+      <p:bldP spid="8" grpId="0" animBg="1"/>
+      <p:bldP spid="9" grpId="0" animBg="1"/>
+      <p:bldP spid="11" grpId="0"/>
+      <p:bldP spid="13" grpId="0"/>
+      <p:bldP spid="14" grpId="0"/>
+      <p:bldP spid="16" grpId="0"/>
+      <p:bldP spid="17" grpId="0" animBg="1"/>
+      <p:bldP spid="18" grpId="0"/>
+    </p:bldLst>
+  </p:timing>
+</p:sld>
+</file>
+
+<file path=ppt/slides/slide18.xml><?xml version="1.0" encoding="utf-8"?>
+<p:sld xmlns:a="http://schemas.openxmlformats.org/drawingml/2006/main" xmlns:r="http://schemas.openxmlformats.org/officeDocument/2006/relationships" xmlns:p="http://schemas.openxmlformats.org/presentationml/2006/main">
+  <p:cSld>
+    <p:spTree>
+      <p:nvGrpSpPr>
+        <p:cNvPr id="1" name=""/>
+        <p:cNvGrpSpPr/>
+        <p:nvPr/>
+      </p:nvGrpSpPr>
+      <p:grpSpPr>
+        <a:xfrm>
+          <a:off x="0" y="0"/>
+          <a:ext cx="0" cy="0"/>
+          <a:chOff x="0" y="0"/>
+          <a:chExt cx="0" cy="0"/>
+        </a:xfrm>
+      </p:grpSpPr>
       <p:pic>
         <p:nvPicPr>
           <p:cNvPr id="4" name="Content Placeholder 3"/>
@@ -16569,7 +17791,7 @@
 </p:sld>
 </file>
 
-<file path=ppt/slides/slide18.xml><?xml version="1.0" encoding="utf-8"?>
+<file path=ppt/slides/slide19.xml><?xml version="1.0" encoding="utf-8"?>
 <p:sld xmlns:a="http://schemas.openxmlformats.org/drawingml/2006/main" xmlns:r="http://schemas.openxmlformats.org/officeDocument/2006/relationships" xmlns:p="http://schemas.openxmlformats.org/presentationml/2006/main">
   <p:cSld>
     <p:spTree>
@@ -16642,95 +17864,6 @@
     <p:extLst>
       <p:ext uri="{BB962C8B-B14F-4D97-AF65-F5344CB8AC3E}">
         <p14:creationId xmlns:p14="http://schemas.microsoft.com/office/powerpoint/2010/main" val="828338453"/>
-      </p:ext>
-    </p:extLst>
-  </p:cSld>
-  <p:clrMapOvr>
-    <a:masterClrMapping/>
-  </p:clrMapOvr>
-  <p:timing>
-    <p:tnLst>
-      <p:par>
-        <p:cTn id="1" dur="indefinite" restart="never" nodeType="tmRoot"/>
-      </p:par>
-    </p:tnLst>
-  </p:timing>
-</p:sld>
-</file>
-
-<file path=ppt/slides/slide19.xml><?xml version="1.0" encoding="utf-8"?>
-<p:sld xmlns:a="http://schemas.openxmlformats.org/drawingml/2006/main" xmlns:r="http://schemas.openxmlformats.org/officeDocument/2006/relationships" xmlns:p="http://schemas.openxmlformats.org/presentationml/2006/main">
-  <p:cSld>
-    <p:spTree>
-      <p:nvGrpSpPr>
-        <p:cNvPr id="1" name=""/>
-        <p:cNvGrpSpPr/>
-        <p:nvPr/>
-      </p:nvGrpSpPr>
-      <p:grpSpPr>
-        <a:xfrm>
-          <a:off x="0" y="0"/>
-          <a:ext cx="0" cy="0"/>
-          <a:chOff x="0" y="0"/>
-          <a:chExt cx="0" cy="0"/>
-        </a:xfrm>
-      </p:grpSpPr>
-      <p:pic>
-        <p:nvPicPr>
-          <p:cNvPr id="4" name="Content Placeholder 3"/>
-          <p:cNvPicPr>
-            <a:picLocks noGrp="1" noChangeAspect="1"/>
-          </p:cNvPicPr>
-          <p:nvPr>
-            <p:ph idx="1"/>
-          </p:nvPr>
-        </p:nvPicPr>
-        <p:blipFill>
-          <a:blip r:embed="rId3">
-            <a:extLst>
-              <a:ext uri="{28A0092B-C50C-407E-A947-70E740481C1C}">
-                <a14:useLocalDpi xmlns:a14="http://schemas.microsoft.com/office/drawing/2010/main" val="0"/>
-              </a:ext>
-            </a:extLst>
-          </a:blip>
-          <a:stretch>
-            <a:fillRect/>
-          </a:stretch>
-        </p:blipFill>
-        <p:spPr>
-          <a:xfrm>
-            <a:off x="0" y="-9144"/>
-            <a:ext cx="12192000" cy="6876288"/>
-          </a:xfrm>
-        </p:spPr>
-      </p:pic>
-      <p:sp>
-        <p:nvSpPr>
-          <p:cNvPr id="3" name="Title 2"/>
-          <p:cNvSpPr>
-            <a:spLocks noGrp="1"/>
-          </p:cNvSpPr>
-          <p:nvPr>
-            <p:ph type="title"/>
-          </p:nvPr>
-        </p:nvSpPr>
-        <p:spPr/>
-        <p:txBody>
-          <a:bodyPr/>
-          <a:lstStyle/>
-          <a:p>
-            <a:r>
-              <a:rPr lang="en-US" dirty="0" smtClean="0"/>
-              <a:t>First team goal: own your destiny</a:t>
-            </a:r>
-            <a:endParaRPr lang="en-US" dirty="0"/>
-          </a:p>
-        </p:txBody>
-      </p:sp>
-    </p:spTree>
-    <p:extLst>
-      <p:ext uri="{BB962C8B-B14F-4D97-AF65-F5344CB8AC3E}">
-        <p14:creationId xmlns:p14="http://schemas.microsoft.com/office/powerpoint/2010/main" val="3365956542"/>
       </p:ext>
     </p:extLst>
   </p:cSld>
@@ -16864,6 +17997,95 @@
           </p:nvPr>
         </p:nvPicPr>
         <p:blipFill>
+          <a:blip r:embed="rId3">
+            <a:extLst>
+              <a:ext uri="{28A0092B-C50C-407E-A947-70E740481C1C}">
+                <a14:useLocalDpi xmlns:a14="http://schemas.microsoft.com/office/drawing/2010/main" val="0"/>
+              </a:ext>
+            </a:extLst>
+          </a:blip>
+          <a:stretch>
+            <a:fillRect/>
+          </a:stretch>
+        </p:blipFill>
+        <p:spPr>
+          <a:xfrm>
+            <a:off x="0" y="-9144"/>
+            <a:ext cx="12192000" cy="6876288"/>
+          </a:xfrm>
+        </p:spPr>
+      </p:pic>
+      <p:sp>
+        <p:nvSpPr>
+          <p:cNvPr id="3" name="Title 2"/>
+          <p:cNvSpPr>
+            <a:spLocks noGrp="1"/>
+          </p:cNvSpPr>
+          <p:nvPr>
+            <p:ph type="title"/>
+          </p:nvPr>
+        </p:nvSpPr>
+        <p:spPr/>
+        <p:txBody>
+          <a:bodyPr/>
+          <a:lstStyle/>
+          <a:p>
+            <a:r>
+              <a:rPr lang="en-US" dirty="0" smtClean="0"/>
+              <a:t>First team goal: own your destiny</a:t>
+            </a:r>
+            <a:endParaRPr lang="en-US" dirty="0"/>
+          </a:p>
+        </p:txBody>
+      </p:sp>
+    </p:spTree>
+    <p:extLst>
+      <p:ext uri="{BB962C8B-B14F-4D97-AF65-F5344CB8AC3E}">
+        <p14:creationId xmlns:p14="http://schemas.microsoft.com/office/powerpoint/2010/main" val="3365956542"/>
+      </p:ext>
+    </p:extLst>
+  </p:cSld>
+  <p:clrMapOvr>
+    <a:masterClrMapping/>
+  </p:clrMapOvr>
+  <p:timing>
+    <p:tnLst>
+      <p:par>
+        <p:cTn id="1" dur="indefinite" restart="never" nodeType="tmRoot"/>
+      </p:par>
+    </p:tnLst>
+  </p:timing>
+</p:sld>
+</file>
+
+<file path=ppt/slides/slide21.xml><?xml version="1.0" encoding="utf-8"?>
+<p:sld xmlns:a="http://schemas.openxmlformats.org/drawingml/2006/main" xmlns:r="http://schemas.openxmlformats.org/officeDocument/2006/relationships" xmlns:p="http://schemas.openxmlformats.org/presentationml/2006/main">
+  <p:cSld>
+    <p:spTree>
+      <p:nvGrpSpPr>
+        <p:cNvPr id="1" name=""/>
+        <p:cNvGrpSpPr/>
+        <p:nvPr/>
+      </p:nvGrpSpPr>
+      <p:grpSpPr>
+        <a:xfrm>
+          <a:off x="0" y="0"/>
+          <a:ext cx="0" cy="0"/>
+          <a:chOff x="0" y="0"/>
+          <a:chExt cx="0" cy="0"/>
+        </a:xfrm>
+      </p:grpSpPr>
+      <p:pic>
+        <p:nvPicPr>
+          <p:cNvPr id="4" name="Content Placeholder 3"/>
+          <p:cNvPicPr>
+            <a:picLocks noGrp="1" noChangeAspect="1"/>
+          </p:cNvPicPr>
+          <p:nvPr>
+            <p:ph idx="1"/>
+          </p:nvPr>
+        </p:nvPicPr>
+        <p:blipFill>
           <a:blip r:embed="rId2" cstate="print">
             <a:extLst>
               <a:ext uri="{28A0092B-C50C-407E-A947-70E740481C1C}">
@@ -16925,7 +18147,7 @@
 </p:sld>
 </file>
 
-<file path=ppt/slides/slide21.xml><?xml version="1.0" encoding="utf-8"?>
+<file path=ppt/slides/slide22.xml><?xml version="1.0" encoding="utf-8"?>
 <p:sld xmlns:a="http://schemas.openxmlformats.org/drawingml/2006/main" xmlns:r="http://schemas.openxmlformats.org/officeDocument/2006/relationships" xmlns:p="http://schemas.openxmlformats.org/presentationml/2006/main">
   <p:cSld>
     <p:spTree>
@@ -17014,7 +18236,7 @@
 </p:sld>
 </file>
 
-<file path=ppt/slides/slide22.xml><?xml version="1.0" encoding="utf-8"?>
+<file path=ppt/slides/slide23.xml><?xml version="1.0" encoding="utf-8"?>
 <p:sld xmlns:a="http://schemas.openxmlformats.org/drawingml/2006/main" xmlns:r="http://schemas.openxmlformats.org/officeDocument/2006/relationships" xmlns:p="http://schemas.openxmlformats.org/presentationml/2006/main">
   <p:cSld>
     <p:spTree>
@@ -17140,7 +18362,7 @@
 </p:sld>
 </file>
 
-<file path=ppt/slides/slide23.xml><?xml version="1.0" encoding="utf-8"?>
+<file path=ppt/slides/slide24.xml><?xml version="1.0" encoding="utf-8"?>
 <p:sld xmlns:a="http://schemas.openxmlformats.org/drawingml/2006/main" xmlns:r="http://schemas.openxmlformats.org/officeDocument/2006/relationships" xmlns:p="http://schemas.openxmlformats.org/presentationml/2006/main">
   <p:cSld>
     <p:spTree>
@@ -17260,7 +18482,7 @@
 </p:sld>
 </file>
 
-<file path=ppt/slides/slide24.xml><?xml version="1.0" encoding="utf-8"?>
+<file path=ppt/slides/slide25.xml><?xml version="1.0" encoding="utf-8"?>
 <p:sld xmlns:a="http://schemas.openxmlformats.org/drawingml/2006/main" xmlns:r="http://schemas.openxmlformats.org/officeDocument/2006/relationships" xmlns:p="http://schemas.openxmlformats.org/presentationml/2006/main">
   <p:cSld>
     <p:spTree>
@@ -18530,7 +19752,7 @@
 </p:sld>
 </file>
 
-<file path=ppt/slides/slide25.xml><?xml version="1.0" encoding="utf-8"?>
+<file path=ppt/slides/slide26.xml><?xml version="1.0" encoding="utf-8"?>
 <p:sld xmlns:a="http://schemas.openxmlformats.org/drawingml/2006/main" xmlns:r="http://schemas.openxmlformats.org/officeDocument/2006/relationships" xmlns:p="http://schemas.openxmlformats.org/presentationml/2006/main">
   <p:cSld>
     <p:spTree>

</xml_diff>

<commit_message>
Put title slide also at end.
</commit_message>
<xml_diff>
--- a/first 2 years/Your first 5 days and 2 years of Agile.pptx
+++ b/first 2 years/Your first 5 days and 2 years of Agile.pptx
@@ -5,7 +5,7 @@
     <p:sldMasterId id="2147483648" r:id="rId1"/>
   </p:sldMasterIdLst>
   <p:notesMasterIdLst>
-    <p:notesMasterId r:id="rId28"/>
+    <p:notesMasterId r:id="rId29"/>
   </p:notesMasterIdLst>
   <p:sldIdLst>
     <p:sldId id="256" r:id="rId2"/>
@@ -34,6 +34,7 @@
     <p:sldId id="269" r:id="rId25"/>
     <p:sldId id="274" r:id="rId26"/>
     <p:sldId id="281" r:id="rId27"/>
+    <p:sldId id="284" r:id="rId28"/>
   </p:sldIdLst>
   <p:sldSz cx="12192000" cy="6858000"/>
   <p:notesSz cx="6858000" cy="9144000"/>
@@ -20134,6 +20135,220 @@
 </p:sld>
 </file>
 
+<file path=ppt/slides/slide27.xml><?xml version="1.0" encoding="utf-8"?>
+<p:sld xmlns:a="http://schemas.openxmlformats.org/drawingml/2006/main" xmlns:r="http://schemas.openxmlformats.org/officeDocument/2006/relationships" xmlns:p="http://schemas.openxmlformats.org/presentationml/2006/main">
+  <p:cSld>
+    <p:spTree>
+      <p:nvGrpSpPr>
+        <p:cNvPr id="1" name=""/>
+        <p:cNvGrpSpPr/>
+        <p:nvPr/>
+      </p:nvGrpSpPr>
+      <p:grpSpPr>
+        <a:xfrm>
+          <a:off x="0" y="0"/>
+          <a:ext cx="0" cy="0"/>
+          <a:chOff x="0" y="0"/>
+          <a:chExt cx="0" cy="0"/>
+        </a:xfrm>
+      </p:grpSpPr>
+      <p:pic>
+        <p:nvPicPr>
+          <p:cNvPr id="4" name="Content Placeholder 1"/>
+          <p:cNvPicPr>
+            <a:picLocks noChangeAspect="1"/>
+          </p:cNvPicPr>
+          <p:nvPr/>
+        </p:nvPicPr>
+        <p:blipFill>
+          <a:blip r:embed="rId2">
+            <a:extLst>
+              <a:ext uri="{28A0092B-C50C-407E-A947-70E740481C1C}">
+                <a14:useLocalDpi xmlns:a14="http://schemas.microsoft.com/office/drawing/2010/main" val="0"/>
+              </a:ext>
+            </a:extLst>
+          </a:blip>
+          <a:stretch>
+            <a:fillRect/>
+          </a:stretch>
+        </p:blipFill>
+        <p:spPr>
+          <a:xfrm>
+            <a:off x="0" y="0"/>
+            <a:ext cx="12192000" cy="6858000"/>
+          </a:xfrm>
+          <a:prstGeom prst="rect">
+            <a:avLst/>
+          </a:prstGeom>
+        </p:spPr>
+      </p:pic>
+      <p:sp>
+        <p:nvSpPr>
+          <p:cNvPr id="5" name="TextBox 4"/>
+          <p:cNvSpPr txBox="1"/>
+          <p:nvPr/>
+        </p:nvSpPr>
+        <p:spPr>
+          <a:xfrm>
+            <a:off x="983226" y="6385635"/>
+            <a:ext cx="8302273" cy="369332"/>
+          </a:xfrm>
+          <a:prstGeom prst="rect">
+            <a:avLst/>
+          </a:prstGeom>
+          <a:noFill/>
+        </p:spPr>
+        <p:txBody>
+          <a:bodyPr wrap="none" rtlCol="0">
+            <a:spAutoFit/>
+          </a:bodyPr>
+          <a:lstStyle/>
+          <a:p>
+            <a:r>
+              <a:rPr lang="en-US" dirty="0">
+                <a:latin typeface="Candara" panose="020E0502030303020204" pitchFamily="34" charset="0"/>
+              </a:rPr>
+              <a:t>http://arlobelshee.github.io/AgileEngineeringFluency/Stages_of_practice_map.html</a:t>
+            </a:r>
+          </a:p>
+        </p:txBody>
+      </p:sp>
+      <p:sp>
+        <p:nvSpPr>
+          <p:cNvPr id="6" name="Rectangle 5"/>
+          <p:cNvSpPr/>
+          <p:nvPr/>
+        </p:nvSpPr>
+        <p:spPr>
+          <a:xfrm>
+            <a:off x="0" y="0"/>
+            <a:ext cx="12192000" cy="6858000"/>
+          </a:xfrm>
+          <a:prstGeom prst="rect">
+            <a:avLst/>
+          </a:prstGeom>
+          <a:solidFill>
+            <a:srgbClr val="FFFFFF">
+              <a:alpha val="81961"/>
+            </a:srgbClr>
+          </a:solidFill>
+        </p:spPr>
+        <p:style>
+          <a:lnRef idx="2">
+            <a:schemeClr val="accent1">
+              <a:shade val="50000"/>
+            </a:schemeClr>
+          </a:lnRef>
+          <a:fillRef idx="1">
+            <a:schemeClr val="accent1"/>
+          </a:fillRef>
+          <a:effectRef idx="0">
+            <a:schemeClr val="accent1"/>
+          </a:effectRef>
+          <a:fontRef idx="minor">
+            <a:schemeClr val="lt1"/>
+          </a:fontRef>
+        </p:style>
+        <p:txBody>
+          <a:bodyPr rtlCol="0" anchor="ctr"/>
+          <a:lstStyle/>
+          <a:p>
+            <a:pPr algn="ctr"/>
+            <a:endParaRPr lang="en-US"/>
+          </a:p>
+        </p:txBody>
+      </p:sp>
+      <p:sp>
+        <p:nvSpPr>
+          <p:cNvPr id="2" name="Title 1"/>
+          <p:cNvSpPr>
+            <a:spLocks noGrp="1"/>
+          </p:cNvSpPr>
+          <p:nvPr>
+            <p:ph type="ctrTitle"/>
+          </p:nvPr>
+        </p:nvSpPr>
+        <p:spPr/>
+        <p:txBody>
+          <a:bodyPr/>
+          <a:lstStyle/>
+          <a:p>
+            <a:r>
+              <a:rPr lang="en-US" dirty="0" smtClean="0"/>
+              <a:t>Adopting Agile via Continuous Improvement</a:t>
+            </a:r>
+            <a:endParaRPr lang="en-US" dirty="0"/>
+          </a:p>
+        </p:txBody>
+      </p:sp>
+      <p:sp>
+        <p:nvSpPr>
+          <p:cNvPr id="3" name="Subtitle 2"/>
+          <p:cNvSpPr>
+            <a:spLocks noGrp="1"/>
+          </p:cNvSpPr>
+          <p:nvPr>
+            <p:ph type="subTitle" idx="1"/>
+          </p:nvPr>
+        </p:nvSpPr>
+        <p:spPr/>
+        <p:txBody>
+          <a:bodyPr>
+            <a:normAutofit lnSpcReduction="10000"/>
+          </a:bodyPr>
+          <a:lstStyle/>
+          <a:p>
+            <a:r>
+              <a:rPr lang="en-US" dirty="0" smtClean="0"/>
+              <a:t>Your first 5 days and 2 years</a:t>
+            </a:r>
+          </a:p>
+          <a:p>
+            <a:endParaRPr lang="en-US" dirty="0"/>
+          </a:p>
+          <a:p>
+            <a:r>
+              <a:rPr lang="en-US" dirty="0" smtClean="0"/>
+              <a:t>Arlo Belshee</a:t>
+            </a:r>
+          </a:p>
+          <a:p>
+            <a:r>
+              <a:rPr lang="en-US" dirty="0" smtClean="0"/>
+              <a:t>@</a:t>
+            </a:r>
+            <a:r>
+              <a:rPr lang="en-US" dirty="0" err="1" smtClean="0"/>
+              <a:t>arlobelshee</a:t>
+            </a:r>
+            <a:r>
+              <a:rPr lang="en-US" dirty="0" smtClean="0"/>
+              <a:t>, http://arlobelshee.com/</a:t>
+            </a:r>
+            <a:endParaRPr lang="en-US" dirty="0"/>
+          </a:p>
+        </p:txBody>
+      </p:sp>
+    </p:spTree>
+    <p:extLst>
+      <p:ext uri="{BB962C8B-B14F-4D97-AF65-F5344CB8AC3E}">
+        <p14:creationId xmlns:p14="http://schemas.microsoft.com/office/powerpoint/2010/main" val="3004472656"/>
+      </p:ext>
+    </p:extLst>
+  </p:cSld>
+  <p:clrMapOvr>
+    <a:masterClrMapping/>
+  </p:clrMapOvr>
+  <p:timing>
+    <p:tnLst>
+      <p:par>
+        <p:cTn id="1" dur="indefinite" restart="never" nodeType="tmRoot"/>
+      </p:par>
+    </p:tnLst>
+  </p:timing>
+</p:sld>
+</file>
+
 <file path=ppt/slides/slide3.xml><?xml version="1.0" encoding="utf-8"?>
 <p:sld xmlns:a="http://schemas.openxmlformats.org/drawingml/2006/main" xmlns:r="http://schemas.openxmlformats.org/officeDocument/2006/relationships" xmlns:p="http://schemas.openxmlformats.org/presentationml/2006/main">
   <p:cSld>

</xml_diff>

<commit_message>
Added slide about building the wrong thing.
</commit_message>
<xml_diff>
--- a/first 2 years/Your first 5 days and 2 years of Agile.pptx
+++ b/first 2 years/Your first 5 days and 2 years of Agile.pptx
@@ -5,7 +5,7 @@
     <p:sldMasterId id="2147483648" r:id="rId1"/>
   </p:sldMasterIdLst>
   <p:notesMasterIdLst>
-    <p:notesMasterId r:id="rId29"/>
+    <p:notesMasterId r:id="rId30"/>
   </p:notesMasterIdLst>
   <p:sldIdLst>
     <p:sldId id="256" r:id="rId2"/>
@@ -13,28 +13,29 @@
     <p:sldId id="280" r:id="rId4"/>
     <p:sldId id="259" r:id="rId5"/>
     <p:sldId id="258" r:id="rId6"/>
-    <p:sldId id="282" r:id="rId7"/>
-    <p:sldId id="260" r:id="rId8"/>
-    <p:sldId id="262" r:id="rId9"/>
-    <p:sldId id="276" r:id="rId10"/>
-    <p:sldId id="267" r:id="rId11"/>
-    <p:sldId id="264" r:id="rId12"/>
-    <p:sldId id="266" r:id="rId13"/>
-    <p:sldId id="261" r:id="rId14"/>
-    <p:sldId id="273" r:id="rId15"/>
-    <p:sldId id="265" r:id="rId16"/>
-    <p:sldId id="279" r:id="rId17"/>
-    <p:sldId id="283" r:id="rId18"/>
-    <p:sldId id="263" r:id="rId19"/>
-    <p:sldId id="272" r:id="rId20"/>
-    <p:sldId id="278" r:id="rId21"/>
-    <p:sldId id="277" r:id="rId22"/>
-    <p:sldId id="275" r:id="rId23"/>
-    <p:sldId id="268" r:id="rId24"/>
-    <p:sldId id="269" r:id="rId25"/>
-    <p:sldId id="274" r:id="rId26"/>
-    <p:sldId id="281" r:id="rId27"/>
-    <p:sldId id="284" r:id="rId28"/>
+    <p:sldId id="285" r:id="rId7"/>
+    <p:sldId id="282" r:id="rId8"/>
+    <p:sldId id="260" r:id="rId9"/>
+    <p:sldId id="262" r:id="rId10"/>
+    <p:sldId id="276" r:id="rId11"/>
+    <p:sldId id="267" r:id="rId12"/>
+    <p:sldId id="264" r:id="rId13"/>
+    <p:sldId id="266" r:id="rId14"/>
+    <p:sldId id="261" r:id="rId15"/>
+    <p:sldId id="273" r:id="rId16"/>
+    <p:sldId id="265" r:id="rId17"/>
+    <p:sldId id="279" r:id="rId18"/>
+    <p:sldId id="283" r:id="rId19"/>
+    <p:sldId id="263" r:id="rId20"/>
+    <p:sldId id="272" r:id="rId21"/>
+    <p:sldId id="278" r:id="rId22"/>
+    <p:sldId id="277" r:id="rId23"/>
+    <p:sldId id="275" r:id="rId24"/>
+    <p:sldId id="268" r:id="rId25"/>
+    <p:sldId id="269" r:id="rId26"/>
+    <p:sldId id="274" r:id="rId27"/>
+    <p:sldId id="281" r:id="rId28"/>
+    <p:sldId id="284" r:id="rId29"/>
   </p:sldIdLst>
   <p:sldSz cx="12192000" cy="6858000"/>
   <p:notesSz cx="6858000" cy="9144000"/>
@@ -4074,363 +4075,6 @@
       <dsp:cNvGrpSpPr/>
     </dsp:nvGrpSpPr>
     <dsp:grpSpPr/>
-    <dsp:sp modelId="{E2E21D3C-A227-4D62-B58E-1D4C9B78DF70}">
-      <dsp:nvSpPr>
-        <dsp:cNvPr id="0" name=""/>
-        <dsp:cNvSpPr/>
-      </dsp:nvSpPr>
-      <dsp:spPr>
-        <a:xfrm>
-          <a:off x="3680911" y="-142860"/>
-          <a:ext cx="4830176" cy="4830176"/>
-        </a:xfrm>
-        <a:prstGeom prst="circularArrow">
-          <a:avLst>
-            <a:gd name="adj1" fmla="val 4668"/>
-            <a:gd name="adj2" fmla="val 272909"/>
-            <a:gd name="adj3" fmla="val 12781078"/>
-            <a:gd name="adj4" fmla="val 18065342"/>
-            <a:gd name="adj5" fmla="val 4847"/>
-          </a:avLst>
-        </a:prstGeom>
-        <a:solidFill>
-          <a:schemeClr val="accent2">
-            <a:tint val="40000"/>
-            <a:hueOff val="0"/>
-            <a:satOff val="0"/>
-            <a:lumOff val="0"/>
-            <a:alphaOff val="0"/>
-          </a:schemeClr>
-        </a:solidFill>
-        <a:ln>
-          <a:noFill/>
-        </a:ln>
-        <a:effectLst/>
-      </dsp:spPr>
-      <dsp:style>
-        <a:lnRef idx="0">
-          <a:scrgbClr r="0" g="0" b="0"/>
-        </a:lnRef>
-        <a:fillRef idx="1">
-          <a:scrgbClr r="0" g="0" b="0"/>
-        </a:fillRef>
-        <a:effectRef idx="0">
-          <a:scrgbClr r="0" g="0" b="0"/>
-        </a:effectRef>
-        <a:fontRef idx="minor"/>
-      </dsp:style>
-    </dsp:sp>
-    <dsp:sp modelId="{06C35201-03B6-4889-91BD-E4A1227F0D71}">
-      <dsp:nvSpPr>
-        <dsp:cNvPr id="0" name=""/>
-        <dsp:cNvSpPr/>
-      </dsp:nvSpPr>
-      <dsp:spPr>
-        <a:xfrm>
-          <a:off x="4467820" y="568"/>
-          <a:ext cx="3256359" cy="1628179"/>
-        </a:xfrm>
-        <a:prstGeom prst="roundRect">
-          <a:avLst/>
-        </a:prstGeom>
-        <a:solidFill>
-          <a:schemeClr val="accent2">
-            <a:hueOff val="0"/>
-            <a:satOff val="0"/>
-            <a:lumOff val="0"/>
-            <a:alphaOff val="0"/>
-          </a:schemeClr>
-        </a:solidFill>
-        <a:ln w="12700" cap="flat" cmpd="sng" algn="ctr">
-          <a:solidFill>
-            <a:schemeClr val="lt1">
-              <a:hueOff val="0"/>
-              <a:satOff val="0"/>
-              <a:lumOff val="0"/>
-              <a:alphaOff val="0"/>
-            </a:schemeClr>
-          </a:solidFill>
-          <a:prstDash val="solid"/>
-          <a:miter lim="800000"/>
-        </a:ln>
-        <a:effectLst/>
-      </dsp:spPr>
-      <dsp:style>
-        <a:lnRef idx="2">
-          <a:scrgbClr r="0" g="0" b="0"/>
-        </a:lnRef>
-        <a:fillRef idx="1">
-          <a:scrgbClr r="0" g="0" b="0"/>
-        </a:fillRef>
-        <a:effectRef idx="0">
-          <a:scrgbClr r="0" g="0" b="0"/>
-        </a:effectRef>
-        <a:fontRef idx="minor">
-          <a:schemeClr val="lt1"/>
-        </a:fontRef>
-      </dsp:style>
-      <dsp:txBody>
-        <a:bodyPr spcFirstLastPara="0" vert="horz" wrap="square" lIns="156210" tIns="156210" rIns="156210" bIns="156210" numCol="1" spcCol="1270" anchor="ctr" anchorCtr="0">
-          <a:noAutofit/>
-        </a:bodyPr>
-        <a:lstStyle/>
-        <a:p>
-          <a:pPr lvl="0" algn="ctr" defTabSz="1822450">
-            <a:lnSpc>
-              <a:spcPct val="90000"/>
-            </a:lnSpc>
-            <a:spcBef>
-              <a:spcPct val="0"/>
-            </a:spcBef>
-            <a:spcAft>
-              <a:spcPct val="35000"/>
-            </a:spcAft>
-          </a:pPr>
-          <a:r>
-            <a:rPr lang="en-US" sz="4100" kern="1200" dirty="0" smtClean="0"/>
-            <a:t>Concrete Experience</a:t>
-          </a:r>
-        </a:p>
-      </dsp:txBody>
-      <dsp:txXfrm>
-        <a:off x="4547301" y="80049"/>
-        <a:ext cx="3097397" cy="1469217"/>
-      </dsp:txXfrm>
-    </dsp:sp>
-    <dsp:sp modelId="{B2109BE3-B2CD-484F-AD64-A375DFBF5285}">
-      <dsp:nvSpPr>
-        <dsp:cNvPr id="0" name=""/>
-        <dsp:cNvSpPr/>
-      </dsp:nvSpPr>
-      <dsp:spPr>
-        <a:xfrm>
-          <a:off x="6202174" y="1734923"/>
-          <a:ext cx="3256359" cy="1628179"/>
-        </a:xfrm>
-        <a:prstGeom prst="roundRect">
-          <a:avLst/>
-        </a:prstGeom>
-        <a:solidFill>
-          <a:schemeClr val="accent3">
-            <a:hueOff val="0"/>
-            <a:satOff val="0"/>
-            <a:lumOff val="0"/>
-            <a:alphaOff val="0"/>
-          </a:schemeClr>
-        </a:solidFill>
-        <a:ln w="12700" cap="flat" cmpd="sng" algn="ctr">
-          <a:solidFill>
-            <a:schemeClr val="lt1">
-              <a:hueOff val="0"/>
-              <a:satOff val="0"/>
-              <a:lumOff val="0"/>
-              <a:alphaOff val="0"/>
-            </a:schemeClr>
-          </a:solidFill>
-          <a:prstDash val="solid"/>
-          <a:miter lim="800000"/>
-        </a:ln>
-        <a:effectLst/>
-      </dsp:spPr>
-      <dsp:style>
-        <a:lnRef idx="2">
-          <a:scrgbClr r="0" g="0" b="0"/>
-        </a:lnRef>
-        <a:fillRef idx="1">
-          <a:scrgbClr r="0" g="0" b="0"/>
-        </a:fillRef>
-        <a:effectRef idx="0">
-          <a:scrgbClr r="0" g="0" b="0"/>
-        </a:effectRef>
-        <a:fontRef idx="minor">
-          <a:schemeClr val="lt1"/>
-        </a:fontRef>
-      </dsp:style>
-      <dsp:txBody>
-        <a:bodyPr spcFirstLastPara="0" vert="horz" wrap="square" lIns="156210" tIns="156210" rIns="156210" bIns="156210" numCol="1" spcCol="1270" anchor="ctr" anchorCtr="0">
-          <a:noAutofit/>
-        </a:bodyPr>
-        <a:lstStyle/>
-        <a:p>
-          <a:pPr lvl="0" algn="ctr" defTabSz="1822450">
-            <a:lnSpc>
-              <a:spcPct val="90000"/>
-            </a:lnSpc>
-            <a:spcBef>
-              <a:spcPct val="0"/>
-            </a:spcBef>
-            <a:spcAft>
-              <a:spcPct val="35000"/>
-            </a:spcAft>
-          </a:pPr>
-          <a:r>
-            <a:rPr lang="en-US" sz="4100" kern="1200" dirty="0" smtClean="0"/>
-            <a:t>Reflective Observation</a:t>
-          </a:r>
-          <a:endParaRPr lang="en-US" sz="4100" kern="1200" dirty="0"/>
-        </a:p>
-      </dsp:txBody>
-      <dsp:txXfrm>
-        <a:off x="6281655" y="1814404"/>
-        <a:ext cx="3097397" cy="1469217"/>
-      </dsp:txXfrm>
-    </dsp:sp>
-    <dsp:sp modelId="{F3753940-E6E3-4DFA-AFFF-0D2B458135DE}">
-      <dsp:nvSpPr>
-        <dsp:cNvPr id="0" name=""/>
-        <dsp:cNvSpPr/>
-      </dsp:nvSpPr>
-      <dsp:spPr>
-        <a:xfrm>
-          <a:off x="4467820" y="3469277"/>
-          <a:ext cx="3256359" cy="1628179"/>
-        </a:xfrm>
-        <a:prstGeom prst="roundRect">
-          <a:avLst/>
-        </a:prstGeom>
-        <a:solidFill>
-          <a:schemeClr val="accent4">
-            <a:hueOff val="0"/>
-            <a:satOff val="0"/>
-            <a:lumOff val="0"/>
-            <a:alphaOff val="0"/>
-          </a:schemeClr>
-        </a:solidFill>
-        <a:ln w="12700" cap="flat" cmpd="sng" algn="ctr">
-          <a:solidFill>
-            <a:schemeClr val="lt1">
-              <a:hueOff val="0"/>
-              <a:satOff val="0"/>
-              <a:lumOff val="0"/>
-              <a:alphaOff val="0"/>
-            </a:schemeClr>
-          </a:solidFill>
-          <a:prstDash val="solid"/>
-          <a:miter lim="800000"/>
-        </a:ln>
-        <a:effectLst/>
-      </dsp:spPr>
-      <dsp:style>
-        <a:lnRef idx="2">
-          <a:scrgbClr r="0" g="0" b="0"/>
-        </a:lnRef>
-        <a:fillRef idx="1">
-          <a:scrgbClr r="0" g="0" b="0"/>
-        </a:fillRef>
-        <a:effectRef idx="0">
-          <a:scrgbClr r="0" g="0" b="0"/>
-        </a:effectRef>
-        <a:fontRef idx="minor">
-          <a:schemeClr val="lt1"/>
-        </a:fontRef>
-      </dsp:style>
-      <dsp:txBody>
-        <a:bodyPr spcFirstLastPara="0" vert="horz" wrap="square" lIns="156210" tIns="156210" rIns="156210" bIns="156210" numCol="1" spcCol="1270" anchor="ctr" anchorCtr="0">
-          <a:noAutofit/>
-        </a:bodyPr>
-        <a:lstStyle/>
-        <a:p>
-          <a:pPr lvl="0" algn="ctr" defTabSz="1822450">
-            <a:lnSpc>
-              <a:spcPct val="90000"/>
-            </a:lnSpc>
-            <a:spcBef>
-              <a:spcPct val="0"/>
-            </a:spcBef>
-            <a:spcAft>
-              <a:spcPct val="35000"/>
-            </a:spcAft>
-          </a:pPr>
-          <a:r>
-            <a:rPr lang="en-US" sz="4100" kern="1200" dirty="0" smtClean="0"/>
-            <a:t>Abstract Concept</a:t>
-          </a:r>
-          <a:endParaRPr lang="en-US" sz="4100" kern="1200" dirty="0"/>
-        </a:p>
-      </dsp:txBody>
-      <dsp:txXfrm>
-        <a:off x="4547301" y="3548758"/>
-        <a:ext cx="3097397" cy="1469217"/>
-      </dsp:txXfrm>
-    </dsp:sp>
-    <dsp:sp modelId="{AF58BD6A-6008-48FE-8000-B52F4BD5AD30}">
-      <dsp:nvSpPr>
-        <dsp:cNvPr id="0" name=""/>
-        <dsp:cNvSpPr/>
-      </dsp:nvSpPr>
-      <dsp:spPr>
-        <a:xfrm>
-          <a:off x="2733466" y="1734923"/>
-          <a:ext cx="3256359" cy="1628179"/>
-        </a:xfrm>
-        <a:prstGeom prst="roundRect">
-          <a:avLst/>
-        </a:prstGeom>
-        <a:solidFill>
-          <a:schemeClr val="accent5">
-            <a:hueOff val="0"/>
-            <a:satOff val="0"/>
-            <a:lumOff val="0"/>
-            <a:alphaOff val="0"/>
-          </a:schemeClr>
-        </a:solidFill>
-        <a:ln w="12700" cap="flat" cmpd="sng" algn="ctr">
-          <a:solidFill>
-            <a:schemeClr val="lt1">
-              <a:hueOff val="0"/>
-              <a:satOff val="0"/>
-              <a:lumOff val="0"/>
-              <a:alphaOff val="0"/>
-            </a:schemeClr>
-          </a:solidFill>
-          <a:prstDash val="solid"/>
-          <a:miter lim="800000"/>
-        </a:ln>
-        <a:effectLst/>
-      </dsp:spPr>
-      <dsp:style>
-        <a:lnRef idx="2">
-          <a:scrgbClr r="0" g="0" b="0"/>
-        </a:lnRef>
-        <a:fillRef idx="1">
-          <a:scrgbClr r="0" g="0" b="0"/>
-        </a:fillRef>
-        <a:effectRef idx="0">
-          <a:scrgbClr r="0" g="0" b="0"/>
-        </a:effectRef>
-        <a:fontRef idx="minor">
-          <a:schemeClr val="lt1"/>
-        </a:fontRef>
-      </dsp:style>
-      <dsp:txBody>
-        <a:bodyPr spcFirstLastPara="0" vert="horz" wrap="square" lIns="156210" tIns="156210" rIns="156210" bIns="156210" numCol="1" spcCol="1270" anchor="ctr" anchorCtr="0">
-          <a:noAutofit/>
-        </a:bodyPr>
-        <a:lstStyle/>
-        <a:p>
-          <a:pPr lvl="0" algn="ctr" defTabSz="1822450">
-            <a:lnSpc>
-              <a:spcPct val="90000"/>
-            </a:lnSpc>
-            <a:spcBef>
-              <a:spcPct val="0"/>
-            </a:spcBef>
-            <a:spcAft>
-              <a:spcPct val="35000"/>
-            </a:spcAft>
-          </a:pPr>
-          <a:r>
-            <a:rPr lang="en-US" sz="4100" kern="1200" dirty="0" smtClean="0"/>
-            <a:t>Active Experiment</a:t>
-          </a:r>
-          <a:endParaRPr lang="en-US" sz="4100" kern="1200" dirty="0"/>
-        </a:p>
-      </dsp:txBody>
-      <dsp:txXfrm>
-        <a:off x="2812947" y="1814404"/>
-        <a:ext cx="3097397" cy="1469217"/>
-      </dsp:txXfrm>
-    </dsp:sp>
   </dsp:spTree>
 </dsp:drawing>
 </file>
@@ -4443,2501 +4087,6 @@
       <dsp:cNvGrpSpPr/>
     </dsp:nvGrpSpPr>
     <dsp:grpSpPr/>
-    <dsp:sp modelId="{8CE55738-3FE3-4ED6-B48F-AE74A4A94F19}">
-      <dsp:nvSpPr>
-        <dsp:cNvPr id="0" name=""/>
-        <dsp:cNvSpPr/>
-      </dsp:nvSpPr>
-      <dsp:spPr>
-        <a:xfrm>
-          <a:off x="3611946" y="1236249"/>
-          <a:ext cx="152861" cy="3362949"/>
-        </a:xfrm>
-        <a:custGeom>
-          <a:avLst/>
-          <a:gdLst/>
-          <a:ahLst/>
-          <a:cxnLst/>
-          <a:rect l="0" t="0" r="0" b="0"/>
-          <a:pathLst>
-            <a:path>
-              <a:moveTo>
-                <a:pt x="0" y="0"/>
-              </a:moveTo>
-              <a:lnTo>
-                <a:pt x="0" y="3362949"/>
-              </a:lnTo>
-              <a:lnTo>
-                <a:pt x="152861" y="3362949"/>
-              </a:lnTo>
-            </a:path>
-          </a:pathLst>
-        </a:custGeom>
-        <a:noFill/>
-        <a:ln w="12700" cap="flat" cmpd="sng" algn="ctr">
-          <a:solidFill>
-            <a:schemeClr val="accent1">
-              <a:shade val="80000"/>
-              <a:hueOff val="0"/>
-              <a:satOff val="0"/>
-              <a:lumOff val="0"/>
-              <a:alphaOff val="0"/>
-            </a:schemeClr>
-          </a:solidFill>
-          <a:prstDash val="solid"/>
-          <a:miter lim="800000"/>
-        </a:ln>
-        <a:effectLst/>
-      </dsp:spPr>
-      <dsp:style>
-        <a:lnRef idx="2">
-          <a:scrgbClr r="0" g="0" b="0"/>
-        </a:lnRef>
-        <a:fillRef idx="0">
-          <a:scrgbClr r="0" g="0" b="0"/>
-        </a:fillRef>
-        <a:effectRef idx="0">
-          <a:scrgbClr r="0" g="0" b="0"/>
-        </a:effectRef>
-        <a:fontRef idx="minor"/>
-      </dsp:style>
-    </dsp:sp>
-    <dsp:sp modelId="{734D8A01-C95D-4F5C-83DF-A75A969B3A08}">
-      <dsp:nvSpPr>
-        <dsp:cNvPr id="0" name=""/>
-        <dsp:cNvSpPr/>
-      </dsp:nvSpPr>
-      <dsp:spPr>
-        <a:xfrm>
-          <a:off x="3611946" y="1236249"/>
-          <a:ext cx="152861" cy="2639405"/>
-        </a:xfrm>
-        <a:custGeom>
-          <a:avLst/>
-          <a:gdLst/>
-          <a:ahLst/>
-          <a:cxnLst/>
-          <a:rect l="0" t="0" r="0" b="0"/>
-          <a:pathLst>
-            <a:path>
-              <a:moveTo>
-                <a:pt x="0" y="0"/>
-              </a:moveTo>
-              <a:lnTo>
-                <a:pt x="0" y="2639405"/>
-              </a:lnTo>
-              <a:lnTo>
-                <a:pt x="152861" y="2639405"/>
-              </a:lnTo>
-            </a:path>
-          </a:pathLst>
-        </a:custGeom>
-        <a:noFill/>
-        <a:ln w="12700" cap="flat" cmpd="sng" algn="ctr">
-          <a:solidFill>
-            <a:schemeClr val="accent1">
-              <a:shade val="80000"/>
-              <a:hueOff val="0"/>
-              <a:satOff val="0"/>
-              <a:lumOff val="0"/>
-              <a:alphaOff val="0"/>
-            </a:schemeClr>
-          </a:solidFill>
-          <a:prstDash val="solid"/>
-          <a:miter lim="800000"/>
-        </a:ln>
-        <a:effectLst/>
-      </dsp:spPr>
-      <dsp:style>
-        <a:lnRef idx="2">
-          <a:scrgbClr r="0" g="0" b="0"/>
-        </a:lnRef>
-        <a:fillRef idx="0">
-          <a:scrgbClr r="0" g="0" b="0"/>
-        </a:fillRef>
-        <a:effectRef idx="0">
-          <a:scrgbClr r="0" g="0" b="0"/>
-        </a:effectRef>
-        <a:fontRef idx="minor"/>
-      </dsp:style>
-    </dsp:sp>
-    <dsp:sp modelId="{F77A709E-DAE5-4933-8279-8D1A9F452D0B}">
-      <dsp:nvSpPr>
-        <dsp:cNvPr id="0" name=""/>
-        <dsp:cNvSpPr/>
-      </dsp:nvSpPr>
-      <dsp:spPr>
-        <a:xfrm>
-          <a:off x="3611946" y="1236249"/>
-          <a:ext cx="152861" cy="1915861"/>
-        </a:xfrm>
-        <a:custGeom>
-          <a:avLst/>
-          <a:gdLst/>
-          <a:ahLst/>
-          <a:cxnLst/>
-          <a:rect l="0" t="0" r="0" b="0"/>
-          <a:pathLst>
-            <a:path>
-              <a:moveTo>
-                <a:pt x="0" y="0"/>
-              </a:moveTo>
-              <a:lnTo>
-                <a:pt x="0" y="1915861"/>
-              </a:lnTo>
-              <a:lnTo>
-                <a:pt x="152861" y="1915861"/>
-              </a:lnTo>
-            </a:path>
-          </a:pathLst>
-        </a:custGeom>
-        <a:noFill/>
-        <a:ln w="12700" cap="flat" cmpd="sng" algn="ctr">
-          <a:solidFill>
-            <a:schemeClr val="accent1">
-              <a:shade val="80000"/>
-              <a:hueOff val="0"/>
-              <a:satOff val="0"/>
-              <a:lumOff val="0"/>
-              <a:alphaOff val="0"/>
-            </a:schemeClr>
-          </a:solidFill>
-          <a:prstDash val="solid"/>
-          <a:miter lim="800000"/>
-        </a:ln>
-        <a:effectLst/>
-      </dsp:spPr>
-      <dsp:style>
-        <a:lnRef idx="2">
-          <a:scrgbClr r="0" g="0" b="0"/>
-        </a:lnRef>
-        <a:fillRef idx="0">
-          <a:scrgbClr r="0" g="0" b="0"/>
-        </a:fillRef>
-        <a:effectRef idx="0">
-          <a:scrgbClr r="0" g="0" b="0"/>
-        </a:effectRef>
-        <a:fontRef idx="minor"/>
-      </dsp:style>
-    </dsp:sp>
-    <dsp:sp modelId="{7812468D-086A-45B3-B7C2-CB639A40A431}">
-      <dsp:nvSpPr>
-        <dsp:cNvPr id="0" name=""/>
-        <dsp:cNvSpPr/>
-      </dsp:nvSpPr>
-      <dsp:spPr>
-        <a:xfrm>
-          <a:off x="3611946" y="1236249"/>
-          <a:ext cx="152861" cy="1192318"/>
-        </a:xfrm>
-        <a:custGeom>
-          <a:avLst/>
-          <a:gdLst/>
-          <a:ahLst/>
-          <a:cxnLst/>
-          <a:rect l="0" t="0" r="0" b="0"/>
-          <a:pathLst>
-            <a:path>
-              <a:moveTo>
-                <a:pt x="0" y="0"/>
-              </a:moveTo>
-              <a:lnTo>
-                <a:pt x="0" y="1192318"/>
-              </a:lnTo>
-              <a:lnTo>
-                <a:pt x="152861" y="1192318"/>
-              </a:lnTo>
-            </a:path>
-          </a:pathLst>
-        </a:custGeom>
-        <a:noFill/>
-        <a:ln w="12700" cap="flat" cmpd="sng" algn="ctr">
-          <a:solidFill>
-            <a:schemeClr val="accent1">
-              <a:shade val="80000"/>
-              <a:hueOff val="0"/>
-              <a:satOff val="0"/>
-              <a:lumOff val="0"/>
-              <a:alphaOff val="0"/>
-            </a:schemeClr>
-          </a:solidFill>
-          <a:prstDash val="solid"/>
-          <a:miter lim="800000"/>
-        </a:ln>
-        <a:effectLst/>
-      </dsp:spPr>
-      <dsp:style>
-        <a:lnRef idx="2">
-          <a:scrgbClr r="0" g="0" b="0"/>
-        </a:lnRef>
-        <a:fillRef idx="0">
-          <a:scrgbClr r="0" g="0" b="0"/>
-        </a:fillRef>
-        <a:effectRef idx="0">
-          <a:scrgbClr r="0" g="0" b="0"/>
-        </a:effectRef>
-        <a:fontRef idx="minor"/>
-      </dsp:style>
-    </dsp:sp>
-    <dsp:sp modelId="{E3E3F657-7AB8-41FE-A717-27407BAE0AF6}">
-      <dsp:nvSpPr>
-        <dsp:cNvPr id="0" name=""/>
-        <dsp:cNvSpPr/>
-      </dsp:nvSpPr>
-      <dsp:spPr>
-        <a:xfrm>
-          <a:off x="3611946" y="1236249"/>
-          <a:ext cx="152861" cy="468774"/>
-        </a:xfrm>
-        <a:custGeom>
-          <a:avLst/>
-          <a:gdLst/>
-          <a:ahLst/>
-          <a:cxnLst/>
-          <a:rect l="0" t="0" r="0" b="0"/>
-          <a:pathLst>
-            <a:path>
-              <a:moveTo>
-                <a:pt x="0" y="0"/>
-              </a:moveTo>
-              <a:lnTo>
-                <a:pt x="0" y="468774"/>
-              </a:lnTo>
-              <a:lnTo>
-                <a:pt x="152861" y="468774"/>
-              </a:lnTo>
-            </a:path>
-          </a:pathLst>
-        </a:custGeom>
-        <a:noFill/>
-        <a:ln w="12700" cap="flat" cmpd="sng" algn="ctr">
-          <a:solidFill>
-            <a:schemeClr val="accent1">
-              <a:shade val="80000"/>
-              <a:hueOff val="0"/>
-              <a:satOff val="0"/>
-              <a:lumOff val="0"/>
-              <a:alphaOff val="0"/>
-            </a:schemeClr>
-          </a:solidFill>
-          <a:prstDash val="solid"/>
-          <a:miter lim="800000"/>
-        </a:ln>
-        <a:effectLst/>
-      </dsp:spPr>
-      <dsp:style>
-        <a:lnRef idx="2">
-          <a:scrgbClr r="0" g="0" b="0"/>
-        </a:lnRef>
-        <a:fillRef idx="0">
-          <a:scrgbClr r="0" g="0" b="0"/>
-        </a:fillRef>
-        <a:effectRef idx="0">
-          <a:scrgbClr r="0" g="0" b="0"/>
-        </a:effectRef>
-        <a:fontRef idx="minor"/>
-      </dsp:style>
-    </dsp:sp>
-    <dsp:sp modelId="{89E28C61-DC17-4A6D-ACA4-4463B876CD05}">
-      <dsp:nvSpPr>
-        <dsp:cNvPr id="0" name=""/>
-        <dsp:cNvSpPr/>
-      </dsp:nvSpPr>
-      <dsp:spPr>
-        <a:xfrm>
-          <a:off x="2786495" y="512706"/>
-          <a:ext cx="1233081" cy="214005"/>
-        </a:xfrm>
-        <a:custGeom>
-          <a:avLst/>
-          <a:gdLst/>
-          <a:ahLst/>
-          <a:cxnLst/>
-          <a:rect l="0" t="0" r="0" b="0"/>
-          <a:pathLst>
-            <a:path>
-              <a:moveTo>
-                <a:pt x="0" y="0"/>
-              </a:moveTo>
-              <a:lnTo>
-                <a:pt x="0" y="107002"/>
-              </a:lnTo>
-              <a:lnTo>
-                <a:pt x="1233081" y="107002"/>
-              </a:lnTo>
-              <a:lnTo>
-                <a:pt x="1233081" y="214005"/>
-              </a:lnTo>
-            </a:path>
-          </a:pathLst>
-        </a:custGeom>
-        <a:noFill/>
-        <a:ln w="12700" cap="flat" cmpd="sng" algn="ctr">
-          <a:solidFill>
-            <a:schemeClr val="accent1">
-              <a:shade val="60000"/>
-              <a:hueOff val="0"/>
-              <a:satOff val="0"/>
-              <a:lumOff val="0"/>
-              <a:alphaOff val="0"/>
-            </a:schemeClr>
-          </a:solidFill>
-          <a:prstDash val="solid"/>
-          <a:miter lim="800000"/>
-        </a:ln>
-        <a:effectLst/>
-      </dsp:spPr>
-      <dsp:style>
-        <a:lnRef idx="2">
-          <a:scrgbClr r="0" g="0" b="0"/>
-        </a:lnRef>
-        <a:fillRef idx="0">
-          <a:scrgbClr r="0" g="0" b="0"/>
-        </a:fillRef>
-        <a:effectRef idx="0">
-          <a:scrgbClr r="0" g="0" b="0"/>
-        </a:effectRef>
-        <a:fontRef idx="minor"/>
-      </dsp:style>
-    </dsp:sp>
-    <dsp:sp modelId="{B4D6E75E-4496-428D-9DCD-8FDB84F67B16}">
-      <dsp:nvSpPr>
-        <dsp:cNvPr id="0" name=""/>
-        <dsp:cNvSpPr/>
-      </dsp:nvSpPr>
-      <dsp:spPr>
-        <a:xfrm>
-          <a:off x="2378865" y="1236249"/>
-          <a:ext cx="152861" cy="3362949"/>
-        </a:xfrm>
-        <a:custGeom>
-          <a:avLst/>
-          <a:gdLst/>
-          <a:ahLst/>
-          <a:cxnLst/>
-          <a:rect l="0" t="0" r="0" b="0"/>
-          <a:pathLst>
-            <a:path>
-              <a:moveTo>
-                <a:pt x="0" y="0"/>
-              </a:moveTo>
-              <a:lnTo>
-                <a:pt x="0" y="3362949"/>
-              </a:lnTo>
-              <a:lnTo>
-                <a:pt x="152861" y="3362949"/>
-              </a:lnTo>
-            </a:path>
-          </a:pathLst>
-        </a:custGeom>
-        <a:noFill/>
-        <a:ln w="12700" cap="flat" cmpd="sng" algn="ctr">
-          <a:solidFill>
-            <a:schemeClr val="accent1">
-              <a:shade val="80000"/>
-              <a:hueOff val="0"/>
-              <a:satOff val="0"/>
-              <a:lumOff val="0"/>
-              <a:alphaOff val="0"/>
-            </a:schemeClr>
-          </a:solidFill>
-          <a:prstDash val="solid"/>
-          <a:miter lim="800000"/>
-        </a:ln>
-        <a:effectLst/>
-      </dsp:spPr>
-      <dsp:style>
-        <a:lnRef idx="2">
-          <a:scrgbClr r="0" g="0" b="0"/>
-        </a:lnRef>
-        <a:fillRef idx="0">
-          <a:scrgbClr r="0" g="0" b="0"/>
-        </a:fillRef>
-        <a:effectRef idx="0">
-          <a:scrgbClr r="0" g="0" b="0"/>
-        </a:effectRef>
-        <a:fontRef idx="minor"/>
-      </dsp:style>
-    </dsp:sp>
-    <dsp:sp modelId="{31591947-B2A0-40F3-9DF4-DEAFEFAB8B5A}">
-      <dsp:nvSpPr>
-        <dsp:cNvPr id="0" name=""/>
-        <dsp:cNvSpPr/>
-      </dsp:nvSpPr>
-      <dsp:spPr>
-        <a:xfrm>
-          <a:off x="2378865" y="1236249"/>
-          <a:ext cx="152861" cy="2639405"/>
-        </a:xfrm>
-        <a:custGeom>
-          <a:avLst/>
-          <a:gdLst/>
-          <a:ahLst/>
-          <a:cxnLst/>
-          <a:rect l="0" t="0" r="0" b="0"/>
-          <a:pathLst>
-            <a:path>
-              <a:moveTo>
-                <a:pt x="0" y="0"/>
-              </a:moveTo>
-              <a:lnTo>
-                <a:pt x="0" y="2639405"/>
-              </a:lnTo>
-              <a:lnTo>
-                <a:pt x="152861" y="2639405"/>
-              </a:lnTo>
-            </a:path>
-          </a:pathLst>
-        </a:custGeom>
-        <a:noFill/>
-        <a:ln w="12700" cap="flat" cmpd="sng" algn="ctr">
-          <a:solidFill>
-            <a:schemeClr val="accent1">
-              <a:shade val="80000"/>
-              <a:hueOff val="0"/>
-              <a:satOff val="0"/>
-              <a:lumOff val="0"/>
-              <a:alphaOff val="0"/>
-            </a:schemeClr>
-          </a:solidFill>
-          <a:prstDash val="solid"/>
-          <a:miter lim="800000"/>
-        </a:ln>
-        <a:effectLst/>
-      </dsp:spPr>
-      <dsp:style>
-        <a:lnRef idx="2">
-          <a:scrgbClr r="0" g="0" b="0"/>
-        </a:lnRef>
-        <a:fillRef idx="0">
-          <a:scrgbClr r="0" g="0" b="0"/>
-        </a:fillRef>
-        <a:effectRef idx="0">
-          <a:scrgbClr r="0" g="0" b="0"/>
-        </a:effectRef>
-        <a:fontRef idx="minor"/>
-      </dsp:style>
-    </dsp:sp>
-    <dsp:sp modelId="{B9710101-02C2-4DAA-84BF-23BCD061B0B8}">
-      <dsp:nvSpPr>
-        <dsp:cNvPr id="0" name=""/>
-        <dsp:cNvSpPr/>
-      </dsp:nvSpPr>
-      <dsp:spPr>
-        <a:xfrm>
-          <a:off x="2378865" y="1236249"/>
-          <a:ext cx="152861" cy="1915861"/>
-        </a:xfrm>
-        <a:custGeom>
-          <a:avLst/>
-          <a:gdLst/>
-          <a:ahLst/>
-          <a:cxnLst/>
-          <a:rect l="0" t="0" r="0" b="0"/>
-          <a:pathLst>
-            <a:path>
-              <a:moveTo>
-                <a:pt x="0" y="0"/>
-              </a:moveTo>
-              <a:lnTo>
-                <a:pt x="0" y="1915861"/>
-              </a:lnTo>
-              <a:lnTo>
-                <a:pt x="152861" y="1915861"/>
-              </a:lnTo>
-            </a:path>
-          </a:pathLst>
-        </a:custGeom>
-        <a:noFill/>
-        <a:ln w="12700" cap="flat" cmpd="sng" algn="ctr">
-          <a:solidFill>
-            <a:schemeClr val="accent1">
-              <a:shade val="80000"/>
-              <a:hueOff val="0"/>
-              <a:satOff val="0"/>
-              <a:lumOff val="0"/>
-              <a:alphaOff val="0"/>
-            </a:schemeClr>
-          </a:solidFill>
-          <a:prstDash val="solid"/>
-          <a:miter lim="800000"/>
-        </a:ln>
-        <a:effectLst/>
-      </dsp:spPr>
-      <dsp:style>
-        <a:lnRef idx="2">
-          <a:scrgbClr r="0" g="0" b="0"/>
-        </a:lnRef>
-        <a:fillRef idx="0">
-          <a:scrgbClr r="0" g="0" b="0"/>
-        </a:fillRef>
-        <a:effectRef idx="0">
-          <a:scrgbClr r="0" g="0" b="0"/>
-        </a:effectRef>
-        <a:fontRef idx="minor"/>
-      </dsp:style>
-    </dsp:sp>
-    <dsp:sp modelId="{3A384DD6-6824-4C12-83D8-587BF0F97166}">
-      <dsp:nvSpPr>
-        <dsp:cNvPr id="0" name=""/>
-        <dsp:cNvSpPr/>
-      </dsp:nvSpPr>
-      <dsp:spPr>
-        <a:xfrm>
-          <a:off x="2378865" y="1236249"/>
-          <a:ext cx="152861" cy="1192318"/>
-        </a:xfrm>
-        <a:custGeom>
-          <a:avLst/>
-          <a:gdLst/>
-          <a:ahLst/>
-          <a:cxnLst/>
-          <a:rect l="0" t="0" r="0" b="0"/>
-          <a:pathLst>
-            <a:path>
-              <a:moveTo>
-                <a:pt x="0" y="0"/>
-              </a:moveTo>
-              <a:lnTo>
-                <a:pt x="0" y="1192318"/>
-              </a:lnTo>
-              <a:lnTo>
-                <a:pt x="152861" y="1192318"/>
-              </a:lnTo>
-            </a:path>
-          </a:pathLst>
-        </a:custGeom>
-        <a:noFill/>
-        <a:ln w="12700" cap="flat" cmpd="sng" algn="ctr">
-          <a:solidFill>
-            <a:schemeClr val="accent1">
-              <a:shade val="80000"/>
-              <a:hueOff val="0"/>
-              <a:satOff val="0"/>
-              <a:lumOff val="0"/>
-              <a:alphaOff val="0"/>
-            </a:schemeClr>
-          </a:solidFill>
-          <a:prstDash val="solid"/>
-          <a:miter lim="800000"/>
-        </a:ln>
-        <a:effectLst/>
-      </dsp:spPr>
-      <dsp:style>
-        <a:lnRef idx="2">
-          <a:scrgbClr r="0" g="0" b="0"/>
-        </a:lnRef>
-        <a:fillRef idx="0">
-          <a:scrgbClr r="0" g="0" b="0"/>
-        </a:fillRef>
-        <a:effectRef idx="0">
-          <a:scrgbClr r="0" g="0" b="0"/>
-        </a:effectRef>
-        <a:fontRef idx="minor"/>
-      </dsp:style>
-    </dsp:sp>
-    <dsp:sp modelId="{5CBBBFE9-145B-44CA-9613-92BB6DD2604B}">
-      <dsp:nvSpPr>
-        <dsp:cNvPr id="0" name=""/>
-        <dsp:cNvSpPr/>
-      </dsp:nvSpPr>
-      <dsp:spPr>
-        <a:xfrm>
-          <a:off x="2378865" y="1236249"/>
-          <a:ext cx="152861" cy="468774"/>
-        </a:xfrm>
-        <a:custGeom>
-          <a:avLst/>
-          <a:gdLst/>
-          <a:ahLst/>
-          <a:cxnLst/>
-          <a:rect l="0" t="0" r="0" b="0"/>
-          <a:pathLst>
-            <a:path>
-              <a:moveTo>
-                <a:pt x="0" y="0"/>
-              </a:moveTo>
-              <a:lnTo>
-                <a:pt x="0" y="468774"/>
-              </a:lnTo>
-              <a:lnTo>
-                <a:pt x="152861" y="468774"/>
-              </a:lnTo>
-            </a:path>
-          </a:pathLst>
-        </a:custGeom>
-        <a:noFill/>
-        <a:ln w="12700" cap="flat" cmpd="sng" algn="ctr">
-          <a:solidFill>
-            <a:schemeClr val="accent1">
-              <a:shade val="80000"/>
-              <a:hueOff val="0"/>
-              <a:satOff val="0"/>
-              <a:lumOff val="0"/>
-              <a:alphaOff val="0"/>
-            </a:schemeClr>
-          </a:solidFill>
-          <a:prstDash val="solid"/>
-          <a:miter lim="800000"/>
-        </a:ln>
-        <a:effectLst/>
-      </dsp:spPr>
-      <dsp:style>
-        <a:lnRef idx="2">
-          <a:scrgbClr r="0" g="0" b="0"/>
-        </a:lnRef>
-        <a:fillRef idx="0">
-          <a:scrgbClr r="0" g="0" b="0"/>
-        </a:fillRef>
-        <a:effectRef idx="0">
-          <a:scrgbClr r="0" g="0" b="0"/>
-        </a:effectRef>
-        <a:fontRef idx="minor"/>
-      </dsp:style>
-    </dsp:sp>
-    <dsp:sp modelId="{19A6E601-6F75-4890-BF6D-77A32FD2BE51}">
-      <dsp:nvSpPr>
-        <dsp:cNvPr id="0" name=""/>
-        <dsp:cNvSpPr/>
-      </dsp:nvSpPr>
-      <dsp:spPr>
-        <a:xfrm>
-          <a:off x="2740775" y="512706"/>
-          <a:ext cx="91440" cy="214005"/>
-        </a:xfrm>
-        <a:custGeom>
-          <a:avLst/>
-          <a:gdLst/>
-          <a:ahLst/>
-          <a:cxnLst/>
-          <a:rect l="0" t="0" r="0" b="0"/>
-          <a:pathLst>
-            <a:path>
-              <a:moveTo>
-                <a:pt x="45720" y="0"/>
-              </a:moveTo>
-              <a:lnTo>
-                <a:pt x="45720" y="214005"/>
-              </a:lnTo>
-            </a:path>
-          </a:pathLst>
-        </a:custGeom>
-        <a:noFill/>
-        <a:ln w="12700" cap="flat" cmpd="sng" algn="ctr">
-          <a:solidFill>
-            <a:schemeClr val="accent1">
-              <a:shade val="60000"/>
-              <a:hueOff val="0"/>
-              <a:satOff val="0"/>
-              <a:lumOff val="0"/>
-              <a:alphaOff val="0"/>
-            </a:schemeClr>
-          </a:solidFill>
-          <a:prstDash val="solid"/>
-          <a:miter lim="800000"/>
-        </a:ln>
-        <a:effectLst/>
-      </dsp:spPr>
-      <dsp:style>
-        <a:lnRef idx="2">
-          <a:scrgbClr r="0" g="0" b="0"/>
-        </a:lnRef>
-        <a:fillRef idx="0">
-          <a:scrgbClr r="0" g="0" b="0"/>
-        </a:fillRef>
-        <a:effectRef idx="0">
-          <a:scrgbClr r="0" g="0" b="0"/>
-        </a:effectRef>
-        <a:fontRef idx="minor"/>
-      </dsp:style>
-    </dsp:sp>
-    <dsp:sp modelId="{B9BB4319-DB63-4969-84CE-A795A380C6F8}">
-      <dsp:nvSpPr>
-        <dsp:cNvPr id="0" name=""/>
-        <dsp:cNvSpPr/>
-      </dsp:nvSpPr>
-      <dsp:spPr>
-        <a:xfrm>
-          <a:off x="1145784" y="1236249"/>
-          <a:ext cx="152861" cy="3362949"/>
-        </a:xfrm>
-        <a:custGeom>
-          <a:avLst/>
-          <a:gdLst/>
-          <a:ahLst/>
-          <a:cxnLst/>
-          <a:rect l="0" t="0" r="0" b="0"/>
-          <a:pathLst>
-            <a:path>
-              <a:moveTo>
-                <a:pt x="0" y="0"/>
-              </a:moveTo>
-              <a:lnTo>
-                <a:pt x="0" y="3362949"/>
-              </a:lnTo>
-              <a:lnTo>
-                <a:pt x="152861" y="3362949"/>
-              </a:lnTo>
-            </a:path>
-          </a:pathLst>
-        </a:custGeom>
-        <a:noFill/>
-        <a:ln w="12700" cap="flat" cmpd="sng" algn="ctr">
-          <a:solidFill>
-            <a:schemeClr val="accent1">
-              <a:shade val="80000"/>
-              <a:hueOff val="0"/>
-              <a:satOff val="0"/>
-              <a:lumOff val="0"/>
-              <a:alphaOff val="0"/>
-            </a:schemeClr>
-          </a:solidFill>
-          <a:prstDash val="solid"/>
-          <a:miter lim="800000"/>
-        </a:ln>
-        <a:effectLst/>
-      </dsp:spPr>
-      <dsp:style>
-        <a:lnRef idx="2">
-          <a:scrgbClr r="0" g="0" b="0"/>
-        </a:lnRef>
-        <a:fillRef idx="0">
-          <a:scrgbClr r="0" g="0" b="0"/>
-        </a:fillRef>
-        <a:effectRef idx="0">
-          <a:scrgbClr r="0" g="0" b="0"/>
-        </a:effectRef>
-        <a:fontRef idx="minor"/>
-      </dsp:style>
-    </dsp:sp>
-    <dsp:sp modelId="{4BAD3F2F-F7A2-478A-9E8A-DC3318B14CC3}">
-      <dsp:nvSpPr>
-        <dsp:cNvPr id="0" name=""/>
-        <dsp:cNvSpPr/>
-      </dsp:nvSpPr>
-      <dsp:spPr>
-        <a:xfrm>
-          <a:off x="1145784" y="1236249"/>
-          <a:ext cx="152861" cy="2639405"/>
-        </a:xfrm>
-        <a:custGeom>
-          <a:avLst/>
-          <a:gdLst/>
-          <a:ahLst/>
-          <a:cxnLst/>
-          <a:rect l="0" t="0" r="0" b="0"/>
-          <a:pathLst>
-            <a:path>
-              <a:moveTo>
-                <a:pt x="0" y="0"/>
-              </a:moveTo>
-              <a:lnTo>
-                <a:pt x="0" y="2639405"/>
-              </a:lnTo>
-              <a:lnTo>
-                <a:pt x="152861" y="2639405"/>
-              </a:lnTo>
-            </a:path>
-          </a:pathLst>
-        </a:custGeom>
-        <a:noFill/>
-        <a:ln w="12700" cap="flat" cmpd="sng" algn="ctr">
-          <a:solidFill>
-            <a:schemeClr val="accent1">
-              <a:shade val="80000"/>
-              <a:hueOff val="0"/>
-              <a:satOff val="0"/>
-              <a:lumOff val="0"/>
-              <a:alphaOff val="0"/>
-            </a:schemeClr>
-          </a:solidFill>
-          <a:prstDash val="solid"/>
-          <a:miter lim="800000"/>
-        </a:ln>
-        <a:effectLst/>
-      </dsp:spPr>
-      <dsp:style>
-        <a:lnRef idx="2">
-          <a:scrgbClr r="0" g="0" b="0"/>
-        </a:lnRef>
-        <a:fillRef idx="0">
-          <a:scrgbClr r="0" g="0" b="0"/>
-        </a:fillRef>
-        <a:effectRef idx="0">
-          <a:scrgbClr r="0" g="0" b="0"/>
-        </a:effectRef>
-        <a:fontRef idx="minor"/>
-      </dsp:style>
-    </dsp:sp>
-    <dsp:sp modelId="{C4E7E5D3-662F-41A5-8E25-36ED5DBE70F1}">
-      <dsp:nvSpPr>
-        <dsp:cNvPr id="0" name=""/>
-        <dsp:cNvSpPr/>
-      </dsp:nvSpPr>
-      <dsp:spPr>
-        <a:xfrm>
-          <a:off x="1145784" y="1236249"/>
-          <a:ext cx="152861" cy="1915861"/>
-        </a:xfrm>
-        <a:custGeom>
-          <a:avLst/>
-          <a:gdLst/>
-          <a:ahLst/>
-          <a:cxnLst/>
-          <a:rect l="0" t="0" r="0" b="0"/>
-          <a:pathLst>
-            <a:path>
-              <a:moveTo>
-                <a:pt x="0" y="0"/>
-              </a:moveTo>
-              <a:lnTo>
-                <a:pt x="0" y="1915861"/>
-              </a:lnTo>
-              <a:lnTo>
-                <a:pt x="152861" y="1915861"/>
-              </a:lnTo>
-            </a:path>
-          </a:pathLst>
-        </a:custGeom>
-        <a:noFill/>
-        <a:ln w="12700" cap="flat" cmpd="sng" algn="ctr">
-          <a:solidFill>
-            <a:schemeClr val="accent1">
-              <a:shade val="80000"/>
-              <a:hueOff val="0"/>
-              <a:satOff val="0"/>
-              <a:lumOff val="0"/>
-              <a:alphaOff val="0"/>
-            </a:schemeClr>
-          </a:solidFill>
-          <a:prstDash val="solid"/>
-          <a:miter lim="800000"/>
-        </a:ln>
-        <a:effectLst/>
-      </dsp:spPr>
-      <dsp:style>
-        <a:lnRef idx="2">
-          <a:scrgbClr r="0" g="0" b="0"/>
-        </a:lnRef>
-        <a:fillRef idx="0">
-          <a:scrgbClr r="0" g="0" b="0"/>
-        </a:fillRef>
-        <a:effectRef idx="0">
-          <a:scrgbClr r="0" g="0" b="0"/>
-        </a:effectRef>
-        <a:fontRef idx="minor"/>
-      </dsp:style>
-    </dsp:sp>
-    <dsp:sp modelId="{E2745979-C5A6-4366-BD26-35313AB9BC1D}">
-      <dsp:nvSpPr>
-        <dsp:cNvPr id="0" name=""/>
-        <dsp:cNvSpPr/>
-      </dsp:nvSpPr>
-      <dsp:spPr>
-        <a:xfrm>
-          <a:off x="1145784" y="1236249"/>
-          <a:ext cx="152861" cy="1192318"/>
-        </a:xfrm>
-        <a:custGeom>
-          <a:avLst/>
-          <a:gdLst/>
-          <a:ahLst/>
-          <a:cxnLst/>
-          <a:rect l="0" t="0" r="0" b="0"/>
-          <a:pathLst>
-            <a:path>
-              <a:moveTo>
-                <a:pt x="0" y="0"/>
-              </a:moveTo>
-              <a:lnTo>
-                <a:pt x="0" y="1192318"/>
-              </a:lnTo>
-              <a:lnTo>
-                <a:pt x="152861" y="1192318"/>
-              </a:lnTo>
-            </a:path>
-          </a:pathLst>
-        </a:custGeom>
-        <a:noFill/>
-        <a:ln w="12700" cap="flat" cmpd="sng" algn="ctr">
-          <a:solidFill>
-            <a:schemeClr val="accent1">
-              <a:shade val="80000"/>
-              <a:hueOff val="0"/>
-              <a:satOff val="0"/>
-              <a:lumOff val="0"/>
-              <a:alphaOff val="0"/>
-            </a:schemeClr>
-          </a:solidFill>
-          <a:prstDash val="solid"/>
-          <a:miter lim="800000"/>
-        </a:ln>
-        <a:effectLst/>
-      </dsp:spPr>
-      <dsp:style>
-        <a:lnRef idx="2">
-          <a:scrgbClr r="0" g="0" b="0"/>
-        </a:lnRef>
-        <a:fillRef idx="0">
-          <a:scrgbClr r="0" g="0" b="0"/>
-        </a:fillRef>
-        <a:effectRef idx="0">
-          <a:scrgbClr r="0" g="0" b="0"/>
-        </a:effectRef>
-        <a:fontRef idx="minor"/>
-      </dsp:style>
-    </dsp:sp>
-    <dsp:sp modelId="{0A296B32-163D-40BE-8257-0E8B26626A09}">
-      <dsp:nvSpPr>
-        <dsp:cNvPr id="0" name=""/>
-        <dsp:cNvSpPr/>
-      </dsp:nvSpPr>
-      <dsp:spPr>
-        <a:xfrm>
-          <a:off x="1145784" y="1236249"/>
-          <a:ext cx="152861" cy="468774"/>
-        </a:xfrm>
-        <a:custGeom>
-          <a:avLst/>
-          <a:gdLst/>
-          <a:ahLst/>
-          <a:cxnLst/>
-          <a:rect l="0" t="0" r="0" b="0"/>
-          <a:pathLst>
-            <a:path>
-              <a:moveTo>
-                <a:pt x="0" y="0"/>
-              </a:moveTo>
-              <a:lnTo>
-                <a:pt x="0" y="468774"/>
-              </a:lnTo>
-              <a:lnTo>
-                <a:pt x="152861" y="468774"/>
-              </a:lnTo>
-            </a:path>
-          </a:pathLst>
-        </a:custGeom>
-        <a:noFill/>
-        <a:ln w="12700" cap="flat" cmpd="sng" algn="ctr">
-          <a:solidFill>
-            <a:schemeClr val="accent1">
-              <a:shade val="80000"/>
-              <a:hueOff val="0"/>
-              <a:satOff val="0"/>
-              <a:lumOff val="0"/>
-              <a:alphaOff val="0"/>
-            </a:schemeClr>
-          </a:solidFill>
-          <a:prstDash val="solid"/>
-          <a:miter lim="800000"/>
-        </a:ln>
-        <a:effectLst/>
-      </dsp:spPr>
-      <dsp:style>
-        <a:lnRef idx="2">
-          <a:scrgbClr r="0" g="0" b="0"/>
-        </a:lnRef>
-        <a:fillRef idx="0">
-          <a:scrgbClr r="0" g="0" b="0"/>
-        </a:fillRef>
-        <a:effectRef idx="0">
-          <a:scrgbClr r="0" g="0" b="0"/>
-        </a:effectRef>
-        <a:fontRef idx="minor"/>
-      </dsp:style>
-    </dsp:sp>
-    <dsp:sp modelId="{40645594-36E5-46A1-A4A1-2D8BA290CDC5}">
-      <dsp:nvSpPr>
-        <dsp:cNvPr id="0" name=""/>
-        <dsp:cNvSpPr/>
-      </dsp:nvSpPr>
-      <dsp:spPr>
-        <a:xfrm>
-          <a:off x="1553414" y="512706"/>
-          <a:ext cx="1233081" cy="214005"/>
-        </a:xfrm>
-        <a:custGeom>
-          <a:avLst/>
-          <a:gdLst/>
-          <a:ahLst/>
-          <a:cxnLst/>
-          <a:rect l="0" t="0" r="0" b="0"/>
-          <a:pathLst>
-            <a:path>
-              <a:moveTo>
-                <a:pt x="1233081" y="0"/>
-              </a:moveTo>
-              <a:lnTo>
-                <a:pt x="1233081" y="107002"/>
-              </a:lnTo>
-              <a:lnTo>
-                <a:pt x="0" y="107002"/>
-              </a:lnTo>
-              <a:lnTo>
-                <a:pt x="0" y="214005"/>
-              </a:lnTo>
-            </a:path>
-          </a:pathLst>
-        </a:custGeom>
-        <a:noFill/>
-        <a:ln w="12700" cap="flat" cmpd="sng" algn="ctr">
-          <a:solidFill>
-            <a:schemeClr val="accent1">
-              <a:shade val="60000"/>
-              <a:hueOff val="0"/>
-              <a:satOff val="0"/>
-              <a:lumOff val="0"/>
-              <a:alphaOff val="0"/>
-            </a:schemeClr>
-          </a:solidFill>
-          <a:prstDash val="solid"/>
-          <a:miter lim="800000"/>
-        </a:ln>
-        <a:effectLst/>
-      </dsp:spPr>
-      <dsp:style>
-        <a:lnRef idx="2">
-          <a:scrgbClr r="0" g="0" b="0"/>
-        </a:lnRef>
-        <a:fillRef idx="0">
-          <a:scrgbClr r="0" g="0" b="0"/>
-        </a:fillRef>
-        <a:effectRef idx="0">
-          <a:scrgbClr r="0" g="0" b="0"/>
-        </a:effectRef>
-        <a:fontRef idx="minor"/>
-      </dsp:style>
-    </dsp:sp>
-    <dsp:sp modelId="{3115C993-F26D-40EA-8D3A-ABD6517C0652}">
-      <dsp:nvSpPr>
-        <dsp:cNvPr id="0" name=""/>
-        <dsp:cNvSpPr/>
-      </dsp:nvSpPr>
-      <dsp:spPr>
-        <a:xfrm>
-          <a:off x="2276957" y="3168"/>
-          <a:ext cx="1019075" cy="509537"/>
-        </a:xfrm>
-        <a:prstGeom prst="rect">
-          <a:avLst/>
-        </a:prstGeom>
-        <a:solidFill>
-          <a:schemeClr val="accent1">
-            <a:hueOff val="0"/>
-            <a:satOff val="0"/>
-            <a:lumOff val="0"/>
-            <a:alphaOff val="0"/>
-          </a:schemeClr>
-        </a:solidFill>
-        <a:ln w="12700" cap="flat" cmpd="sng" algn="ctr">
-          <a:solidFill>
-            <a:schemeClr val="lt1">
-              <a:hueOff val="0"/>
-              <a:satOff val="0"/>
-              <a:lumOff val="0"/>
-              <a:alphaOff val="0"/>
-            </a:schemeClr>
-          </a:solidFill>
-          <a:prstDash val="solid"/>
-          <a:miter lim="800000"/>
-        </a:ln>
-        <a:effectLst/>
-      </dsp:spPr>
-      <dsp:style>
-        <a:lnRef idx="2">
-          <a:scrgbClr r="0" g="0" b="0"/>
-        </a:lnRef>
-        <a:fillRef idx="1">
-          <a:scrgbClr r="0" g="0" b="0"/>
-        </a:fillRef>
-        <a:effectRef idx="0">
-          <a:scrgbClr r="0" g="0" b="0"/>
-        </a:effectRef>
-        <a:fontRef idx="minor">
-          <a:schemeClr val="lt1"/>
-        </a:fontRef>
-      </dsp:style>
-      <dsp:txBody>
-        <a:bodyPr spcFirstLastPara="0" vert="horz" wrap="square" lIns="20955" tIns="20955" rIns="20955" bIns="20955" numCol="1" spcCol="1270" anchor="ctr" anchorCtr="0">
-          <a:noAutofit/>
-        </a:bodyPr>
-        <a:lstStyle/>
-        <a:p>
-          <a:pPr lvl="0" algn="ctr" defTabSz="1466850">
-            <a:lnSpc>
-              <a:spcPct val="90000"/>
-            </a:lnSpc>
-            <a:spcBef>
-              <a:spcPct val="0"/>
-            </a:spcBef>
-            <a:spcAft>
-              <a:spcPct val="35000"/>
-            </a:spcAft>
-          </a:pPr>
-          <a:r>
-            <a:rPr lang="en-US" sz="3300" kern="1200" dirty="0" smtClean="0"/>
-            <a:t> </a:t>
-          </a:r>
-          <a:endParaRPr lang="en-US" sz="3300" kern="1200" dirty="0"/>
-        </a:p>
-      </dsp:txBody>
-      <dsp:txXfrm>
-        <a:off x="2276957" y="3168"/>
-        <a:ext cx="1019075" cy="509537"/>
-      </dsp:txXfrm>
-    </dsp:sp>
-    <dsp:sp modelId="{CA306F3D-A52E-4347-B695-010F1E2DE149}">
-      <dsp:nvSpPr>
-        <dsp:cNvPr id="0" name=""/>
-        <dsp:cNvSpPr/>
-      </dsp:nvSpPr>
-      <dsp:spPr>
-        <a:xfrm>
-          <a:off x="1043876" y="726711"/>
-          <a:ext cx="1019075" cy="509537"/>
-        </a:xfrm>
-        <a:prstGeom prst="rect">
-          <a:avLst/>
-        </a:prstGeom>
-        <a:solidFill>
-          <a:schemeClr val="accent1">
-            <a:hueOff val="0"/>
-            <a:satOff val="0"/>
-            <a:lumOff val="0"/>
-            <a:alphaOff val="0"/>
-          </a:schemeClr>
-        </a:solidFill>
-        <a:ln w="12700" cap="flat" cmpd="sng" algn="ctr">
-          <a:solidFill>
-            <a:schemeClr val="lt1">
-              <a:hueOff val="0"/>
-              <a:satOff val="0"/>
-              <a:lumOff val="0"/>
-              <a:alphaOff val="0"/>
-            </a:schemeClr>
-          </a:solidFill>
-          <a:prstDash val="solid"/>
-          <a:miter lim="800000"/>
-        </a:ln>
-        <a:effectLst/>
-      </dsp:spPr>
-      <dsp:style>
-        <a:lnRef idx="2">
-          <a:scrgbClr r="0" g="0" b="0"/>
-        </a:lnRef>
-        <a:fillRef idx="1">
-          <a:scrgbClr r="0" g="0" b="0"/>
-        </a:fillRef>
-        <a:effectRef idx="0">
-          <a:scrgbClr r="0" g="0" b="0"/>
-        </a:effectRef>
-        <a:fontRef idx="minor">
-          <a:schemeClr val="lt1"/>
-        </a:fontRef>
-      </dsp:style>
-      <dsp:txBody>
-        <a:bodyPr spcFirstLastPara="0" vert="horz" wrap="square" lIns="20955" tIns="20955" rIns="20955" bIns="20955" numCol="1" spcCol="1270" anchor="ctr" anchorCtr="0">
-          <a:noAutofit/>
-        </a:bodyPr>
-        <a:lstStyle/>
-        <a:p>
-          <a:pPr lvl="0" algn="ctr" defTabSz="1466850">
-            <a:lnSpc>
-              <a:spcPct val="90000"/>
-            </a:lnSpc>
-            <a:spcBef>
-              <a:spcPct val="0"/>
-            </a:spcBef>
-            <a:spcAft>
-              <a:spcPct val="35000"/>
-            </a:spcAft>
-          </a:pPr>
-          <a:r>
-            <a:rPr lang="en-US" sz="3300" kern="1200" dirty="0" smtClean="0"/>
-            <a:t> </a:t>
-          </a:r>
-          <a:endParaRPr lang="en-US" sz="3300" kern="1200" dirty="0"/>
-        </a:p>
-      </dsp:txBody>
-      <dsp:txXfrm>
-        <a:off x="1043876" y="726711"/>
-        <a:ext cx="1019075" cy="509537"/>
-      </dsp:txXfrm>
-    </dsp:sp>
-    <dsp:sp modelId="{9C275506-05A7-48C7-9496-CCEF25DE3969}">
-      <dsp:nvSpPr>
-        <dsp:cNvPr id="0" name=""/>
-        <dsp:cNvSpPr/>
-      </dsp:nvSpPr>
-      <dsp:spPr>
-        <a:xfrm>
-          <a:off x="1298645" y="1450255"/>
-          <a:ext cx="1019075" cy="509537"/>
-        </a:xfrm>
-        <a:prstGeom prst="rect">
-          <a:avLst/>
-        </a:prstGeom>
-        <a:solidFill>
-          <a:schemeClr val="accent1">
-            <a:hueOff val="0"/>
-            <a:satOff val="0"/>
-            <a:lumOff val="0"/>
-            <a:alphaOff val="0"/>
-          </a:schemeClr>
-        </a:solidFill>
-        <a:ln w="12700" cap="flat" cmpd="sng" algn="ctr">
-          <a:solidFill>
-            <a:schemeClr val="lt1">
-              <a:hueOff val="0"/>
-              <a:satOff val="0"/>
-              <a:lumOff val="0"/>
-              <a:alphaOff val="0"/>
-            </a:schemeClr>
-          </a:solidFill>
-          <a:prstDash val="solid"/>
-          <a:miter lim="800000"/>
-        </a:ln>
-        <a:effectLst/>
-      </dsp:spPr>
-      <dsp:style>
-        <a:lnRef idx="2">
-          <a:scrgbClr r="0" g="0" b="0"/>
-        </a:lnRef>
-        <a:fillRef idx="1">
-          <a:scrgbClr r="0" g="0" b="0"/>
-        </a:fillRef>
-        <a:effectRef idx="0">
-          <a:scrgbClr r="0" g="0" b="0"/>
-        </a:effectRef>
-        <a:fontRef idx="minor">
-          <a:schemeClr val="lt1"/>
-        </a:fontRef>
-      </dsp:style>
-      <dsp:txBody>
-        <a:bodyPr spcFirstLastPara="0" vert="horz" wrap="square" lIns="20955" tIns="20955" rIns="20955" bIns="20955" numCol="1" spcCol="1270" anchor="ctr" anchorCtr="0">
-          <a:noAutofit/>
-        </a:bodyPr>
-        <a:lstStyle/>
-        <a:p>
-          <a:pPr lvl="0" algn="ctr" defTabSz="1466850">
-            <a:lnSpc>
-              <a:spcPct val="90000"/>
-            </a:lnSpc>
-            <a:spcBef>
-              <a:spcPct val="0"/>
-            </a:spcBef>
-            <a:spcAft>
-              <a:spcPct val="35000"/>
-            </a:spcAft>
-          </a:pPr>
-          <a:r>
-            <a:rPr lang="en-US" sz="3300" kern="1200" dirty="0" smtClean="0"/>
-            <a:t> </a:t>
-          </a:r>
-          <a:endParaRPr lang="en-US" sz="3300" kern="1200" dirty="0"/>
-        </a:p>
-      </dsp:txBody>
-      <dsp:txXfrm>
-        <a:off x="1298645" y="1450255"/>
-        <a:ext cx="1019075" cy="509537"/>
-      </dsp:txXfrm>
-    </dsp:sp>
-    <dsp:sp modelId="{AB7B76F3-6C59-43DB-ABCA-3AE57146D4ED}">
-      <dsp:nvSpPr>
-        <dsp:cNvPr id="0" name=""/>
-        <dsp:cNvSpPr/>
-      </dsp:nvSpPr>
-      <dsp:spPr>
-        <a:xfrm>
-          <a:off x="1298645" y="2173799"/>
-          <a:ext cx="1019075" cy="509537"/>
-        </a:xfrm>
-        <a:prstGeom prst="rect">
-          <a:avLst/>
-        </a:prstGeom>
-        <a:solidFill>
-          <a:schemeClr val="accent1">
-            <a:hueOff val="0"/>
-            <a:satOff val="0"/>
-            <a:lumOff val="0"/>
-            <a:alphaOff val="0"/>
-          </a:schemeClr>
-        </a:solidFill>
-        <a:ln w="12700" cap="flat" cmpd="sng" algn="ctr">
-          <a:solidFill>
-            <a:schemeClr val="lt1">
-              <a:hueOff val="0"/>
-              <a:satOff val="0"/>
-              <a:lumOff val="0"/>
-              <a:alphaOff val="0"/>
-            </a:schemeClr>
-          </a:solidFill>
-          <a:prstDash val="solid"/>
-          <a:miter lim="800000"/>
-        </a:ln>
-        <a:effectLst/>
-      </dsp:spPr>
-      <dsp:style>
-        <a:lnRef idx="2">
-          <a:scrgbClr r="0" g="0" b="0"/>
-        </a:lnRef>
-        <a:fillRef idx="1">
-          <a:scrgbClr r="0" g="0" b="0"/>
-        </a:fillRef>
-        <a:effectRef idx="0">
-          <a:scrgbClr r="0" g="0" b="0"/>
-        </a:effectRef>
-        <a:fontRef idx="minor">
-          <a:schemeClr val="lt1"/>
-        </a:fontRef>
-      </dsp:style>
-      <dsp:txBody>
-        <a:bodyPr spcFirstLastPara="0" vert="horz" wrap="square" lIns="20955" tIns="20955" rIns="20955" bIns="20955" numCol="1" spcCol="1270" anchor="ctr" anchorCtr="0">
-          <a:noAutofit/>
-        </a:bodyPr>
-        <a:lstStyle/>
-        <a:p>
-          <a:pPr lvl="0" algn="ctr" defTabSz="1466850">
-            <a:lnSpc>
-              <a:spcPct val="90000"/>
-            </a:lnSpc>
-            <a:spcBef>
-              <a:spcPct val="0"/>
-            </a:spcBef>
-            <a:spcAft>
-              <a:spcPct val="35000"/>
-            </a:spcAft>
-          </a:pPr>
-          <a:endParaRPr lang="en-US" sz="3300" kern="1200" dirty="0"/>
-        </a:p>
-      </dsp:txBody>
-      <dsp:txXfrm>
-        <a:off x="1298645" y="2173799"/>
-        <a:ext cx="1019075" cy="509537"/>
-      </dsp:txXfrm>
-    </dsp:sp>
-    <dsp:sp modelId="{8F4B7056-3882-4E58-89FB-B748EA5951EC}">
-      <dsp:nvSpPr>
-        <dsp:cNvPr id="0" name=""/>
-        <dsp:cNvSpPr/>
-      </dsp:nvSpPr>
-      <dsp:spPr>
-        <a:xfrm>
-          <a:off x="1298645" y="2897342"/>
-          <a:ext cx="1019075" cy="509537"/>
-        </a:xfrm>
-        <a:prstGeom prst="rect">
-          <a:avLst/>
-        </a:prstGeom>
-        <a:solidFill>
-          <a:schemeClr val="accent1">
-            <a:hueOff val="0"/>
-            <a:satOff val="0"/>
-            <a:lumOff val="0"/>
-            <a:alphaOff val="0"/>
-          </a:schemeClr>
-        </a:solidFill>
-        <a:ln w="12700" cap="flat" cmpd="sng" algn="ctr">
-          <a:solidFill>
-            <a:schemeClr val="lt1">
-              <a:hueOff val="0"/>
-              <a:satOff val="0"/>
-              <a:lumOff val="0"/>
-              <a:alphaOff val="0"/>
-            </a:schemeClr>
-          </a:solidFill>
-          <a:prstDash val="solid"/>
-          <a:miter lim="800000"/>
-        </a:ln>
-        <a:effectLst/>
-      </dsp:spPr>
-      <dsp:style>
-        <a:lnRef idx="2">
-          <a:scrgbClr r="0" g="0" b="0"/>
-        </a:lnRef>
-        <a:fillRef idx="1">
-          <a:scrgbClr r="0" g="0" b="0"/>
-        </a:fillRef>
-        <a:effectRef idx="0">
-          <a:scrgbClr r="0" g="0" b="0"/>
-        </a:effectRef>
-        <a:fontRef idx="minor">
-          <a:schemeClr val="lt1"/>
-        </a:fontRef>
-      </dsp:style>
-      <dsp:txBody>
-        <a:bodyPr spcFirstLastPara="0" vert="horz" wrap="square" lIns="20955" tIns="20955" rIns="20955" bIns="20955" numCol="1" spcCol="1270" anchor="ctr" anchorCtr="0">
-          <a:noAutofit/>
-        </a:bodyPr>
-        <a:lstStyle/>
-        <a:p>
-          <a:pPr lvl="0" algn="ctr" defTabSz="1466850">
-            <a:lnSpc>
-              <a:spcPct val="90000"/>
-            </a:lnSpc>
-            <a:spcBef>
-              <a:spcPct val="0"/>
-            </a:spcBef>
-            <a:spcAft>
-              <a:spcPct val="35000"/>
-            </a:spcAft>
-          </a:pPr>
-          <a:endParaRPr lang="en-US" sz="3300" kern="1200" dirty="0"/>
-        </a:p>
-      </dsp:txBody>
-      <dsp:txXfrm>
-        <a:off x="1298645" y="2897342"/>
-        <a:ext cx="1019075" cy="509537"/>
-      </dsp:txXfrm>
-    </dsp:sp>
-    <dsp:sp modelId="{D1D7CE4D-5286-425A-9A91-5F6E9AFCC10E}">
-      <dsp:nvSpPr>
-        <dsp:cNvPr id="0" name=""/>
-        <dsp:cNvSpPr/>
-      </dsp:nvSpPr>
-      <dsp:spPr>
-        <a:xfrm>
-          <a:off x="1298645" y="3620886"/>
-          <a:ext cx="1019075" cy="509537"/>
-        </a:xfrm>
-        <a:prstGeom prst="rect">
-          <a:avLst/>
-        </a:prstGeom>
-        <a:solidFill>
-          <a:schemeClr val="accent1">
-            <a:hueOff val="0"/>
-            <a:satOff val="0"/>
-            <a:lumOff val="0"/>
-            <a:alphaOff val="0"/>
-          </a:schemeClr>
-        </a:solidFill>
-        <a:ln w="12700" cap="flat" cmpd="sng" algn="ctr">
-          <a:solidFill>
-            <a:schemeClr val="lt1">
-              <a:hueOff val="0"/>
-              <a:satOff val="0"/>
-              <a:lumOff val="0"/>
-              <a:alphaOff val="0"/>
-            </a:schemeClr>
-          </a:solidFill>
-          <a:prstDash val="solid"/>
-          <a:miter lim="800000"/>
-        </a:ln>
-        <a:effectLst/>
-      </dsp:spPr>
-      <dsp:style>
-        <a:lnRef idx="2">
-          <a:scrgbClr r="0" g="0" b="0"/>
-        </a:lnRef>
-        <a:fillRef idx="1">
-          <a:scrgbClr r="0" g="0" b="0"/>
-        </a:fillRef>
-        <a:effectRef idx="0">
-          <a:scrgbClr r="0" g="0" b="0"/>
-        </a:effectRef>
-        <a:fontRef idx="minor">
-          <a:schemeClr val="lt1"/>
-        </a:fontRef>
-      </dsp:style>
-      <dsp:txBody>
-        <a:bodyPr spcFirstLastPara="0" vert="horz" wrap="square" lIns="20955" tIns="20955" rIns="20955" bIns="20955" numCol="1" spcCol="1270" anchor="ctr" anchorCtr="0">
-          <a:noAutofit/>
-        </a:bodyPr>
-        <a:lstStyle/>
-        <a:p>
-          <a:pPr lvl="0" algn="ctr" defTabSz="1466850">
-            <a:lnSpc>
-              <a:spcPct val="90000"/>
-            </a:lnSpc>
-            <a:spcBef>
-              <a:spcPct val="0"/>
-            </a:spcBef>
-            <a:spcAft>
-              <a:spcPct val="35000"/>
-            </a:spcAft>
-          </a:pPr>
-          <a:endParaRPr lang="en-US" sz="3300" kern="1200" dirty="0"/>
-        </a:p>
-      </dsp:txBody>
-      <dsp:txXfrm>
-        <a:off x="1298645" y="3620886"/>
-        <a:ext cx="1019075" cy="509537"/>
-      </dsp:txXfrm>
-    </dsp:sp>
-    <dsp:sp modelId="{7B82F5BA-67BE-4378-9012-F007FB32A6E7}">
-      <dsp:nvSpPr>
-        <dsp:cNvPr id="0" name=""/>
-        <dsp:cNvSpPr/>
-      </dsp:nvSpPr>
-      <dsp:spPr>
-        <a:xfrm>
-          <a:off x="1298645" y="4344429"/>
-          <a:ext cx="1019075" cy="509537"/>
-        </a:xfrm>
-        <a:prstGeom prst="rect">
-          <a:avLst/>
-        </a:prstGeom>
-        <a:solidFill>
-          <a:schemeClr val="accent1">
-            <a:hueOff val="0"/>
-            <a:satOff val="0"/>
-            <a:lumOff val="0"/>
-            <a:alphaOff val="0"/>
-          </a:schemeClr>
-        </a:solidFill>
-        <a:ln w="12700" cap="flat" cmpd="sng" algn="ctr">
-          <a:solidFill>
-            <a:schemeClr val="lt1">
-              <a:hueOff val="0"/>
-              <a:satOff val="0"/>
-              <a:lumOff val="0"/>
-              <a:alphaOff val="0"/>
-            </a:schemeClr>
-          </a:solidFill>
-          <a:prstDash val="solid"/>
-          <a:miter lim="800000"/>
-        </a:ln>
-        <a:effectLst/>
-      </dsp:spPr>
-      <dsp:style>
-        <a:lnRef idx="2">
-          <a:scrgbClr r="0" g="0" b="0"/>
-        </a:lnRef>
-        <a:fillRef idx="1">
-          <a:scrgbClr r="0" g="0" b="0"/>
-        </a:fillRef>
-        <a:effectRef idx="0">
-          <a:scrgbClr r="0" g="0" b="0"/>
-        </a:effectRef>
-        <a:fontRef idx="minor">
-          <a:schemeClr val="lt1"/>
-        </a:fontRef>
-      </dsp:style>
-      <dsp:txBody>
-        <a:bodyPr spcFirstLastPara="0" vert="horz" wrap="square" lIns="20955" tIns="20955" rIns="20955" bIns="20955" numCol="1" spcCol="1270" anchor="ctr" anchorCtr="0">
-          <a:noAutofit/>
-        </a:bodyPr>
-        <a:lstStyle/>
-        <a:p>
-          <a:pPr lvl="0" algn="ctr" defTabSz="1466850">
-            <a:lnSpc>
-              <a:spcPct val="90000"/>
-            </a:lnSpc>
-            <a:spcBef>
-              <a:spcPct val="0"/>
-            </a:spcBef>
-            <a:spcAft>
-              <a:spcPct val="35000"/>
-            </a:spcAft>
-          </a:pPr>
-          <a:endParaRPr lang="en-US" sz="3300" kern="1200" dirty="0"/>
-        </a:p>
-      </dsp:txBody>
-      <dsp:txXfrm>
-        <a:off x="1298645" y="4344429"/>
-        <a:ext cx="1019075" cy="509537"/>
-      </dsp:txXfrm>
-    </dsp:sp>
-    <dsp:sp modelId="{070CB09E-2B02-4108-9FD4-4CABFABB1A74}">
-      <dsp:nvSpPr>
-        <dsp:cNvPr id="0" name=""/>
-        <dsp:cNvSpPr/>
-      </dsp:nvSpPr>
-      <dsp:spPr>
-        <a:xfrm>
-          <a:off x="2276957" y="726711"/>
-          <a:ext cx="1019075" cy="509537"/>
-        </a:xfrm>
-        <a:prstGeom prst="rect">
-          <a:avLst/>
-        </a:prstGeom>
-        <a:solidFill>
-          <a:schemeClr val="accent1">
-            <a:hueOff val="0"/>
-            <a:satOff val="0"/>
-            <a:lumOff val="0"/>
-            <a:alphaOff val="0"/>
-          </a:schemeClr>
-        </a:solidFill>
-        <a:ln w="12700" cap="flat" cmpd="sng" algn="ctr">
-          <a:solidFill>
-            <a:schemeClr val="lt1">
-              <a:hueOff val="0"/>
-              <a:satOff val="0"/>
-              <a:lumOff val="0"/>
-              <a:alphaOff val="0"/>
-            </a:schemeClr>
-          </a:solidFill>
-          <a:prstDash val="solid"/>
-          <a:miter lim="800000"/>
-        </a:ln>
-        <a:effectLst/>
-      </dsp:spPr>
-      <dsp:style>
-        <a:lnRef idx="2">
-          <a:scrgbClr r="0" g="0" b="0"/>
-        </a:lnRef>
-        <a:fillRef idx="1">
-          <a:scrgbClr r="0" g="0" b="0"/>
-        </a:fillRef>
-        <a:effectRef idx="0">
-          <a:scrgbClr r="0" g="0" b="0"/>
-        </a:effectRef>
-        <a:fontRef idx="minor">
-          <a:schemeClr val="lt1"/>
-        </a:fontRef>
-      </dsp:style>
-      <dsp:txBody>
-        <a:bodyPr spcFirstLastPara="0" vert="horz" wrap="square" lIns="20955" tIns="20955" rIns="20955" bIns="20955" numCol="1" spcCol="1270" anchor="ctr" anchorCtr="0">
-          <a:noAutofit/>
-        </a:bodyPr>
-        <a:lstStyle/>
-        <a:p>
-          <a:pPr lvl="0" algn="ctr" defTabSz="1466850">
-            <a:lnSpc>
-              <a:spcPct val="90000"/>
-            </a:lnSpc>
-            <a:spcBef>
-              <a:spcPct val="0"/>
-            </a:spcBef>
-            <a:spcAft>
-              <a:spcPct val="35000"/>
-            </a:spcAft>
-          </a:pPr>
-          <a:r>
-            <a:rPr lang="en-US" sz="3300" kern="1200" dirty="0" smtClean="0"/>
-            <a:t> </a:t>
-          </a:r>
-          <a:endParaRPr lang="en-US" sz="3300" kern="1200" dirty="0"/>
-        </a:p>
-      </dsp:txBody>
-      <dsp:txXfrm>
-        <a:off x="2276957" y="726711"/>
-        <a:ext cx="1019075" cy="509537"/>
-      </dsp:txXfrm>
-    </dsp:sp>
-    <dsp:sp modelId="{C2563296-14A7-4396-B9D7-4473E01E24F6}">
-      <dsp:nvSpPr>
-        <dsp:cNvPr id="0" name=""/>
-        <dsp:cNvSpPr/>
-      </dsp:nvSpPr>
-      <dsp:spPr>
-        <a:xfrm>
-          <a:off x="2531726" y="1450255"/>
-          <a:ext cx="1019075" cy="509537"/>
-        </a:xfrm>
-        <a:prstGeom prst="rect">
-          <a:avLst/>
-        </a:prstGeom>
-        <a:solidFill>
-          <a:schemeClr val="accent1">
-            <a:hueOff val="0"/>
-            <a:satOff val="0"/>
-            <a:lumOff val="0"/>
-            <a:alphaOff val="0"/>
-          </a:schemeClr>
-        </a:solidFill>
-        <a:ln w="12700" cap="flat" cmpd="sng" algn="ctr">
-          <a:solidFill>
-            <a:schemeClr val="lt1">
-              <a:hueOff val="0"/>
-              <a:satOff val="0"/>
-              <a:lumOff val="0"/>
-              <a:alphaOff val="0"/>
-            </a:schemeClr>
-          </a:solidFill>
-          <a:prstDash val="solid"/>
-          <a:miter lim="800000"/>
-        </a:ln>
-        <a:effectLst/>
-      </dsp:spPr>
-      <dsp:style>
-        <a:lnRef idx="2">
-          <a:scrgbClr r="0" g="0" b="0"/>
-        </a:lnRef>
-        <a:fillRef idx="1">
-          <a:scrgbClr r="0" g="0" b="0"/>
-        </a:fillRef>
-        <a:effectRef idx="0">
-          <a:scrgbClr r="0" g="0" b="0"/>
-        </a:effectRef>
-        <a:fontRef idx="minor">
-          <a:schemeClr val="lt1"/>
-        </a:fontRef>
-      </dsp:style>
-      <dsp:txBody>
-        <a:bodyPr spcFirstLastPara="0" vert="horz" wrap="square" lIns="20955" tIns="20955" rIns="20955" bIns="20955" numCol="1" spcCol="1270" anchor="ctr" anchorCtr="0">
-          <a:noAutofit/>
-        </a:bodyPr>
-        <a:lstStyle/>
-        <a:p>
-          <a:pPr lvl="0" algn="ctr" defTabSz="1466850">
-            <a:lnSpc>
-              <a:spcPct val="90000"/>
-            </a:lnSpc>
-            <a:spcBef>
-              <a:spcPct val="0"/>
-            </a:spcBef>
-            <a:spcAft>
-              <a:spcPct val="35000"/>
-            </a:spcAft>
-          </a:pPr>
-          <a:endParaRPr lang="en-US" sz="3300" kern="1200" dirty="0"/>
-        </a:p>
-      </dsp:txBody>
-      <dsp:txXfrm>
-        <a:off x="2531726" y="1450255"/>
-        <a:ext cx="1019075" cy="509537"/>
-      </dsp:txXfrm>
-    </dsp:sp>
-    <dsp:sp modelId="{32512C16-563B-4AC5-B8F4-EB8FEAF4B047}">
-      <dsp:nvSpPr>
-        <dsp:cNvPr id="0" name=""/>
-        <dsp:cNvSpPr/>
-      </dsp:nvSpPr>
-      <dsp:spPr>
-        <a:xfrm>
-          <a:off x="2531726" y="2173799"/>
-          <a:ext cx="1019075" cy="509537"/>
-        </a:xfrm>
-        <a:prstGeom prst="rect">
-          <a:avLst/>
-        </a:prstGeom>
-        <a:solidFill>
-          <a:schemeClr val="accent1">
-            <a:hueOff val="0"/>
-            <a:satOff val="0"/>
-            <a:lumOff val="0"/>
-            <a:alphaOff val="0"/>
-          </a:schemeClr>
-        </a:solidFill>
-        <a:ln w="12700" cap="flat" cmpd="sng" algn="ctr">
-          <a:solidFill>
-            <a:schemeClr val="lt1">
-              <a:hueOff val="0"/>
-              <a:satOff val="0"/>
-              <a:lumOff val="0"/>
-              <a:alphaOff val="0"/>
-            </a:schemeClr>
-          </a:solidFill>
-          <a:prstDash val="solid"/>
-          <a:miter lim="800000"/>
-        </a:ln>
-        <a:effectLst/>
-      </dsp:spPr>
-      <dsp:style>
-        <a:lnRef idx="2">
-          <a:scrgbClr r="0" g="0" b="0"/>
-        </a:lnRef>
-        <a:fillRef idx="1">
-          <a:scrgbClr r="0" g="0" b="0"/>
-        </a:fillRef>
-        <a:effectRef idx="0">
-          <a:scrgbClr r="0" g="0" b="0"/>
-        </a:effectRef>
-        <a:fontRef idx="minor">
-          <a:schemeClr val="lt1"/>
-        </a:fontRef>
-      </dsp:style>
-      <dsp:txBody>
-        <a:bodyPr spcFirstLastPara="0" vert="horz" wrap="square" lIns="20955" tIns="20955" rIns="20955" bIns="20955" numCol="1" spcCol="1270" anchor="ctr" anchorCtr="0">
-          <a:noAutofit/>
-        </a:bodyPr>
-        <a:lstStyle/>
-        <a:p>
-          <a:pPr lvl="0" algn="ctr" defTabSz="1466850">
-            <a:lnSpc>
-              <a:spcPct val="90000"/>
-            </a:lnSpc>
-            <a:spcBef>
-              <a:spcPct val="0"/>
-            </a:spcBef>
-            <a:spcAft>
-              <a:spcPct val="35000"/>
-            </a:spcAft>
-          </a:pPr>
-          <a:endParaRPr lang="en-US" sz="3300" kern="1200" dirty="0"/>
-        </a:p>
-      </dsp:txBody>
-      <dsp:txXfrm>
-        <a:off x="2531726" y="2173799"/>
-        <a:ext cx="1019075" cy="509537"/>
-      </dsp:txXfrm>
-    </dsp:sp>
-    <dsp:sp modelId="{CE4106E7-529F-4F85-A920-29FD5F83A5FC}">
-      <dsp:nvSpPr>
-        <dsp:cNvPr id="0" name=""/>
-        <dsp:cNvSpPr/>
-      </dsp:nvSpPr>
-      <dsp:spPr>
-        <a:xfrm>
-          <a:off x="2531726" y="2897342"/>
-          <a:ext cx="1019075" cy="509537"/>
-        </a:xfrm>
-        <a:prstGeom prst="rect">
-          <a:avLst/>
-        </a:prstGeom>
-        <a:solidFill>
-          <a:schemeClr val="accent1">
-            <a:hueOff val="0"/>
-            <a:satOff val="0"/>
-            <a:lumOff val="0"/>
-            <a:alphaOff val="0"/>
-          </a:schemeClr>
-        </a:solidFill>
-        <a:ln w="12700" cap="flat" cmpd="sng" algn="ctr">
-          <a:solidFill>
-            <a:schemeClr val="lt1">
-              <a:hueOff val="0"/>
-              <a:satOff val="0"/>
-              <a:lumOff val="0"/>
-              <a:alphaOff val="0"/>
-            </a:schemeClr>
-          </a:solidFill>
-          <a:prstDash val="solid"/>
-          <a:miter lim="800000"/>
-        </a:ln>
-        <a:effectLst/>
-      </dsp:spPr>
-      <dsp:style>
-        <a:lnRef idx="2">
-          <a:scrgbClr r="0" g="0" b="0"/>
-        </a:lnRef>
-        <a:fillRef idx="1">
-          <a:scrgbClr r="0" g="0" b="0"/>
-        </a:fillRef>
-        <a:effectRef idx="0">
-          <a:scrgbClr r="0" g="0" b="0"/>
-        </a:effectRef>
-        <a:fontRef idx="minor">
-          <a:schemeClr val="lt1"/>
-        </a:fontRef>
-      </dsp:style>
-      <dsp:txBody>
-        <a:bodyPr spcFirstLastPara="0" vert="horz" wrap="square" lIns="20955" tIns="20955" rIns="20955" bIns="20955" numCol="1" spcCol="1270" anchor="ctr" anchorCtr="0">
-          <a:noAutofit/>
-        </a:bodyPr>
-        <a:lstStyle/>
-        <a:p>
-          <a:pPr lvl="0" algn="ctr" defTabSz="1466850">
-            <a:lnSpc>
-              <a:spcPct val="90000"/>
-            </a:lnSpc>
-            <a:spcBef>
-              <a:spcPct val="0"/>
-            </a:spcBef>
-            <a:spcAft>
-              <a:spcPct val="35000"/>
-            </a:spcAft>
-          </a:pPr>
-          <a:endParaRPr lang="en-US" sz="3300" kern="1200" dirty="0"/>
-        </a:p>
-      </dsp:txBody>
-      <dsp:txXfrm>
-        <a:off x="2531726" y="2897342"/>
-        <a:ext cx="1019075" cy="509537"/>
-      </dsp:txXfrm>
-    </dsp:sp>
-    <dsp:sp modelId="{F8A3AE9F-0B0E-4873-8C3B-D1F388514CC1}">
-      <dsp:nvSpPr>
-        <dsp:cNvPr id="0" name=""/>
-        <dsp:cNvSpPr/>
-      </dsp:nvSpPr>
-      <dsp:spPr>
-        <a:xfrm>
-          <a:off x="2531726" y="3620886"/>
-          <a:ext cx="1019075" cy="509537"/>
-        </a:xfrm>
-        <a:prstGeom prst="rect">
-          <a:avLst/>
-        </a:prstGeom>
-        <a:solidFill>
-          <a:schemeClr val="accent1">
-            <a:hueOff val="0"/>
-            <a:satOff val="0"/>
-            <a:lumOff val="0"/>
-            <a:alphaOff val="0"/>
-          </a:schemeClr>
-        </a:solidFill>
-        <a:ln w="12700" cap="flat" cmpd="sng" algn="ctr">
-          <a:solidFill>
-            <a:schemeClr val="lt1">
-              <a:hueOff val="0"/>
-              <a:satOff val="0"/>
-              <a:lumOff val="0"/>
-              <a:alphaOff val="0"/>
-            </a:schemeClr>
-          </a:solidFill>
-          <a:prstDash val="solid"/>
-          <a:miter lim="800000"/>
-        </a:ln>
-        <a:effectLst/>
-      </dsp:spPr>
-      <dsp:style>
-        <a:lnRef idx="2">
-          <a:scrgbClr r="0" g="0" b="0"/>
-        </a:lnRef>
-        <a:fillRef idx="1">
-          <a:scrgbClr r="0" g="0" b="0"/>
-        </a:fillRef>
-        <a:effectRef idx="0">
-          <a:scrgbClr r="0" g="0" b="0"/>
-        </a:effectRef>
-        <a:fontRef idx="minor">
-          <a:schemeClr val="lt1"/>
-        </a:fontRef>
-      </dsp:style>
-      <dsp:txBody>
-        <a:bodyPr spcFirstLastPara="0" vert="horz" wrap="square" lIns="20955" tIns="20955" rIns="20955" bIns="20955" numCol="1" spcCol="1270" anchor="ctr" anchorCtr="0">
-          <a:noAutofit/>
-        </a:bodyPr>
-        <a:lstStyle/>
-        <a:p>
-          <a:pPr lvl="0" algn="ctr" defTabSz="1466850">
-            <a:lnSpc>
-              <a:spcPct val="90000"/>
-            </a:lnSpc>
-            <a:spcBef>
-              <a:spcPct val="0"/>
-            </a:spcBef>
-            <a:spcAft>
-              <a:spcPct val="35000"/>
-            </a:spcAft>
-          </a:pPr>
-          <a:endParaRPr lang="en-US" sz="3300" kern="1200" dirty="0"/>
-        </a:p>
-      </dsp:txBody>
-      <dsp:txXfrm>
-        <a:off x="2531726" y="3620886"/>
-        <a:ext cx="1019075" cy="509537"/>
-      </dsp:txXfrm>
-    </dsp:sp>
-    <dsp:sp modelId="{3B035259-54EE-4541-9884-DACC7E83F862}">
-      <dsp:nvSpPr>
-        <dsp:cNvPr id="0" name=""/>
-        <dsp:cNvSpPr/>
-      </dsp:nvSpPr>
-      <dsp:spPr>
-        <a:xfrm>
-          <a:off x="2531726" y="4344429"/>
-          <a:ext cx="1019075" cy="509537"/>
-        </a:xfrm>
-        <a:prstGeom prst="rect">
-          <a:avLst/>
-        </a:prstGeom>
-        <a:solidFill>
-          <a:schemeClr val="accent1">
-            <a:hueOff val="0"/>
-            <a:satOff val="0"/>
-            <a:lumOff val="0"/>
-            <a:alphaOff val="0"/>
-          </a:schemeClr>
-        </a:solidFill>
-        <a:ln w="12700" cap="flat" cmpd="sng" algn="ctr">
-          <a:solidFill>
-            <a:schemeClr val="lt1">
-              <a:hueOff val="0"/>
-              <a:satOff val="0"/>
-              <a:lumOff val="0"/>
-              <a:alphaOff val="0"/>
-            </a:schemeClr>
-          </a:solidFill>
-          <a:prstDash val="solid"/>
-          <a:miter lim="800000"/>
-        </a:ln>
-        <a:effectLst/>
-      </dsp:spPr>
-      <dsp:style>
-        <a:lnRef idx="2">
-          <a:scrgbClr r="0" g="0" b="0"/>
-        </a:lnRef>
-        <a:fillRef idx="1">
-          <a:scrgbClr r="0" g="0" b="0"/>
-        </a:fillRef>
-        <a:effectRef idx="0">
-          <a:scrgbClr r="0" g="0" b="0"/>
-        </a:effectRef>
-        <a:fontRef idx="minor">
-          <a:schemeClr val="lt1"/>
-        </a:fontRef>
-      </dsp:style>
-      <dsp:txBody>
-        <a:bodyPr spcFirstLastPara="0" vert="horz" wrap="square" lIns="20955" tIns="20955" rIns="20955" bIns="20955" numCol="1" spcCol="1270" anchor="ctr" anchorCtr="0">
-          <a:noAutofit/>
-        </a:bodyPr>
-        <a:lstStyle/>
-        <a:p>
-          <a:pPr lvl="0" algn="ctr" defTabSz="1466850">
-            <a:lnSpc>
-              <a:spcPct val="90000"/>
-            </a:lnSpc>
-            <a:spcBef>
-              <a:spcPct val="0"/>
-            </a:spcBef>
-            <a:spcAft>
-              <a:spcPct val="35000"/>
-            </a:spcAft>
-          </a:pPr>
-          <a:r>
-            <a:rPr lang="en-US" sz="3300" kern="1200" dirty="0" smtClean="0"/>
-            <a:t> </a:t>
-          </a:r>
-          <a:endParaRPr lang="en-US" sz="3300" kern="1200" dirty="0"/>
-        </a:p>
-      </dsp:txBody>
-      <dsp:txXfrm>
-        <a:off x="2531726" y="4344429"/>
-        <a:ext cx="1019075" cy="509537"/>
-      </dsp:txXfrm>
-    </dsp:sp>
-    <dsp:sp modelId="{729A43B8-78BA-4267-90EF-F2FC1C6B3978}">
-      <dsp:nvSpPr>
-        <dsp:cNvPr id="0" name=""/>
-        <dsp:cNvSpPr/>
-      </dsp:nvSpPr>
-      <dsp:spPr>
-        <a:xfrm>
-          <a:off x="3510039" y="726711"/>
-          <a:ext cx="1019075" cy="509537"/>
-        </a:xfrm>
-        <a:prstGeom prst="rect">
-          <a:avLst/>
-        </a:prstGeom>
-        <a:solidFill>
-          <a:schemeClr val="accent1">
-            <a:hueOff val="0"/>
-            <a:satOff val="0"/>
-            <a:lumOff val="0"/>
-            <a:alphaOff val="0"/>
-          </a:schemeClr>
-        </a:solidFill>
-        <a:ln w="12700" cap="flat" cmpd="sng" algn="ctr">
-          <a:solidFill>
-            <a:schemeClr val="lt1">
-              <a:hueOff val="0"/>
-              <a:satOff val="0"/>
-              <a:lumOff val="0"/>
-              <a:alphaOff val="0"/>
-            </a:schemeClr>
-          </a:solidFill>
-          <a:prstDash val="solid"/>
-          <a:miter lim="800000"/>
-        </a:ln>
-        <a:effectLst/>
-      </dsp:spPr>
-      <dsp:style>
-        <a:lnRef idx="2">
-          <a:scrgbClr r="0" g="0" b="0"/>
-        </a:lnRef>
-        <a:fillRef idx="1">
-          <a:scrgbClr r="0" g="0" b="0"/>
-        </a:fillRef>
-        <a:effectRef idx="0">
-          <a:scrgbClr r="0" g="0" b="0"/>
-        </a:effectRef>
-        <a:fontRef idx="minor">
-          <a:schemeClr val="lt1"/>
-        </a:fontRef>
-      </dsp:style>
-      <dsp:txBody>
-        <a:bodyPr spcFirstLastPara="0" vert="horz" wrap="square" lIns="20955" tIns="20955" rIns="20955" bIns="20955" numCol="1" spcCol="1270" anchor="ctr" anchorCtr="0">
-          <a:noAutofit/>
-        </a:bodyPr>
-        <a:lstStyle/>
-        <a:p>
-          <a:pPr lvl="0" algn="ctr" defTabSz="1466850">
-            <a:lnSpc>
-              <a:spcPct val="90000"/>
-            </a:lnSpc>
-            <a:spcBef>
-              <a:spcPct val="0"/>
-            </a:spcBef>
-            <a:spcAft>
-              <a:spcPct val="35000"/>
-            </a:spcAft>
-          </a:pPr>
-          <a:r>
-            <a:rPr lang="en-US" sz="3300" kern="1200" dirty="0" smtClean="0"/>
-            <a:t> </a:t>
-          </a:r>
-          <a:endParaRPr lang="en-US" sz="3300" kern="1200" dirty="0"/>
-        </a:p>
-      </dsp:txBody>
-      <dsp:txXfrm>
-        <a:off x="3510039" y="726711"/>
-        <a:ext cx="1019075" cy="509537"/>
-      </dsp:txXfrm>
-    </dsp:sp>
-    <dsp:sp modelId="{01512EBD-7F9E-44F8-803B-FEC51033E09B}">
-      <dsp:nvSpPr>
-        <dsp:cNvPr id="0" name=""/>
-        <dsp:cNvSpPr/>
-      </dsp:nvSpPr>
-      <dsp:spPr>
-        <a:xfrm>
-          <a:off x="3764808" y="1450255"/>
-          <a:ext cx="1019075" cy="509537"/>
-        </a:xfrm>
-        <a:prstGeom prst="rect">
-          <a:avLst/>
-        </a:prstGeom>
-        <a:solidFill>
-          <a:schemeClr val="accent1">
-            <a:hueOff val="0"/>
-            <a:satOff val="0"/>
-            <a:lumOff val="0"/>
-            <a:alphaOff val="0"/>
-          </a:schemeClr>
-        </a:solidFill>
-        <a:ln w="12700" cap="flat" cmpd="sng" algn="ctr">
-          <a:solidFill>
-            <a:schemeClr val="lt1">
-              <a:hueOff val="0"/>
-              <a:satOff val="0"/>
-              <a:lumOff val="0"/>
-              <a:alphaOff val="0"/>
-            </a:schemeClr>
-          </a:solidFill>
-          <a:prstDash val="solid"/>
-          <a:miter lim="800000"/>
-        </a:ln>
-        <a:effectLst/>
-      </dsp:spPr>
-      <dsp:style>
-        <a:lnRef idx="2">
-          <a:scrgbClr r="0" g="0" b="0"/>
-        </a:lnRef>
-        <a:fillRef idx="1">
-          <a:scrgbClr r="0" g="0" b="0"/>
-        </a:fillRef>
-        <a:effectRef idx="0">
-          <a:scrgbClr r="0" g="0" b="0"/>
-        </a:effectRef>
-        <a:fontRef idx="minor">
-          <a:schemeClr val="lt1"/>
-        </a:fontRef>
-      </dsp:style>
-      <dsp:txBody>
-        <a:bodyPr spcFirstLastPara="0" vert="horz" wrap="square" lIns="20955" tIns="20955" rIns="20955" bIns="20955" numCol="1" spcCol="1270" anchor="ctr" anchorCtr="0">
-          <a:noAutofit/>
-        </a:bodyPr>
-        <a:lstStyle/>
-        <a:p>
-          <a:pPr lvl="0" algn="ctr" defTabSz="1466850">
-            <a:lnSpc>
-              <a:spcPct val="90000"/>
-            </a:lnSpc>
-            <a:spcBef>
-              <a:spcPct val="0"/>
-            </a:spcBef>
-            <a:spcAft>
-              <a:spcPct val="35000"/>
-            </a:spcAft>
-          </a:pPr>
-          <a:endParaRPr lang="en-US" sz="3300" kern="1200" dirty="0"/>
-        </a:p>
-      </dsp:txBody>
-      <dsp:txXfrm>
-        <a:off x="3764808" y="1450255"/>
-        <a:ext cx="1019075" cy="509537"/>
-      </dsp:txXfrm>
-    </dsp:sp>
-    <dsp:sp modelId="{3B334B83-86FA-4E1F-BD92-ACD6F539B432}">
-      <dsp:nvSpPr>
-        <dsp:cNvPr id="0" name=""/>
-        <dsp:cNvSpPr/>
-      </dsp:nvSpPr>
-      <dsp:spPr>
-        <a:xfrm>
-          <a:off x="3764808" y="2173799"/>
-          <a:ext cx="1019075" cy="509537"/>
-        </a:xfrm>
-        <a:prstGeom prst="rect">
-          <a:avLst/>
-        </a:prstGeom>
-        <a:solidFill>
-          <a:schemeClr val="accent1">
-            <a:hueOff val="0"/>
-            <a:satOff val="0"/>
-            <a:lumOff val="0"/>
-            <a:alphaOff val="0"/>
-          </a:schemeClr>
-        </a:solidFill>
-        <a:ln w="12700" cap="flat" cmpd="sng" algn="ctr">
-          <a:solidFill>
-            <a:schemeClr val="lt1">
-              <a:hueOff val="0"/>
-              <a:satOff val="0"/>
-              <a:lumOff val="0"/>
-              <a:alphaOff val="0"/>
-            </a:schemeClr>
-          </a:solidFill>
-          <a:prstDash val="solid"/>
-          <a:miter lim="800000"/>
-        </a:ln>
-        <a:effectLst/>
-      </dsp:spPr>
-      <dsp:style>
-        <a:lnRef idx="2">
-          <a:scrgbClr r="0" g="0" b="0"/>
-        </a:lnRef>
-        <a:fillRef idx="1">
-          <a:scrgbClr r="0" g="0" b="0"/>
-        </a:fillRef>
-        <a:effectRef idx="0">
-          <a:scrgbClr r="0" g="0" b="0"/>
-        </a:effectRef>
-        <a:fontRef idx="minor">
-          <a:schemeClr val="lt1"/>
-        </a:fontRef>
-      </dsp:style>
-      <dsp:txBody>
-        <a:bodyPr spcFirstLastPara="0" vert="horz" wrap="square" lIns="20955" tIns="20955" rIns="20955" bIns="20955" numCol="1" spcCol="1270" anchor="ctr" anchorCtr="0">
-          <a:noAutofit/>
-        </a:bodyPr>
-        <a:lstStyle/>
-        <a:p>
-          <a:pPr lvl="0" algn="ctr" defTabSz="1466850">
-            <a:lnSpc>
-              <a:spcPct val="90000"/>
-            </a:lnSpc>
-            <a:spcBef>
-              <a:spcPct val="0"/>
-            </a:spcBef>
-            <a:spcAft>
-              <a:spcPct val="35000"/>
-            </a:spcAft>
-          </a:pPr>
-          <a:endParaRPr lang="en-US" sz="3300" kern="1200" dirty="0"/>
-        </a:p>
-      </dsp:txBody>
-      <dsp:txXfrm>
-        <a:off x="3764808" y="2173799"/>
-        <a:ext cx="1019075" cy="509537"/>
-      </dsp:txXfrm>
-    </dsp:sp>
-    <dsp:sp modelId="{7BE5228E-F42A-4264-BA65-439FE54AD295}">
-      <dsp:nvSpPr>
-        <dsp:cNvPr id="0" name=""/>
-        <dsp:cNvSpPr/>
-      </dsp:nvSpPr>
-      <dsp:spPr>
-        <a:xfrm>
-          <a:off x="3764808" y="2897342"/>
-          <a:ext cx="1019075" cy="509537"/>
-        </a:xfrm>
-        <a:prstGeom prst="rect">
-          <a:avLst/>
-        </a:prstGeom>
-        <a:solidFill>
-          <a:schemeClr val="accent1">
-            <a:hueOff val="0"/>
-            <a:satOff val="0"/>
-            <a:lumOff val="0"/>
-            <a:alphaOff val="0"/>
-          </a:schemeClr>
-        </a:solidFill>
-        <a:ln w="12700" cap="flat" cmpd="sng" algn="ctr">
-          <a:solidFill>
-            <a:schemeClr val="lt1">
-              <a:hueOff val="0"/>
-              <a:satOff val="0"/>
-              <a:lumOff val="0"/>
-              <a:alphaOff val="0"/>
-            </a:schemeClr>
-          </a:solidFill>
-          <a:prstDash val="solid"/>
-          <a:miter lim="800000"/>
-        </a:ln>
-        <a:effectLst/>
-      </dsp:spPr>
-      <dsp:style>
-        <a:lnRef idx="2">
-          <a:scrgbClr r="0" g="0" b="0"/>
-        </a:lnRef>
-        <a:fillRef idx="1">
-          <a:scrgbClr r="0" g="0" b="0"/>
-        </a:fillRef>
-        <a:effectRef idx="0">
-          <a:scrgbClr r="0" g="0" b="0"/>
-        </a:effectRef>
-        <a:fontRef idx="minor">
-          <a:schemeClr val="lt1"/>
-        </a:fontRef>
-      </dsp:style>
-      <dsp:txBody>
-        <a:bodyPr spcFirstLastPara="0" vert="horz" wrap="square" lIns="20955" tIns="20955" rIns="20955" bIns="20955" numCol="1" spcCol="1270" anchor="ctr" anchorCtr="0">
-          <a:noAutofit/>
-        </a:bodyPr>
-        <a:lstStyle/>
-        <a:p>
-          <a:pPr lvl="0" algn="ctr" defTabSz="1466850">
-            <a:lnSpc>
-              <a:spcPct val="90000"/>
-            </a:lnSpc>
-            <a:spcBef>
-              <a:spcPct val="0"/>
-            </a:spcBef>
-            <a:spcAft>
-              <a:spcPct val="35000"/>
-            </a:spcAft>
-          </a:pPr>
-          <a:endParaRPr lang="en-US" sz="3300" kern="1200" dirty="0"/>
-        </a:p>
-      </dsp:txBody>
-      <dsp:txXfrm>
-        <a:off x="3764808" y="2897342"/>
-        <a:ext cx="1019075" cy="509537"/>
-      </dsp:txXfrm>
-    </dsp:sp>
-    <dsp:sp modelId="{DF14D50D-F2AB-41FA-8211-04913B0DCC33}">
-      <dsp:nvSpPr>
-        <dsp:cNvPr id="0" name=""/>
-        <dsp:cNvSpPr/>
-      </dsp:nvSpPr>
-      <dsp:spPr>
-        <a:xfrm>
-          <a:off x="3764808" y="3620886"/>
-          <a:ext cx="1019075" cy="509537"/>
-        </a:xfrm>
-        <a:prstGeom prst="rect">
-          <a:avLst/>
-        </a:prstGeom>
-        <a:solidFill>
-          <a:schemeClr val="accent1">
-            <a:hueOff val="0"/>
-            <a:satOff val="0"/>
-            <a:lumOff val="0"/>
-            <a:alphaOff val="0"/>
-          </a:schemeClr>
-        </a:solidFill>
-        <a:ln w="12700" cap="flat" cmpd="sng" algn="ctr">
-          <a:solidFill>
-            <a:schemeClr val="lt1">
-              <a:hueOff val="0"/>
-              <a:satOff val="0"/>
-              <a:lumOff val="0"/>
-              <a:alphaOff val="0"/>
-            </a:schemeClr>
-          </a:solidFill>
-          <a:prstDash val="solid"/>
-          <a:miter lim="800000"/>
-        </a:ln>
-        <a:effectLst/>
-      </dsp:spPr>
-      <dsp:style>
-        <a:lnRef idx="2">
-          <a:scrgbClr r="0" g="0" b="0"/>
-        </a:lnRef>
-        <a:fillRef idx="1">
-          <a:scrgbClr r="0" g="0" b="0"/>
-        </a:fillRef>
-        <a:effectRef idx="0">
-          <a:scrgbClr r="0" g="0" b="0"/>
-        </a:effectRef>
-        <a:fontRef idx="minor">
-          <a:schemeClr val="lt1"/>
-        </a:fontRef>
-      </dsp:style>
-      <dsp:txBody>
-        <a:bodyPr spcFirstLastPara="0" vert="horz" wrap="square" lIns="20955" tIns="20955" rIns="20955" bIns="20955" numCol="1" spcCol="1270" anchor="ctr" anchorCtr="0">
-          <a:noAutofit/>
-        </a:bodyPr>
-        <a:lstStyle/>
-        <a:p>
-          <a:pPr lvl="0" algn="ctr" defTabSz="1466850">
-            <a:lnSpc>
-              <a:spcPct val="90000"/>
-            </a:lnSpc>
-            <a:spcBef>
-              <a:spcPct val="0"/>
-            </a:spcBef>
-            <a:spcAft>
-              <a:spcPct val="35000"/>
-            </a:spcAft>
-          </a:pPr>
-          <a:endParaRPr lang="en-US" sz="3300" kern="1200" dirty="0"/>
-        </a:p>
-      </dsp:txBody>
-      <dsp:txXfrm>
-        <a:off x="3764808" y="3620886"/>
-        <a:ext cx="1019075" cy="509537"/>
-      </dsp:txXfrm>
-    </dsp:sp>
-    <dsp:sp modelId="{55A86BAF-F088-4A7E-89C0-245270A9A9FE}">
-      <dsp:nvSpPr>
-        <dsp:cNvPr id="0" name=""/>
-        <dsp:cNvSpPr/>
-      </dsp:nvSpPr>
-      <dsp:spPr>
-        <a:xfrm>
-          <a:off x="3764808" y="4344429"/>
-          <a:ext cx="1019075" cy="509537"/>
-        </a:xfrm>
-        <a:prstGeom prst="rect">
-          <a:avLst/>
-        </a:prstGeom>
-        <a:solidFill>
-          <a:schemeClr val="accent1">
-            <a:hueOff val="0"/>
-            <a:satOff val="0"/>
-            <a:lumOff val="0"/>
-            <a:alphaOff val="0"/>
-          </a:schemeClr>
-        </a:solidFill>
-        <a:ln w="12700" cap="flat" cmpd="sng" algn="ctr">
-          <a:solidFill>
-            <a:schemeClr val="lt1">
-              <a:hueOff val="0"/>
-              <a:satOff val="0"/>
-              <a:lumOff val="0"/>
-              <a:alphaOff val="0"/>
-            </a:schemeClr>
-          </a:solidFill>
-          <a:prstDash val="solid"/>
-          <a:miter lim="800000"/>
-        </a:ln>
-        <a:effectLst/>
-      </dsp:spPr>
-      <dsp:style>
-        <a:lnRef idx="2">
-          <a:scrgbClr r="0" g="0" b="0"/>
-        </a:lnRef>
-        <a:fillRef idx="1">
-          <a:scrgbClr r="0" g="0" b="0"/>
-        </a:fillRef>
-        <a:effectRef idx="0">
-          <a:scrgbClr r="0" g="0" b="0"/>
-        </a:effectRef>
-        <a:fontRef idx="minor">
-          <a:schemeClr val="lt1"/>
-        </a:fontRef>
-      </dsp:style>
-      <dsp:txBody>
-        <a:bodyPr spcFirstLastPara="0" vert="horz" wrap="square" lIns="20955" tIns="20955" rIns="20955" bIns="20955" numCol="1" spcCol="1270" anchor="ctr" anchorCtr="0">
-          <a:noAutofit/>
-        </a:bodyPr>
-        <a:lstStyle/>
-        <a:p>
-          <a:pPr lvl="0" algn="ctr" defTabSz="1466850">
-            <a:lnSpc>
-              <a:spcPct val="90000"/>
-            </a:lnSpc>
-            <a:spcBef>
-              <a:spcPct val="0"/>
-            </a:spcBef>
-            <a:spcAft>
-              <a:spcPct val="35000"/>
-            </a:spcAft>
-          </a:pPr>
-          <a:endParaRPr lang="en-US" sz="3300" kern="1200" dirty="0"/>
-        </a:p>
-      </dsp:txBody>
-      <dsp:txXfrm>
-        <a:off x="3764808" y="4344429"/>
-        <a:ext cx="1019075" cy="509537"/>
-      </dsp:txXfrm>
-    </dsp:sp>
   </dsp:spTree>
 </dsp:drawing>
 </file>
@@ -10955,19 +8104,21 @@
           <a:p>
             <a:r>
               <a:rPr lang="en-US" dirty="0" smtClean="0"/>
-              <a:t>Humans</a:t>
-            </a:r>
-          </a:p>
-          <a:p>
-            <a:r>
-              <a:rPr lang="en-US" dirty="0" smtClean="0"/>
-              <a:t>Cognitive load</a:t>
-            </a:r>
-          </a:p>
-          <a:p>
-            <a:r>
-              <a:rPr lang="en-US" dirty="0" smtClean="0"/>
-              <a:t>Complexity, illegibility, size</a:t>
+              <a:t>1/3 features are useful. Some</a:t>
+            </a:r>
+            <a:r>
+              <a:rPr lang="en-US" baseline="0" dirty="0" smtClean="0"/>
+              <a:t> very useful. The very harmful ones get removed in beta. Regression to mean means your product will have some value.</a:t>
+            </a:r>
+          </a:p>
+          <a:p>
+            <a:r>
+              <a:rPr lang="en-US" baseline="0" dirty="0" smtClean="0"/>
+              <a:t>But only 1/3 of projects finish in required time and scope. Odds are you will be late to market and missing some of the </a:t>
+            </a:r>
+            <a:r>
+              <a:rPr lang="en-US" baseline="0" smtClean="0"/>
+              <a:t>things you need.</a:t>
             </a:r>
             <a:endParaRPr lang="en-US" dirty="0"/>
           </a:p>
@@ -10990,7 +8141,7 @@
           <a:p>
             <a:fld id="{65BF156B-27E6-4EA6-BAD5-67954ACEB120}" type="slidenum">
               <a:rPr lang="en-US" smtClean="0"/>
-              <a:t>12</a:t>
+              <a:t>6</a:t>
             </a:fld>
             <a:endParaRPr lang="en-US"/>
           </a:p>
@@ -10999,7 +8150,7 @@
     </p:spTree>
     <p:extLst>
       <p:ext uri="{BB962C8B-B14F-4D97-AF65-F5344CB8AC3E}">
-        <p14:creationId xmlns:p14="http://schemas.microsoft.com/office/powerpoint/2010/main" val="812534229"/>
+        <p14:creationId xmlns:p14="http://schemas.microsoft.com/office/powerpoint/2010/main" val="3940192246"/>
       </p:ext>
     </p:extLst>
   </p:cSld>
@@ -11055,29 +8206,19 @@
           <a:p>
             <a:r>
               <a:rPr lang="en-US" dirty="0" smtClean="0"/>
-              <a:t>Non-roles: </a:t>
-            </a:r>
-            <a:r>
-              <a:rPr lang="en-US" dirty="0" err="1" smtClean="0"/>
-              <a:t>scrummaster</a:t>
-            </a:r>
+              <a:t>Humans</a:t>
+            </a:r>
+          </a:p>
+          <a:p>
             <a:r>
               <a:rPr lang="en-US" dirty="0" smtClean="0"/>
-              <a:t>, product owner, manager.</a:t>
+              <a:t>Cognitive load</a:t>
             </a:r>
           </a:p>
           <a:p>
             <a:r>
               <a:rPr lang="en-US" dirty="0" smtClean="0"/>
-              <a:t>Collaboration -&gt; if something is important, assign it to team. Use individual accountability for unimportant </a:t>
-            </a:r>
-            <a:r>
-              <a:rPr lang="en-US" dirty="0" err="1" smtClean="0"/>
-              <a:t>scut</a:t>
-            </a:r>
-            <a:r>
-              <a:rPr lang="en-US" dirty="0" smtClean="0"/>
-              <a:t> work.</a:t>
+              <a:t>Complexity, illegibility, size</a:t>
             </a:r>
             <a:endParaRPr lang="en-US" dirty="0"/>
           </a:p>
@@ -11100,7 +8241,7 @@
           <a:p>
             <a:fld id="{65BF156B-27E6-4EA6-BAD5-67954ACEB120}" type="slidenum">
               <a:rPr lang="en-US" smtClean="0"/>
-              <a:t>17</a:t>
+              <a:t>13</a:t>
             </a:fld>
             <a:endParaRPr lang="en-US"/>
           </a:p>
@@ -11109,7 +8250,7 @@
     </p:spTree>
     <p:extLst>
       <p:ext uri="{BB962C8B-B14F-4D97-AF65-F5344CB8AC3E}">
-        <p14:creationId xmlns:p14="http://schemas.microsoft.com/office/powerpoint/2010/main" val="1070351152"/>
+        <p14:creationId xmlns:p14="http://schemas.microsoft.com/office/powerpoint/2010/main" val="812534229"/>
       </p:ext>
     </p:extLst>
   </p:cSld>
@@ -11146,12 +8287,7 @@
             <p:ph type="sldImg"/>
           </p:nvPr>
         </p:nvSpPr>
-        <p:spPr>
-          <a:xfrm>
-            <a:off x="685800" y="1143000"/>
-            <a:ext cx="5486400" cy="3086100"/>
-          </a:xfrm>
-        </p:spPr>
+        <p:spPr/>
       </p:sp>
       <p:sp>
         <p:nvSpPr>
@@ -11170,17 +8306,29 @@
           <a:p>
             <a:r>
               <a:rPr lang="en-US" dirty="0" smtClean="0"/>
-              <a:t>Vision is bottom-up. At least, it is if you want the vision to be informed</a:t>
-            </a:r>
-            <a:r>
-              <a:rPr lang="en-US" baseline="0" dirty="0" smtClean="0"/>
-              <a:t> by reality.</a:t>
-            </a:r>
-          </a:p>
-          <a:p>
-            <a:r>
-              <a:rPr lang="en-US" baseline="0" dirty="0" smtClean="0"/>
-              <a:t>Envisioning is easier the further you are from reality. Just not as useful.</a:t>
+              <a:t>Non-roles: </a:t>
+            </a:r>
+            <a:r>
+              <a:rPr lang="en-US" dirty="0" err="1" smtClean="0"/>
+              <a:t>scrummaster</a:t>
+            </a:r>
+            <a:r>
+              <a:rPr lang="en-US" dirty="0" smtClean="0"/>
+              <a:t>, product owner, manager.</a:t>
+            </a:r>
+          </a:p>
+          <a:p>
+            <a:r>
+              <a:rPr lang="en-US" dirty="0" smtClean="0"/>
+              <a:t>Collaboration -&gt; if something is important, assign it to team. Use individual accountability for unimportant </a:t>
+            </a:r>
+            <a:r>
+              <a:rPr lang="en-US" dirty="0" err="1" smtClean="0"/>
+              <a:t>scut</a:t>
+            </a:r>
+            <a:r>
+              <a:rPr lang="en-US" dirty="0" smtClean="0"/>
+              <a:t> work.</a:t>
             </a:r>
             <a:endParaRPr lang="en-US" dirty="0"/>
           </a:p>
@@ -11203,7 +8351,7 @@
           <a:p>
             <a:fld id="{65BF156B-27E6-4EA6-BAD5-67954ACEB120}" type="slidenum">
               <a:rPr lang="en-US" smtClean="0"/>
-              <a:t>20</a:t>
+              <a:t>18</a:t>
             </a:fld>
             <a:endParaRPr lang="en-US"/>
           </a:p>
@@ -11212,7 +8360,7 @@
     </p:spTree>
     <p:extLst>
       <p:ext uri="{BB962C8B-B14F-4D97-AF65-F5344CB8AC3E}">
-        <p14:creationId xmlns:p14="http://schemas.microsoft.com/office/powerpoint/2010/main" val="1283846491"/>
+        <p14:creationId xmlns:p14="http://schemas.microsoft.com/office/powerpoint/2010/main" val="1070351152"/>
       </p:ext>
     </p:extLst>
   </p:cSld>
@@ -11273,11 +8421,17 @@
           <a:p>
             <a:r>
               <a:rPr lang="en-US" dirty="0" smtClean="0"/>
-              <a:t>Even</a:t>
+              <a:t>Vision is bottom-up. At least, it is if you want the vision to be informed</a:t>
             </a:r>
             <a:r>
               <a:rPr lang="en-US" baseline="0" dirty="0" smtClean="0"/>
-              <a:t> early levels of proficiency deliver real value. Get that value!</a:t>
+              <a:t> by reality.</a:t>
+            </a:r>
+          </a:p>
+          <a:p>
+            <a:r>
+              <a:rPr lang="en-US" baseline="0" dirty="0" smtClean="0"/>
+              <a:t>Envisioning is easier the further you are from reality. Just not as useful.</a:t>
             </a:r>
             <a:endParaRPr lang="en-US" dirty="0"/>
           </a:p>
@@ -11300,7 +8454,7 @@
           <a:p>
             <a:fld id="{65BF156B-27E6-4EA6-BAD5-67954ACEB120}" type="slidenum">
               <a:rPr lang="en-US" smtClean="0"/>
-              <a:t>22</a:t>
+              <a:t>21</a:t>
             </a:fld>
             <a:endParaRPr lang="en-US"/>
           </a:p>
@@ -11309,7 +8463,7 @@
     </p:spTree>
     <p:extLst>
       <p:ext uri="{BB962C8B-B14F-4D97-AF65-F5344CB8AC3E}">
-        <p14:creationId xmlns:p14="http://schemas.microsoft.com/office/powerpoint/2010/main" val="2530828782"/>
+        <p14:creationId xmlns:p14="http://schemas.microsoft.com/office/powerpoint/2010/main" val="1283846491"/>
       </p:ext>
     </p:extLst>
   </p:cSld>
@@ -11368,6 +8522,103 @@
           <a:bodyPr/>
           <a:lstStyle/>
           <a:p>
+            <a:r>
+              <a:rPr lang="en-US" dirty="0" smtClean="0"/>
+              <a:t>Even</a:t>
+            </a:r>
+            <a:r>
+              <a:rPr lang="en-US" baseline="0" dirty="0" smtClean="0"/>
+              <a:t> early levels of proficiency deliver real value. Get that value!</a:t>
+            </a:r>
+            <a:endParaRPr lang="en-US" dirty="0"/>
+          </a:p>
+        </p:txBody>
+      </p:sp>
+      <p:sp>
+        <p:nvSpPr>
+          <p:cNvPr id="4" name="Slide Number Placeholder 3"/>
+          <p:cNvSpPr>
+            <a:spLocks noGrp="1"/>
+          </p:cNvSpPr>
+          <p:nvPr>
+            <p:ph type="sldNum" sz="quarter" idx="10"/>
+          </p:nvPr>
+        </p:nvSpPr>
+        <p:spPr/>
+        <p:txBody>
+          <a:bodyPr/>
+          <a:lstStyle/>
+          <a:p>
+            <a:fld id="{65BF156B-27E6-4EA6-BAD5-67954ACEB120}" type="slidenum">
+              <a:rPr lang="en-US" smtClean="0"/>
+              <a:t>23</a:t>
+            </a:fld>
+            <a:endParaRPr lang="en-US"/>
+          </a:p>
+        </p:txBody>
+      </p:sp>
+    </p:spTree>
+    <p:extLst>
+      <p:ext uri="{BB962C8B-B14F-4D97-AF65-F5344CB8AC3E}">
+        <p14:creationId xmlns:p14="http://schemas.microsoft.com/office/powerpoint/2010/main" val="2530828782"/>
+      </p:ext>
+    </p:extLst>
+  </p:cSld>
+  <p:clrMapOvr>
+    <a:masterClrMapping/>
+  </p:clrMapOvr>
+</p:notes>
+</file>
+
+<file path=ppt/notesSlides/notesSlide6.xml><?xml version="1.0" encoding="utf-8"?>
+<p:notes xmlns:a="http://schemas.openxmlformats.org/drawingml/2006/main" xmlns:r="http://schemas.openxmlformats.org/officeDocument/2006/relationships" xmlns:p="http://schemas.openxmlformats.org/presentationml/2006/main">
+  <p:cSld>
+    <p:spTree>
+      <p:nvGrpSpPr>
+        <p:cNvPr id="1" name=""/>
+        <p:cNvGrpSpPr/>
+        <p:nvPr/>
+      </p:nvGrpSpPr>
+      <p:grpSpPr>
+        <a:xfrm>
+          <a:off x="0" y="0"/>
+          <a:ext cx="0" cy="0"/>
+          <a:chOff x="0" y="0"/>
+          <a:chExt cx="0" cy="0"/>
+        </a:xfrm>
+      </p:grpSpPr>
+      <p:sp>
+        <p:nvSpPr>
+          <p:cNvPr id="2" name="Slide Image Placeholder 1"/>
+          <p:cNvSpPr>
+            <a:spLocks noGrp="1" noRot="1" noChangeAspect="1"/>
+          </p:cNvSpPr>
+          <p:nvPr>
+            <p:ph type="sldImg"/>
+          </p:nvPr>
+        </p:nvSpPr>
+        <p:spPr>
+          <a:xfrm>
+            <a:off x="685800" y="1143000"/>
+            <a:ext cx="5486400" cy="3086100"/>
+          </a:xfrm>
+        </p:spPr>
+      </p:sp>
+      <p:sp>
+        <p:nvSpPr>
+          <p:cNvPr id="3" name="Notes Placeholder 2"/>
+          <p:cNvSpPr>
+            <a:spLocks noGrp="1"/>
+          </p:cNvSpPr>
+          <p:nvPr>
+            <p:ph type="body" idx="1"/>
+          </p:nvPr>
+        </p:nvSpPr>
+        <p:spPr/>
+        <p:txBody>
+          <a:bodyPr/>
+          <a:lstStyle/>
+          <a:p>
             <a:endParaRPr lang="en-US" dirty="0"/>
           </a:p>
         </p:txBody>
@@ -11508,7 +8759,7 @@
             <a:fld id="{B4008EB6-D09E-4580-8CD6-DDB14511944F}" type="slidenum">
               <a:rPr lang="en-US" smtClean="0"/>
               <a:pPr/>
-              <a:t>25</a:t>
+              <a:t>26</a:t>
             </a:fld>
             <a:endParaRPr lang="en-US" dirty="0"/>
           </a:p>
@@ -14734,6 +11985,404 @@
       </p:grpSpPr>
       <p:sp>
         <p:nvSpPr>
+          <p:cNvPr id="4" name="Title 3"/>
+          <p:cNvSpPr>
+            <a:spLocks noGrp="1"/>
+          </p:cNvSpPr>
+          <p:nvPr>
+            <p:ph type="title"/>
+          </p:nvPr>
+        </p:nvSpPr>
+        <p:spPr/>
+        <p:txBody>
+          <a:bodyPr/>
+          <a:lstStyle/>
+          <a:p>
+            <a:r>
+              <a:rPr lang="en-US" dirty="0" smtClean="0"/>
+              <a:t>Degrees of fluency?</a:t>
+            </a:r>
+            <a:endParaRPr lang="en-US" dirty="0"/>
+          </a:p>
+        </p:txBody>
+      </p:sp>
+      <p:sp>
+        <p:nvSpPr>
+          <p:cNvPr id="5" name="Content Placeholder 4"/>
+          <p:cNvSpPr>
+            <a:spLocks noGrp="1"/>
+          </p:cNvSpPr>
+          <p:nvPr>
+            <p:ph idx="1"/>
+          </p:nvPr>
+        </p:nvSpPr>
+        <p:spPr/>
+        <p:txBody>
+          <a:bodyPr/>
+          <a:lstStyle/>
+          <a:p>
+            <a:pPr marL="514338" indent="-514338">
+              <a:buFont typeface="+mj-lt"/>
+              <a:buAutoNum type="arabicPeriod"/>
+            </a:pPr>
+            <a:r>
+              <a:rPr lang="en-US" dirty="0" smtClean="0"/>
+              <a:t>Re-label existing practices</a:t>
+            </a:r>
+          </a:p>
+          <a:p>
+            <a:pPr marL="514338" indent="-514338">
+              <a:buFont typeface="+mj-lt"/>
+              <a:buAutoNum type="arabicPeriod"/>
+            </a:pPr>
+            <a:r>
+              <a:rPr lang="en-US" dirty="0" smtClean="0"/>
+              <a:t>When coach is helping</a:t>
+            </a:r>
+          </a:p>
+          <a:p>
+            <a:pPr marL="514338" indent="-514338">
+              <a:buFont typeface="+mj-lt"/>
+              <a:buAutoNum type="arabicPeriod"/>
+            </a:pPr>
+            <a:r>
+              <a:rPr lang="en-US" dirty="0" smtClean="0"/>
+              <a:t>When I have seen a situation like this before</a:t>
+            </a:r>
+          </a:p>
+          <a:p>
+            <a:pPr marL="514338" indent="-514338">
+              <a:buFont typeface="+mj-lt"/>
+              <a:buAutoNum type="arabicPeriod"/>
+            </a:pPr>
+            <a:r>
+              <a:rPr lang="en-US" dirty="0" smtClean="0"/>
+              <a:t>New situations</a:t>
+            </a:r>
+          </a:p>
+          <a:p>
+            <a:pPr marL="514338" indent="-514338">
+              <a:buFont typeface="+mj-lt"/>
+              <a:buAutoNum type="arabicPeriod"/>
+            </a:pPr>
+            <a:r>
+              <a:rPr lang="en-US" dirty="0" smtClean="0"/>
+              <a:t>Under stress</a:t>
+            </a:r>
+            <a:endParaRPr lang="en-US" dirty="0"/>
+          </a:p>
+        </p:txBody>
+      </p:sp>
+    </p:spTree>
+    <p:extLst>
+      <p:ext uri="{BB962C8B-B14F-4D97-AF65-F5344CB8AC3E}">
+        <p14:creationId xmlns:p14="http://schemas.microsoft.com/office/powerpoint/2010/main" val="4042885908"/>
+      </p:ext>
+    </p:extLst>
+  </p:cSld>
+  <p:clrMapOvr>
+    <a:masterClrMapping/>
+  </p:clrMapOvr>
+  <p:timing>
+    <p:tnLst>
+      <p:par>
+        <p:cTn id="1" dur="indefinite" restart="never" nodeType="tmRoot">
+          <p:childTnLst>
+            <p:seq concurrent="1" nextAc="seek">
+              <p:cTn id="2" dur="indefinite" nodeType="mainSeq">
+                <p:childTnLst>
+                  <p:par>
+                    <p:cTn id="3" fill="hold">
+                      <p:stCondLst>
+                        <p:cond delay="indefinite"/>
+                      </p:stCondLst>
+                      <p:childTnLst>
+                        <p:par>
+                          <p:cTn id="4" fill="hold">
+                            <p:stCondLst>
+                              <p:cond delay="0"/>
+                            </p:stCondLst>
+                            <p:childTnLst>
+                              <p:par>
+                                <p:cTn id="5" presetID="1" presetClass="entr" presetSubtype="0" fill="hold" grpId="0" nodeType="clickEffect">
+                                  <p:stCondLst>
+                                    <p:cond delay="0"/>
+                                  </p:stCondLst>
+                                  <p:childTnLst>
+                                    <p:set>
+                                      <p:cBhvr>
+                                        <p:cTn id="6" dur="1" fill="hold">
+                                          <p:stCondLst>
+                                            <p:cond delay="0"/>
+                                          </p:stCondLst>
+                                        </p:cTn>
+                                        <p:tgtEl>
+                                          <p:spTgt spid="5">
+                                            <p:txEl>
+                                              <p:pRg st="0" end="0"/>
+                                            </p:txEl>
+                                          </p:spTgt>
+                                        </p:tgtEl>
+                                        <p:attrNameLst>
+                                          <p:attrName>style.visibility</p:attrName>
+                                        </p:attrNameLst>
+                                      </p:cBhvr>
+                                      <p:to>
+                                        <p:strVal val="visible"/>
+                                      </p:to>
+                                    </p:set>
+                                  </p:childTnLst>
+                                </p:cTn>
+                              </p:par>
+                            </p:childTnLst>
+                          </p:cTn>
+                        </p:par>
+                      </p:childTnLst>
+                    </p:cTn>
+                  </p:par>
+                  <p:par>
+                    <p:cTn id="7" fill="hold">
+                      <p:stCondLst>
+                        <p:cond delay="indefinite"/>
+                      </p:stCondLst>
+                      <p:childTnLst>
+                        <p:par>
+                          <p:cTn id="8" fill="hold">
+                            <p:stCondLst>
+                              <p:cond delay="0"/>
+                            </p:stCondLst>
+                            <p:childTnLst>
+                              <p:par>
+                                <p:cTn id="9" presetID="1" presetClass="entr" presetSubtype="0" fill="hold" grpId="0" nodeType="clickEffect">
+                                  <p:stCondLst>
+                                    <p:cond delay="0"/>
+                                  </p:stCondLst>
+                                  <p:childTnLst>
+                                    <p:set>
+                                      <p:cBhvr>
+                                        <p:cTn id="10" dur="1" fill="hold">
+                                          <p:stCondLst>
+                                            <p:cond delay="0"/>
+                                          </p:stCondLst>
+                                        </p:cTn>
+                                        <p:tgtEl>
+                                          <p:spTgt spid="5">
+                                            <p:txEl>
+                                              <p:pRg st="1" end="1"/>
+                                            </p:txEl>
+                                          </p:spTgt>
+                                        </p:tgtEl>
+                                        <p:attrNameLst>
+                                          <p:attrName>style.visibility</p:attrName>
+                                        </p:attrNameLst>
+                                      </p:cBhvr>
+                                      <p:to>
+                                        <p:strVal val="visible"/>
+                                      </p:to>
+                                    </p:set>
+                                  </p:childTnLst>
+                                </p:cTn>
+                              </p:par>
+                            </p:childTnLst>
+                          </p:cTn>
+                        </p:par>
+                      </p:childTnLst>
+                    </p:cTn>
+                  </p:par>
+                  <p:par>
+                    <p:cTn id="11" fill="hold">
+                      <p:stCondLst>
+                        <p:cond delay="indefinite"/>
+                      </p:stCondLst>
+                      <p:childTnLst>
+                        <p:par>
+                          <p:cTn id="12" fill="hold">
+                            <p:stCondLst>
+                              <p:cond delay="0"/>
+                            </p:stCondLst>
+                            <p:childTnLst>
+                              <p:par>
+                                <p:cTn id="13" presetID="1" presetClass="entr" presetSubtype="0" fill="hold" grpId="0" nodeType="clickEffect">
+                                  <p:stCondLst>
+                                    <p:cond delay="0"/>
+                                  </p:stCondLst>
+                                  <p:childTnLst>
+                                    <p:set>
+                                      <p:cBhvr>
+                                        <p:cTn id="14" dur="1" fill="hold">
+                                          <p:stCondLst>
+                                            <p:cond delay="0"/>
+                                          </p:stCondLst>
+                                        </p:cTn>
+                                        <p:tgtEl>
+                                          <p:spTgt spid="5">
+                                            <p:txEl>
+                                              <p:pRg st="2" end="2"/>
+                                            </p:txEl>
+                                          </p:spTgt>
+                                        </p:tgtEl>
+                                        <p:attrNameLst>
+                                          <p:attrName>style.visibility</p:attrName>
+                                        </p:attrNameLst>
+                                      </p:cBhvr>
+                                      <p:to>
+                                        <p:strVal val="visible"/>
+                                      </p:to>
+                                    </p:set>
+                                  </p:childTnLst>
+                                </p:cTn>
+                              </p:par>
+                            </p:childTnLst>
+                          </p:cTn>
+                        </p:par>
+                      </p:childTnLst>
+                    </p:cTn>
+                  </p:par>
+                  <p:par>
+                    <p:cTn id="15" fill="hold">
+                      <p:stCondLst>
+                        <p:cond delay="indefinite"/>
+                      </p:stCondLst>
+                      <p:childTnLst>
+                        <p:par>
+                          <p:cTn id="16" fill="hold">
+                            <p:stCondLst>
+                              <p:cond delay="0"/>
+                            </p:stCondLst>
+                            <p:childTnLst>
+                              <p:par>
+                                <p:cTn id="17" presetID="1" presetClass="entr" presetSubtype="0" fill="hold" grpId="0" nodeType="clickEffect">
+                                  <p:stCondLst>
+                                    <p:cond delay="0"/>
+                                  </p:stCondLst>
+                                  <p:childTnLst>
+                                    <p:set>
+                                      <p:cBhvr>
+                                        <p:cTn id="18" dur="1" fill="hold">
+                                          <p:stCondLst>
+                                            <p:cond delay="0"/>
+                                          </p:stCondLst>
+                                        </p:cTn>
+                                        <p:tgtEl>
+                                          <p:spTgt spid="5">
+                                            <p:txEl>
+                                              <p:pRg st="3" end="3"/>
+                                            </p:txEl>
+                                          </p:spTgt>
+                                        </p:tgtEl>
+                                        <p:attrNameLst>
+                                          <p:attrName>style.visibility</p:attrName>
+                                        </p:attrNameLst>
+                                      </p:cBhvr>
+                                      <p:to>
+                                        <p:strVal val="visible"/>
+                                      </p:to>
+                                    </p:set>
+                                  </p:childTnLst>
+                                </p:cTn>
+                              </p:par>
+                            </p:childTnLst>
+                          </p:cTn>
+                        </p:par>
+                      </p:childTnLst>
+                    </p:cTn>
+                  </p:par>
+                  <p:par>
+                    <p:cTn id="19" fill="hold">
+                      <p:stCondLst>
+                        <p:cond delay="indefinite"/>
+                      </p:stCondLst>
+                      <p:childTnLst>
+                        <p:par>
+                          <p:cTn id="20" fill="hold">
+                            <p:stCondLst>
+                              <p:cond delay="0"/>
+                            </p:stCondLst>
+                            <p:childTnLst>
+                              <p:par>
+                                <p:cTn id="21" presetID="1" presetClass="entr" presetSubtype="0" fill="hold" grpId="0" nodeType="clickEffect">
+                                  <p:stCondLst>
+                                    <p:cond delay="0"/>
+                                  </p:stCondLst>
+                                  <p:childTnLst>
+                                    <p:set>
+                                      <p:cBhvr>
+                                        <p:cTn id="22" dur="1" fill="hold">
+                                          <p:stCondLst>
+                                            <p:cond delay="0"/>
+                                          </p:stCondLst>
+                                        </p:cTn>
+                                        <p:tgtEl>
+                                          <p:spTgt spid="5">
+                                            <p:txEl>
+                                              <p:pRg st="4" end="4"/>
+                                            </p:txEl>
+                                          </p:spTgt>
+                                        </p:tgtEl>
+                                        <p:attrNameLst>
+                                          <p:attrName>style.visibility</p:attrName>
+                                        </p:attrNameLst>
+                                      </p:cBhvr>
+                                      <p:to>
+                                        <p:strVal val="visible"/>
+                                      </p:to>
+                                    </p:set>
+                                  </p:childTnLst>
+                                </p:cTn>
+                              </p:par>
+                            </p:childTnLst>
+                          </p:cTn>
+                        </p:par>
+                      </p:childTnLst>
+                    </p:cTn>
+                  </p:par>
+                </p:childTnLst>
+              </p:cTn>
+              <p:prevCondLst>
+                <p:cond evt="onPrev" delay="0">
+                  <p:tgtEl>
+                    <p:sldTgt/>
+                  </p:tgtEl>
+                </p:cond>
+              </p:prevCondLst>
+              <p:nextCondLst>
+                <p:cond evt="onNext" delay="0">
+                  <p:tgtEl>
+                    <p:sldTgt/>
+                  </p:tgtEl>
+                </p:cond>
+              </p:nextCondLst>
+            </p:seq>
+          </p:childTnLst>
+        </p:cTn>
+      </p:par>
+    </p:tnLst>
+    <p:bldLst>
+      <p:bldP spid="5" grpId="0" build="p"/>
+    </p:bldLst>
+  </p:timing>
+</p:sld>
+</file>
+
+<file path=ppt/slides/slide11.xml><?xml version="1.0" encoding="utf-8"?>
+<p:sld xmlns:a="http://schemas.openxmlformats.org/drawingml/2006/main" xmlns:r="http://schemas.openxmlformats.org/officeDocument/2006/relationships" xmlns:p="http://schemas.openxmlformats.org/presentationml/2006/main">
+  <p:cSld>
+    <p:spTree>
+      <p:nvGrpSpPr>
+        <p:cNvPr id="1" name=""/>
+        <p:cNvGrpSpPr/>
+        <p:nvPr/>
+      </p:nvGrpSpPr>
+      <p:grpSpPr>
+        <a:xfrm>
+          <a:off x="0" y="0"/>
+          <a:ext cx="0" cy="0"/>
+          <a:chOff x="0" y="0"/>
+          <a:chExt cx="0" cy="0"/>
+        </a:xfrm>
+      </p:grpSpPr>
+      <p:sp>
+        <p:nvSpPr>
           <p:cNvPr id="3" name="Title 2"/>
           <p:cNvSpPr>
             <a:spLocks noGrp="1"/>
@@ -15084,7 +12733,7 @@
 </p:sld>
 </file>
 
-<file path=ppt/slides/slide11.xml><?xml version="1.0" encoding="utf-8"?>
+<file path=ppt/slides/slide12.xml><?xml version="1.0" encoding="utf-8"?>
 <p:sld xmlns:a="http://schemas.openxmlformats.org/drawingml/2006/main" xmlns:r="http://schemas.openxmlformats.org/officeDocument/2006/relationships" xmlns:p="http://schemas.openxmlformats.org/presentationml/2006/main">
   <p:cSld>
     <p:spTree>
@@ -15173,7 +12822,7 @@
 </p:sld>
 </file>
 
-<file path=ppt/slides/slide12.xml><?xml version="1.0" encoding="utf-8"?>
+<file path=ppt/slides/slide13.xml><?xml version="1.0" encoding="utf-8"?>
 <p:sld xmlns:a="http://schemas.openxmlformats.org/drawingml/2006/main" xmlns:r="http://schemas.openxmlformats.org/officeDocument/2006/relationships" xmlns:p="http://schemas.openxmlformats.org/presentationml/2006/main">
   <p:cSld>
     <p:spTree>
@@ -15262,7 +12911,7 @@
 </p:sld>
 </file>
 
-<file path=ppt/slides/slide13.xml><?xml version="1.0" encoding="utf-8"?>
+<file path=ppt/slides/slide14.xml><?xml version="1.0" encoding="utf-8"?>
 <p:sld xmlns:a="http://schemas.openxmlformats.org/drawingml/2006/main" xmlns:r="http://schemas.openxmlformats.org/officeDocument/2006/relationships" xmlns:p="http://schemas.openxmlformats.org/presentationml/2006/main">
   <p:cSld>
     <p:spTree>
@@ -15347,7 +12996,7 @@
 </p:sld>
 </file>
 
-<file path=ppt/slides/slide14.xml><?xml version="1.0" encoding="utf-8"?>
+<file path=ppt/slides/slide15.xml><?xml version="1.0" encoding="utf-8"?>
 <p:sld xmlns:a="http://schemas.openxmlformats.org/drawingml/2006/main" xmlns:r="http://schemas.openxmlformats.org/officeDocument/2006/relationships" xmlns:p="http://schemas.openxmlformats.org/presentationml/2006/main">
   <p:cSld>
     <p:spTree>
@@ -16266,7 +13915,7 @@
 </p:sld>
 </file>
 
-<file path=ppt/slides/slide15.xml><?xml version="1.0" encoding="utf-8"?>
+<file path=ppt/slides/slide16.xml><?xml version="1.0" encoding="utf-8"?>
 <p:sld xmlns:a="http://schemas.openxmlformats.org/drawingml/2006/main" xmlns:r="http://schemas.openxmlformats.org/officeDocument/2006/relationships" xmlns:p="http://schemas.openxmlformats.org/presentationml/2006/main">
   <p:cSld>
     <p:spTree>
@@ -16355,7 +14004,7 @@
 </p:sld>
 </file>
 
-<file path=ppt/slides/slide16.xml><?xml version="1.0" encoding="utf-8"?>
+<file path=ppt/slides/slide17.xml><?xml version="1.0" encoding="utf-8"?>
 <p:sld xmlns:a="http://schemas.openxmlformats.org/drawingml/2006/main" xmlns:r="http://schemas.openxmlformats.org/officeDocument/2006/relationships" xmlns:p="http://schemas.openxmlformats.org/presentationml/2006/main">
   <p:cSld>
     <p:spTree>
@@ -16698,7 +14347,7 @@
 </p:sld>
 </file>
 
-<file path=ppt/slides/slide17.xml><?xml version="1.0" encoding="utf-8"?>
+<file path=ppt/slides/slide18.xml><?xml version="1.0" encoding="utf-8"?>
 <p:sld xmlns:a="http://schemas.openxmlformats.org/drawingml/2006/main" xmlns:r="http://schemas.openxmlformats.org/officeDocument/2006/relationships" xmlns:p="http://schemas.openxmlformats.org/presentationml/2006/main">
   <p:cSld>
     <p:spTree>
@@ -17703,7 +15352,7 @@
 </p:sld>
 </file>
 
-<file path=ppt/slides/slide18.xml><?xml version="1.0" encoding="utf-8"?>
+<file path=ppt/slides/slide19.xml><?xml version="1.0" encoding="utf-8"?>
 <p:sld xmlns:a="http://schemas.openxmlformats.org/drawingml/2006/main" xmlns:r="http://schemas.openxmlformats.org/officeDocument/2006/relationships" xmlns:p="http://schemas.openxmlformats.org/presentationml/2006/main">
   <p:cSld>
     <p:spTree>
@@ -17776,95 +15425,6 @@
     <p:extLst>
       <p:ext uri="{BB962C8B-B14F-4D97-AF65-F5344CB8AC3E}">
         <p14:creationId xmlns:p14="http://schemas.microsoft.com/office/powerpoint/2010/main" val="2769694957"/>
-      </p:ext>
-    </p:extLst>
-  </p:cSld>
-  <p:clrMapOvr>
-    <a:masterClrMapping/>
-  </p:clrMapOvr>
-  <p:timing>
-    <p:tnLst>
-      <p:par>
-        <p:cTn id="1" dur="indefinite" restart="never" nodeType="tmRoot"/>
-      </p:par>
-    </p:tnLst>
-  </p:timing>
-</p:sld>
-</file>
-
-<file path=ppt/slides/slide19.xml><?xml version="1.0" encoding="utf-8"?>
-<p:sld xmlns:a="http://schemas.openxmlformats.org/drawingml/2006/main" xmlns:r="http://schemas.openxmlformats.org/officeDocument/2006/relationships" xmlns:p="http://schemas.openxmlformats.org/presentationml/2006/main">
-  <p:cSld>
-    <p:spTree>
-      <p:nvGrpSpPr>
-        <p:cNvPr id="1" name=""/>
-        <p:cNvGrpSpPr/>
-        <p:nvPr/>
-      </p:nvGrpSpPr>
-      <p:grpSpPr>
-        <a:xfrm>
-          <a:off x="0" y="0"/>
-          <a:ext cx="0" cy="0"/>
-          <a:chOff x="0" y="0"/>
-          <a:chExt cx="0" cy="0"/>
-        </a:xfrm>
-      </p:grpSpPr>
-      <p:pic>
-        <p:nvPicPr>
-          <p:cNvPr id="4" name="Content Placeholder 3"/>
-          <p:cNvPicPr>
-            <a:picLocks noGrp="1" noChangeAspect="1"/>
-          </p:cNvPicPr>
-          <p:nvPr>
-            <p:ph idx="1"/>
-          </p:nvPr>
-        </p:nvPicPr>
-        <p:blipFill>
-          <a:blip r:embed="rId2" cstate="print">
-            <a:extLst>
-              <a:ext uri="{28A0092B-C50C-407E-A947-70E740481C1C}">
-                <a14:useLocalDpi xmlns:a14="http://schemas.microsoft.com/office/drawing/2010/main" val="0"/>
-              </a:ext>
-            </a:extLst>
-          </a:blip>
-          <a:stretch>
-            <a:fillRect/>
-          </a:stretch>
-        </p:blipFill>
-        <p:spPr>
-          <a:xfrm>
-            <a:off x="0" y="0"/>
-            <a:ext cx="12192000" cy="9144000"/>
-          </a:xfrm>
-        </p:spPr>
-      </p:pic>
-      <p:sp>
-        <p:nvSpPr>
-          <p:cNvPr id="3" name="Title 2"/>
-          <p:cNvSpPr>
-            <a:spLocks noGrp="1"/>
-          </p:cNvSpPr>
-          <p:nvPr>
-            <p:ph type="title"/>
-          </p:nvPr>
-        </p:nvSpPr>
-        <p:spPr/>
-        <p:txBody>
-          <a:bodyPr/>
-          <a:lstStyle/>
-          <a:p>
-            <a:r>
-              <a:rPr lang="en-US" dirty="0" smtClean="0"/>
-              <a:t>Refactor all the things</a:t>
-            </a:r>
-            <a:endParaRPr lang="en-US" dirty="0"/>
-          </a:p>
-        </p:txBody>
-      </p:sp>
-    </p:spTree>
-    <p:extLst>
-      <p:ext uri="{BB962C8B-B14F-4D97-AF65-F5344CB8AC3E}">
-        <p14:creationId xmlns:p14="http://schemas.microsoft.com/office/powerpoint/2010/main" val="828338453"/>
       </p:ext>
     </p:extLst>
   </p:cSld>
@@ -17998,6 +15558,95 @@
           </p:nvPr>
         </p:nvPicPr>
         <p:blipFill>
+          <a:blip r:embed="rId2" cstate="print">
+            <a:extLst>
+              <a:ext uri="{28A0092B-C50C-407E-A947-70E740481C1C}">
+                <a14:useLocalDpi xmlns:a14="http://schemas.microsoft.com/office/drawing/2010/main" val="0"/>
+              </a:ext>
+            </a:extLst>
+          </a:blip>
+          <a:stretch>
+            <a:fillRect/>
+          </a:stretch>
+        </p:blipFill>
+        <p:spPr>
+          <a:xfrm>
+            <a:off x="0" y="0"/>
+            <a:ext cx="12192000" cy="9144000"/>
+          </a:xfrm>
+        </p:spPr>
+      </p:pic>
+      <p:sp>
+        <p:nvSpPr>
+          <p:cNvPr id="3" name="Title 2"/>
+          <p:cNvSpPr>
+            <a:spLocks noGrp="1"/>
+          </p:cNvSpPr>
+          <p:nvPr>
+            <p:ph type="title"/>
+          </p:nvPr>
+        </p:nvSpPr>
+        <p:spPr/>
+        <p:txBody>
+          <a:bodyPr/>
+          <a:lstStyle/>
+          <a:p>
+            <a:r>
+              <a:rPr lang="en-US" dirty="0" smtClean="0"/>
+              <a:t>Refactor all the things</a:t>
+            </a:r>
+            <a:endParaRPr lang="en-US" dirty="0"/>
+          </a:p>
+        </p:txBody>
+      </p:sp>
+    </p:spTree>
+    <p:extLst>
+      <p:ext uri="{BB962C8B-B14F-4D97-AF65-F5344CB8AC3E}">
+        <p14:creationId xmlns:p14="http://schemas.microsoft.com/office/powerpoint/2010/main" val="828338453"/>
+      </p:ext>
+    </p:extLst>
+  </p:cSld>
+  <p:clrMapOvr>
+    <a:masterClrMapping/>
+  </p:clrMapOvr>
+  <p:timing>
+    <p:tnLst>
+      <p:par>
+        <p:cTn id="1" dur="indefinite" restart="never" nodeType="tmRoot"/>
+      </p:par>
+    </p:tnLst>
+  </p:timing>
+</p:sld>
+</file>
+
+<file path=ppt/slides/slide21.xml><?xml version="1.0" encoding="utf-8"?>
+<p:sld xmlns:a="http://schemas.openxmlformats.org/drawingml/2006/main" xmlns:r="http://schemas.openxmlformats.org/officeDocument/2006/relationships" xmlns:p="http://schemas.openxmlformats.org/presentationml/2006/main">
+  <p:cSld>
+    <p:spTree>
+      <p:nvGrpSpPr>
+        <p:cNvPr id="1" name=""/>
+        <p:cNvGrpSpPr/>
+        <p:nvPr/>
+      </p:nvGrpSpPr>
+      <p:grpSpPr>
+        <a:xfrm>
+          <a:off x="0" y="0"/>
+          <a:ext cx="0" cy="0"/>
+          <a:chOff x="0" y="0"/>
+          <a:chExt cx="0" cy="0"/>
+        </a:xfrm>
+      </p:grpSpPr>
+      <p:pic>
+        <p:nvPicPr>
+          <p:cNvPr id="4" name="Content Placeholder 3"/>
+          <p:cNvPicPr>
+            <a:picLocks noGrp="1" noChangeAspect="1"/>
+          </p:cNvPicPr>
+          <p:nvPr>
+            <p:ph idx="1"/>
+          </p:nvPr>
+        </p:nvPicPr>
+        <p:blipFill>
           <a:blip r:embed="rId3">
             <a:extLst>
               <a:ext uri="{28A0092B-C50C-407E-A947-70E740481C1C}">
@@ -18059,7 +15708,7 @@
 </p:sld>
 </file>
 
-<file path=ppt/slides/slide21.xml><?xml version="1.0" encoding="utf-8"?>
+<file path=ppt/slides/slide22.xml><?xml version="1.0" encoding="utf-8"?>
 <p:sld xmlns:a="http://schemas.openxmlformats.org/drawingml/2006/main" xmlns:r="http://schemas.openxmlformats.org/officeDocument/2006/relationships" xmlns:p="http://schemas.openxmlformats.org/presentationml/2006/main">
   <p:cSld>
     <p:spTree>
@@ -18148,7 +15797,7 @@
 </p:sld>
 </file>
 
-<file path=ppt/slides/slide22.xml><?xml version="1.0" encoding="utf-8"?>
+<file path=ppt/slides/slide23.xml><?xml version="1.0" encoding="utf-8"?>
 <p:sld xmlns:a="http://schemas.openxmlformats.org/drawingml/2006/main" xmlns:r="http://schemas.openxmlformats.org/officeDocument/2006/relationships" xmlns:p="http://schemas.openxmlformats.org/presentationml/2006/main">
   <p:cSld>
     <p:spTree>
@@ -18237,7 +15886,7 @@
 </p:sld>
 </file>
 
-<file path=ppt/slides/slide23.xml><?xml version="1.0" encoding="utf-8"?>
+<file path=ppt/slides/slide24.xml><?xml version="1.0" encoding="utf-8"?>
 <p:sld xmlns:a="http://schemas.openxmlformats.org/drawingml/2006/main" xmlns:r="http://schemas.openxmlformats.org/officeDocument/2006/relationships" xmlns:p="http://schemas.openxmlformats.org/presentationml/2006/main">
   <p:cSld>
     <p:spTree>
@@ -18363,7 +16012,7 @@
 </p:sld>
 </file>
 
-<file path=ppt/slides/slide24.xml><?xml version="1.0" encoding="utf-8"?>
+<file path=ppt/slides/slide25.xml><?xml version="1.0" encoding="utf-8"?>
 <p:sld xmlns:a="http://schemas.openxmlformats.org/drawingml/2006/main" xmlns:r="http://schemas.openxmlformats.org/officeDocument/2006/relationships" xmlns:p="http://schemas.openxmlformats.org/presentationml/2006/main">
   <p:cSld>
     <p:spTree>
@@ -18483,7 +16132,7 @@
 </p:sld>
 </file>
 
-<file path=ppt/slides/slide25.xml><?xml version="1.0" encoding="utf-8"?>
+<file path=ppt/slides/slide26.xml><?xml version="1.0" encoding="utf-8"?>
 <p:sld xmlns:a="http://schemas.openxmlformats.org/drawingml/2006/main" xmlns:r="http://schemas.openxmlformats.org/officeDocument/2006/relationships" xmlns:p="http://schemas.openxmlformats.org/presentationml/2006/main">
   <p:cSld>
     <p:spTree>
@@ -19753,7 +17402,7 @@
 </p:sld>
 </file>
 
-<file path=ppt/slides/slide26.xml><?xml version="1.0" encoding="utf-8"?>
+<file path=ppt/slides/slide27.xml><?xml version="1.0" encoding="utf-8"?>
 <p:sld xmlns:a="http://schemas.openxmlformats.org/drawingml/2006/main" xmlns:r="http://schemas.openxmlformats.org/officeDocument/2006/relationships" xmlns:p="http://schemas.openxmlformats.org/presentationml/2006/main">
   <p:cSld>
     <p:spTree>
@@ -20135,7 +17784,7 @@
 </p:sld>
 </file>
 
-<file path=ppt/slides/slide27.xml><?xml version="1.0" encoding="utf-8"?>
+<file path=ppt/slides/slide28.xml><?xml version="1.0" encoding="utf-8"?>
 <p:sld xmlns:a="http://schemas.openxmlformats.org/drawingml/2006/main" xmlns:r="http://schemas.openxmlformats.org/officeDocument/2006/relationships" xmlns:p="http://schemas.openxmlformats.org/presentationml/2006/main">
   <p:cSld>
     <p:spTree>
@@ -20695,6 +18344,95 @@
       </p:grpSpPr>
       <p:pic>
         <p:nvPicPr>
+          <p:cNvPr id="4" name="Content Placeholder 3"/>
+          <p:cNvPicPr>
+            <a:picLocks noGrp="1" noChangeAspect="1"/>
+          </p:cNvPicPr>
+          <p:nvPr>
+            <p:ph idx="1"/>
+          </p:nvPr>
+        </p:nvPicPr>
+        <p:blipFill>
+          <a:blip r:embed="rId3" cstate="print">
+            <a:extLst>
+              <a:ext uri="{28A0092B-C50C-407E-A947-70E740481C1C}">
+                <a14:useLocalDpi xmlns:a14="http://schemas.microsoft.com/office/drawing/2010/main" val="0"/>
+              </a:ext>
+            </a:extLst>
+          </a:blip>
+          <a:stretch>
+            <a:fillRect/>
+          </a:stretch>
+        </p:blipFill>
+        <p:spPr>
+          <a:xfrm>
+            <a:off x="0" y="0"/>
+            <a:ext cx="12192000" cy="8124826"/>
+          </a:xfrm>
+        </p:spPr>
+      </p:pic>
+      <p:sp>
+        <p:nvSpPr>
+          <p:cNvPr id="3" name="Title 2"/>
+          <p:cNvSpPr>
+            <a:spLocks noGrp="1"/>
+          </p:cNvSpPr>
+          <p:nvPr>
+            <p:ph type="title"/>
+          </p:nvPr>
+        </p:nvSpPr>
+        <p:spPr/>
+        <p:txBody>
+          <a:bodyPr/>
+          <a:lstStyle/>
+          <a:p>
+            <a:r>
+              <a:rPr lang="en-US" dirty="0" smtClean="0"/>
+              <a:t>But what if we build the wrong thing?</a:t>
+            </a:r>
+            <a:endParaRPr lang="en-US" dirty="0"/>
+          </a:p>
+        </p:txBody>
+      </p:sp>
+    </p:spTree>
+    <p:extLst>
+      <p:ext uri="{BB962C8B-B14F-4D97-AF65-F5344CB8AC3E}">
+        <p14:creationId xmlns:p14="http://schemas.microsoft.com/office/powerpoint/2010/main" val="2566853649"/>
+      </p:ext>
+    </p:extLst>
+  </p:cSld>
+  <p:clrMapOvr>
+    <a:masterClrMapping/>
+  </p:clrMapOvr>
+  <p:timing>
+    <p:tnLst>
+      <p:par>
+        <p:cTn id="1" dur="indefinite" restart="never" nodeType="tmRoot"/>
+      </p:par>
+    </p:tnLst>
+  </p:timing>
+</p:sld>
+</file>
+
+<file path=ppt/slides/slide7.xml><?xml version="1.0" encoding="utf-8"?>
+<p:sld xmlns:a="http://schemas.openxmlformats.org/drawingml/2006/main" xmlns:r="http://schemas.openxmlformats.org/officeDocument/2006/relationships" xmlns:p="http://schemas.openxmlformats.org/presentationml/2006/main">
+  <p:cSld>
+    <p:spTree>
+      <p:nvGrpSpPr>
+        <p:cNvPr id="1" name=""/>
+        <p:cNvGrpSpPr/>
+        <p:nvPr/>
+      </p:nvGrpSpPr>
+      <p:grpSpPr>
+        <a:xfrm>
+          <a:off x="0" y="0"/>
+          <a:ext cx="0" cy="0"/>
+          <a:chOff x="0" y="0"/>
+          <a:chExt cx="0" cy="0"/>
+        </a:xfrm>
+      </p:grpSpPr>
+      <p:pic>
+        <p:nvPicPr>
           <p:cNvPr id="5" name="Picture 4"/>
           <p:cNvPicPr>
             <a:picLocks noChangeAspect="1"/>
@@ -20905,7 +18643,7 @@
 </p:sld>
 </file>
 
-<file path=ppt/slides/slide7.xml><?xml version="1.0" encoding="utf-8"?>
+<file path=ppt/slides/slide8.xml><?xml version="1.0" encoding="utf-8"?>
 <p:sld xmlns:a="http://schemas.openxmlformats.org/drawingml/2006/main" xmlns:r="http://schemas.openxmlformats.org/officeDocument/2006/relationships" xmlns:p="http://schemas.openxmlformats.org/presentationml/2006/main">
   <p:cSld>
     <p:spTree>
@@ -21379,7 +19117,7 @@
 </p:sld>
 </file>
 
-<file path=ppt/slides/slide8.xml><?xml version="1.0" encoding="utf-8"?>
+<file path=ppt/slides/slide9.xml><?xml version="1.0" encoding="utf-8"?>
 <p:sld xmlns:a="http://schemas.openxmlformats.org/drawingml/2006/main" xmlns:r="http://schemas.openxmlformats.org/officeDocument/2006/relationships" xmlns:p="http://schemas.openxmlformats.org/presentationml/2006/main">
   <p:cSld>
     <p:spTree>
@@ -21469,404 +19207,6 @@
         <p:cTn id="1" dur="indefinite" restart="never" nodeType="tmRoot"/>
       </p:par>
     </p:tnLst>
-  </p:timing>
-</p:sld>
-</file>
-
-<file path=ppt/slides/slide9.xml><?xml version="1.0" encoding="utf-8"?>
-<p:sld xmlns:a="http://schemas.openxmlformats.org/drawingml/2006/main" xmlns:r="http://schemas.openxmlformats.org/officeDocument/2006/relationships" xmlns:p="http://schemas.openxmlformats.org/presentationml/2006/main">
-  <p:cSld>
-    <p:spTree>
-      <p:nvGrpSpPr>
-        <p:cNvPr id="1" name=""/>
-        <p:cNvGrpSpPr/>
-        <p:nvPr/>
-      </p:nvGrpSpPr>
-      <p:grpSpPr>
-        <a:xfrm>
-          <a:off x="0" y="0"/>
-          <a:ext cx="0" cy="0"/>
-          <a:chOff x="0" y="0"/>
-          <a:chExt cx="0" cy="0"/>
-        </a:xfrm>
-      </p:grpSpPr>
-      <p:sp>
-        <p:nvSpPr>
-          <p:cNvPr id="4" name="Title 3"/>
-          <p:cNvSpPr>
-            <a:spLocks noGrp="1"/>
-          </p:cNvSpPr>
-          <p:nvPr>
-            <p:ph type="title"/>
-          </p:nvPr>
-        </p:nvSpPr>
-        <p:spPr/>
-        <p:txBody>
-          <a:bodyPr/>
-          <a:lstStyle/>
-          <a:p>
-            <a:r>
-              <a:rPr lang="en-US" dirty="0" smtClean="0"/>
-              <a:t>Degrees of fluency?</a:t>
-            </a:r>
-            <a:endParaRPr lang="en-US" dirty="0"/>
-          </a:p>
-        </p:txBody>
-      </p:sp>
-      <p:sp>
-        <p:nvSpPr>
-          <p:cNvPr id="5" name="Content Placeholder 4"/>
-          <p:cNvSpPr>
-            <a:spLocks noGrp="1"/>
-          </p:cNvSpPr>
-          <p:nvPr>
-            <p:ph idx="1"/>
-          </p:nvPr>
-        </p:nvSpPr>
-        <p:spPr/>
-        <p:txBody>
-          <a:bodyPr/>
-          <a:lstStyle/>
-          <a:p>
-            <a:pPr marL="514338" indent="-514338">
-              <a:buFont typeface="+mj-lt"/>
-              <a:buAutoNum type="arabicPeriod"/>
-            </a:pPr>
-            <a:r>
-              <a:rPr lang="en-US" dirty="0" smtClean="0"/>
-              <a:t>Re-label existing practices</a:t>
-            </a:r>
-          </a:p>
-          <a:p>
-            <a:pPr marL="514338" indent="-514338">
-              <a:buFont typeface="+mj-lt"/>
-              <a:buAutoNum type="arabicPeriod"/>
-            </a:pPr>
-            <a:r>
-              <a:rPr lang="en-US" dirty="0" smtClean="0"/>
-              <a:t>When coach is helping</a:t>
-            </a:r>
-          </a:p>
-          <a:p>
-            <a:pPr marL="514338" indent="-514338">
-              <a:buFont typeface="+mj-lt"/>
-              <a:buAutoNum type="arabicPeriod"/>
-            </a:pPr>
-            <a:r>
-              <a:rPr lang="en-US" dirty="0" smtClean="0"/>
-              <a:t>When I have seen a situation like this before</a:t>
-            </a:r>
-          </a:p>
-          <a:p>
-            <a:pPr marL="514338" indent="-514338">
-              <a:buFont typeface="+mj-lt"/>
-              <a:buAutoNum type="arabicPeriod"/>
-            </a:pPr>
-            <a:r>
-              <a:rPr lang="en-US" dirty="0" smtClean="0"/>
-              <a:t>New situations</a:t>
-            </a:r>
-          </a:p>
-          <a:p>
-            <a:pPr marL="514338" indent="-514338">
-              <a:buFont typeface="+mj-lt"/>
-              <a:buAutoNum type="arabicPeriod"/>
-            </a:pPr>
-            <a:r>
-              <a:rPr lang="en-US" dirty="0" smtClean="0"/>
-              <a:t>Under stress</a:t>
-            </a:r>
-            <a:endParaRPr lang="en-US" dirty="0"/>
-          </a:p>
-        </p:txBody>
-      </p:sp>
-    </p:spTree>
-    <p:extLst>
-      <p:ext uri="{BB962C8B-B14F-4D97-AF65-F5344CB8AC3E}">
-        <p14:creationId xmlns:p14="http://schemas.microsoft.com/office/powerpoint/2010/main" val="4042885908"/>
-      </p:ext>
-    </p:extLst>
-  </p:cSld>
-  <p:clrMapOvr>
-    <a:masterClrMapping/>
-  </p:clrMapOvr>
-  <p:timing>
-    <p:tnLst>
-      <p:par>
-        <p:cTn id="1" dur="indefinite" restart="never" nodeType="tmRoot">
-          <p:childTnLst>
-            <p:seq concurrent="1" nextAc="seek">
-              <p:cTn id="2" dur="indefinite" nodeType="mainSeq">
-                <p:childTnLst>
-                  <p:par>
-                    <p:cTn id="3" fill="hold">
-                      <p:stCondLst>
-                        <p:cond delay="indefinite"/>
-                      </p:stCondLst>
-                      <p:childTnLst>
-                        <p:par>
-                          <p:cTn id="4" fill="hold">
-                            <p:stCondLst>
-                              <p:cond delay="0"/>
-                            </p:stCondLst>
-                            <p:childTnLst>
-                              <p:par>
-                                <p:cTn id="5" presetID="1" presetClass="entr" presetSubtype="0" fill="hold" grpId="0" nodeType="clickEffect">
-                                  <p:stCondLst>
-                                    <p:cond delay="0"/>
-                                  </p:stCondLst>
-                                  <p:childTnLst>
-                                    <p:set>
-                                      <p:cBhvr>
-                                        <p:cTn id="6" dur="1" fill="hold">
-                                          <p:stCondLst>
-                                            <p:cond delay="0"/>
-                                          </p:stCondLst>
-                                        </p:cTn>
-                                        <p:tgtEl>
-                                          <p:spTgt spid="5">
-                                            <p:txEl>
-                                              <p:pRg st="0" end="0"/>
-                                            </p:txEl>
-                                          </p:spTgt>
-                                        </p:tgtEl>
-                                        <p:attrNameLst>
-                                          <p:attrName>style.visibility</p:attrName>
-                                        </p:attrNameLst>
-                                      </p:cBhvr>
-                                      <p:to>
-                                        <p:strVal val="visible"/>
-                                      </p:to>
-                                    </p:set>
-                                  </p:childTnLst>
-                                </p:cTn>
-                              </p:par>
-                            </p:childTnLst>
-                          </p:cTn>
-                        </p:par>
-                      </p:childTnLst>
-                    </p:cTn>
-                  </p:par>
-                  <p:par>
-                    <p:cTn id="7" fill="hold">
-                      <p:stCondLst>
-                        <p:cond delay="indefinite"/>
-                      </p:stCondLst>
-                      <p:childTnLst>
-                        <p:par>
-                          <p:cTn id="8" fill="hold">
-                            <p:stCondLst>
-                              <p:cond delay="0"/>
-                            </p:stCondLst>
-                            <p:childTnLst>
-                              <p:par>
-                                <p:cTn id="9" presetID="1" presetClass="entr" presetSubtype="0" fill="hold" grpId="0" nodeType="clickEffect">
-                                  <p:stCondLst>
-                                    <p:cond delay="0"/>
-                                  </p:stCondLst>
-                                  <p:childTnLst>
-                                    <p:set>
-                                      <p:cBhvr>
-                                        <p:cTn id="10" dur="1" fill="hold">
-                                          <p:stCondLst>
-                                            <p:cond delay="0"/>
-                                          </p:stCondLst>
-                                        </p:cTn>
-                                        <p:tgtEl>
-                                          <p:spTgt spid="5">
-                                            <p:txEl>
-                                              <p:pRg st="1" end="1"/>
-                                            </p:txEl>
-                                          </p:spTgt>
-                                        </p:tgtEl>
-                                        <p:attrNameLst>
-                                          <p:attrName>style.visibility</p:attrName>
-                                        </p:attrNameLst>
-                                      </p:cBhvr>
-                                      <p:to>
-                                        <p:strVal val="visible"/>
-                                      </p:to>
-                                    </p:set>
-                                  </p:childTnLst>
-                                </p:cTn>
-                              </p:par>
-                            </p:childTnLst>
-                          </p:cTn>
-                        </p:par>
-                      </p:childTnLst>
-                    </p:cTn>
-                  </p:par>
-                  <p:par>
-                    <p:cTn id="11" fill="hold">
-                      <p:stCondLst>
-                        <p:cond delay="indefinite"/>
-                      </p:stCondLst>
-                      <p:childTnLst>
-                        <p:par>
-                          <p:cTn id="12" fill="hold">
-                            <p:stCondLst>
-                              <p:cond delay="0"/>
-                            </p:stCondLst>
-                            <p:childTnLst>
-                              <p:par>
-                                <p:cTn id="13" presetID="1" presetClass="entr" presetSubtype="0" fill="hold" grpId="0" nodeType="clickEffect">
-                                  <p:stCondLst>
-                                    <p:cond delay="0"/>
-                                  </p:stCondLst>
-                                  <p:childTnLst>
-                                    <p:set>
-                                      <p:cBhvr>
-                                        <p:cTn id="14" dur="1" fill="hold">
-                                          <p:stCondLst>
-                                            <p:cond delay="0"/>
-                                          </p:stCondLst>
-                                        </p:cTn>
-                                        <p:tgtEl>
-                                          <p:spTgt spid="5">
-                                            <p:txEl>
-                                              <p:pRg st="2" end="2"/>
-                                            </p:txEl>
-                                          </p:spTgt>
-                                        </p:tgtEl>
-                                        <p:attrNameLst>
-                                          <p:attrName>style.visibility</p:attrName>
-                                        </p:attrNameLst>
-                                      </p:cBhvr>
-                                      <p:to>
-                                        <p:strVal val="visible"/>
-                                      </p:to>
-                                    </p:set>
-                                  </p:childTnLst>
-                                </p:cTn>
-                              </p:par>
-                            </p:childTnLst>
-                          </p:cTn>
-                        </p:par>
-                      </p:childTnLst>
-                    </p:cTn>
-                  </p:par>
-                  <p:par>
-                    <p:cTn id="15" fill="hold">
-                      <p:stCondLst>
-                        <p:cond delay="indefinite"/>
-                      </p:stCondLst>
-                      <p:childTnLst>
-                        <p:par>
-                          <p:cTn id="16" fill="hold">
-                            <p:stCondLst>
-                              <p:cond delay="0"/>
-                            </p:stCondLst>
-                            <p:childTnLst>
-                              <p:par>
-                                <p:cTn id="17" presetID="1" presetClass="entr" presetSubtype="0" fill="hold" grpId="0" nodeType="clickEffect">
-                                  <p:stCondLst>
-                                    <p:cond delay="0"/>
-                                  </p:stCondLst>
-                                  <p:childTnLst>
-                                    <p:set>
-                                      <p:cBhvr>
-                                        <p:cTn id="18" dur="1" fill="hold">
-                                          <p:stCondLst>
-                                            <p:cond delay="0"/>
-                                          </p:stCondLst>
-                                        </p:cTn>
-                                        <p:tgtEl>
-                                          <p:spTgt spid="5">
-                                            <p:txEl>
-                                              <p:pRg st="3" end="3"/>
-                                            </p:txEl>
-                                          </p:spTgt>
-                                        </p:tgtEl>
-                                        <p:attrNameLst>
-                                          <p:attrName>style.visibility</p:attrName>
-                                        </p:attrNameLst>
-                                      </p:cBhvr>
-                                      <p:to>
-                                        <p:strVal val="visible"/>
-                                      </p:to>
-                                    </p:set>
-                                  </p:childTnLst>
-                                </p:cTn>
-                              </p:par>
-                            </p:childTnLst>
-                          </p:cTn>
-                        </p:par>
-                      </p:childTnLst>
-                    </p:cTn>
-                  </p:par>
-                  <p:par>
-                    <p:cTn id="19" fill="hold">
-                      <p:stCondLst>
-                        <p:cond delay="indefinite"/>
-                      </p:stCondLst>
-                      <p:childTnLst>
-                        <p:par>
-                          <p:cTn id="20" fill="hold">
-                            <p:stCondLst>
-                              <p:cond delay="0"/>
-                            </p:stCondLst>
-                            <p:childTnLst>
-                              <p:par>
-                                <p:cTn id="21" presetID="1" presetClass="entr" presetSubtype="0" fill="hold" grpId="0" nodeType="clickEffect">
-                                  <p:stCondLst>
-                                    <p:cond delay="0"/>
-                                  </p:stCondLst>
-                                  <p:childTnLst>
-                                    <p:set>
-                                      <p:cBhvr>
-                                        <p:cTn id="22" dur="1" fill="hold">
-                                          <p:stCondLst>
-                                            <p:cond delay="0"/>
-                                          </p:stCondLst>
-                                        </p:cTn>
-                                        <p:tgtEl>
-                                          <p:spTgt spid="5">
-                                            <p:txEl>
-                                              <p:pRg st="4" end="4"/>
-                                            </p:txEl>
-                                          </p:spTgt>
-                                        </p:tgtEl>
-                                        <p:attrNameLst>
-                                          <p:attrName>style.visibility</p:attrName>
-                                        </p:attrNameLst>
-                                      </p:cBhvr>
-                                      <p:to>
-                                        <p:strVal val="visible"/>
-                                      </p:to>
-                                    </p:set>
-                                  </p:childTnLst>
-                                </p:cTn>
-                              </p:par>
-                            </p:childTnLst>
-                          </p:cTn>
-                        </p:par>
-                      </p:childTnLst>
-                    </p:cTn>
-                  </p:par>
-                </p:childTnLst>
-              </p:cTn>
-              <p:prevCondLst>
-                <p:cond evt="onPrev" delay="0">
-                  <p:tgtEl>
-                    <p:sldTgt/>
-                  </p:tgtEl>
-                </p:cond>
-              </p:prevCondLst>
-              <p:nextCondLst>
-                <p:cond evt="onNext" delay="0">
-                  <p:tgtEl>
-                    <p:sldTgt/>
-                  </p:tgtEl>
-                </p:cond>
-              </p:nextCondLst>
-            </p:seq>
-          </p:childTnLst>
-        </p:cTn>
-      </p:par>
-    </p:tnLst>
-    <p:bldLst>
-      <p:bldP spid="5" grpId="0" build="p"/>
-    </p:bldLst>
   </p:timing>
 </p:sld>
 </file>

</xml_diff>